<commit_message>
More detailed explanation of def. vs. decl.
</commit_message>
<xml_diff>
--- a/2018/recap_and_warmup_slides.pptx
+++ b/2018/recap_and_warmup_slides.pptx
@@ -13,8 +13,8 @@
   <p:sldIdLst>
     <p:sldId id="454" r:id="rId2"/>
     <p:sldId id="470" r:id="rId3"/>
-    <p:sldId id="498" r:id="rId4"/>
-    <p:sldId id="463" r:id="rId5"/>
+    <p:sldId id="463" r:id="rId4"/>
+    <p:sldId id="498" r:id="rId5"/>
     <p:sldId id="479" r:id="rId6"/>
     <p:sldId id="481" r:id="rId7"/>
     <p:sldId id="480" r:id="rId8"/>
@@ -193,8 +193,8 @@
           <p14:sldIdLst>
             <p14:sldId id="454"/>
             <p14:sldId id="470"/>
+            <p14:sldId id="463"/>
             <p14:sldId id="498"/>
-            <p14:sldId id="463"/>
             <p14:sldId id="479"/>
             <p14:sldId id="481"/>
             <p14:sldId id="480"/>
@@ -7121,7 +7121,7 @@
           <a:graphicData uri="http://schemas.openxmlformats.org/presentationml/2006/ole">
             <mc:AlternateContent xmlns:mc="http://schemas.openxmlformats.org/markup-compatibility/2006">
               <mc:Choice xmlns:v="urn:schemas-microsoft-com:vml" Requires="v">
-                <p:oleObj spid="_x0000_s2032" r:id="rId16" imgW="1038370" imgH="980952" progId="">
+                <p:oleObj spid="_x0000_s2035" r:id="rId16" imgW="1038370" imgH="980952" progId="">
                   <p:embed/>
                 </p:oleObj>
               </mc:Choice>
@@ -7559,7 +7559,7 @@
                 </a:lnSpc>
                 <a:defRPr/>
               </a:pPr>
-              <a:t>2018-08-20</a:t>
+              <a:t>2018-08-23</a:t>
             </a:fld>
             <a:r>
               <a:rPr lang="en-GB" altLang="de-DE" sz="1000" smtClean="0">
@@ -8166,7 +8166,7 @@
       </p:grpSpPr>
       <p:sp>
         <p:nvSpPr>
-          <p:cNvPr id="2" name="Titel 1"/>
+          <p:cNvPr id="7" name="Titel 6"/>
           <p:cNvSpPr>
             <a:spLocks noGrp="1"/>
           </p:cNvSpPr>
@@ -8181,15 +8181,15 @@
           <a:p>
             <a:r>
               <a:rPr lang="en-US" smtClean="0"/>
-              <a:t>Tag 1-Vormittag: Anmerkungen</a:t>
-            </a:r>
-            <a:endParaRPr lang="en-US"/>
+              <a:t>Tag 1-Nachmittag: Anmerkungen</a:t>
+            </a:r>
+            <a:endParaRPr lang="en-US" dirty="0"/>
           </a:p>
         </p:txBody>
       </p:sp>
       <p:sp>
         <p:nvSpPr>
-          <p:cNvPr id="3" name="Inhaltsplatzhalter 2"/>
+          <p:cNvPr id="8" name="Inhaltsplatzhalter 7"/>
           <p:cNvSpPr>
             <a:spLocks noGrp="1"/>
           </p:cNvSpPr>
@@ -8199,110 +8199,192 @@
         </p:nvSpPr>
         <p:spPr/>
         <p:txBody>
-          <a:bodyPr/>
+          <a:bodyPr>
+            <a:normAutofit/>
+          </a:bodyPr>
           <a:lstStyle/>
           <a:p>
+            <a:pPr marL="342900" indent="-342900">
+              <a:buFontTx/>
+              <a:buChar char="-"/>
+            </a:pPr>
             <a:r>
               <a:rPr lang="en-US" b="1" smtClean="0"/>
-              <a:t>Auf den Pool-PCs liegt ein relative aktueller Stand des Repositories</a:t>
-            </a:r>
-            <a:endParaRPr lang="en-US"/>
-          </a:p>
-          <a:p>
+              <a:t>Am </a:t>
+            </a:r>
+            <a:r>
+              <a:rPr lang="en-US" b="1" smtClean="0"/>
+              <a:t>Ende des Tages bitte…</a:t>
+            </a:r>
+          </a:p>
+          <a:p>
+            <a:pPr marL="692150" lvl="1" indent="-342900">
+              <a:buFontTx/>
+              <a:buChar char="-"/>
+            </a:pPr>
+            <a:r>
+              <a:rPr lang="en-US" b="1" smtClean="0"/>
+              <a:t>… </a:t>
+            </a:r>
+            <a:r>
+              <a:rPr lang="en-US" b="1" smtClean="0"/>
+              <a:t>nur abmelden, </a:t>
+            </a:r>
+            <a:r>
+              <a:rPr lang="en-US" smtClean="0"/>
+              <a:t>nicht den PC ausschalten</a:t>
+            </a:r>
+            <a:r>
+              <a:rPr lang="en-US" b="1" smtClean="0"/>
+              <a:t>.</a:t>
+            </a:r>
+          </a:p>
+          <a:p>
+            <a:pPr marL="692150" lvl="1" indent="-342900">
+              <a:buFontTx/>
+              <a:buChar char="-"/>
+            </a:pPr>
+            <a:r>
+              <a:rPr lang="en-US" b="1" smtClean="0"/>
+              <a:t>… </a:t>
+            </a:r>
+            <a:r>
+              <a:rPr lang="en-US" b="1" smtClean="0"/>
+              <a:t>Ergebnisse sichern</a:t>
+            </a:r>
+            <a:r>
+              <a:rPr lang="en-US" smtClean="0"/>
+              <a:t> – wir können leider für nichts außerhalb von %HOME% garantieren</a:t>
+            </a:r>
+            <a:r>
+              <a:rPr lang="en-US" smtClean="0"/>
+              <a:t>.</a:t>
+            </a:r>
+          </a:p>
+          <a:p>
+            <a:pPr marL="692150" lvl="1" indent="-342900">
+              <a:buFontTx/>
+              <a:buChar char="-"/>
+            </a:pPr>
+            <a:endParaRPr lang="de-DE"/>
+          </a:p>
+          <a:p>
+            <a:pPr marL="342900" indent="-342900">
+              <a:buFontTx/>
+              <a:buChar char="-"/>
+            </a:pPr>
+            <a:r>
+              <a:rPr lang="de-DE" smtClean="0"/>
+              <a:t>Der PC-Pool hat eine </a:t>
+            </a:r>
+            <a:r>
+              <a:rPr lang="de-DE" b="1" smtClean="0"/>
+              <a:t>Klimaanlage</a:t>
+            </a:r>
+            <a:r>
+              <a:rPr lang="de-DE" smtClean="0"/>
+              <a:t>.</a:t>
+            </a:r>
+          </a:p>
+          <a:p>
+            <a:pPr marL="692150" lvl="1" indent="-342900">
+              <a:buFontTx/>
+              <a:buChar char="-"/>
+            </a:pPr>
+            <a:r>
+              <a:rPr lang="de-DE" smtClean="0"/>
+              <a:t>Falls </a:t>
+            </a:r>
+            <a:r>
+              <a:rPr lang="de-DE" b="1" smtClean="0"/>
+              <a:t>zu kalt oder warm</a:t>
+            </a:r>
+            <a:r>
+              <a:rPr lang="de-DE" smtClean="0"/>
+              <a:t>, bitte Bescheid sagen!</a:t>
+            </a:r>
+          </a:p>
+          <a:p>
+            <a:pPr marL="692150" lvl="1" indent="-342900">
+              <a:buFontTx/>
+              <a:buChar char="-"/>
+            </a:pPr>
+            <a:r>
+              <a:rPr lang="de-DE" smtClean="0"/>
+              <a:t>Bitte die </a:t>
+            </a:r>
+            <a:r>
+              <a:rPr lang="de-DE" b="1" smtClean="0"/>
+              <a:t>Türen anlehnen</a:t>
+            </a:r>
+            <a:r>
+              <a:rPr lang="de-DE" smtClean="0"/>
+              <a:t>.</a:t>
+            </a:r>
             <a:endParaRPr lang="en-US" smtClean="0"/>
           </a:p>
           <a:p>
+            <a:pPr marL="692150" lvl="1" indent="-342900">
+              <a:buFontTx/>
+              <a:buChar char="-"/>
+            </a:pPr>
+            <a:endParaRPr lang="en-US" smtClean="0"/>
+          </a:p>
+          <a:p>
+            <a:pPr marL="342900" indent="-342900">
+              <a:buFontTx/>
+              <a:buChar char="-"/>
+            </a:pPr>
+            <a:r>
+              <a:rPr lang="en-US" b="1" smtClean="0"/>
+              <a:t>Danke fürs Feedback! </a:t>
+            </a:r>
+            <a:br>
+              <a:rPr lang="en-US" b="1" smtClean="0"/>
+            </a:br>
             <a:r>
               <a:rPr lang="en-US" smtClean="0"/>
-              <a:t>Ort: C:\VMs\tud-cppp.zip</a:t>
-            </a:r>
-          </a:p>
-          <a:p>
-            <a:endParaRPr lang="en-US"/>
-          </a:p>
-          <a:p>
+              <a:t>Es </a:t>
+            </a:r>
             <a:r>
               <a:rPr lang="en-US" smtClean="0"/>
-              <a:t>Zum Aktualisieren und Verwenden:</a:t>
-            </a:r>
-          </a:p>
-          <a:p>
-            <a:pPr marL="457200" indent="-457200">
-              <a:buAutoNum type="arabicPeriod"/>
+              <a:t>gibt ein paar Bugfixes</a:t>
+            </a:r>
+          </a:p>
+          <a:p>
+            <a:pPr marL="692150" lvl="1" indent="-342900">
+              <a:buFontTx/>
+              <a:buChar char="-"/>
             </a:pPr>
             <a:r>
-              <a:rPr lang="en-US" smtClean="0"/>
-              <a:t>Entpacken</a:t>
-            </a:r>
-          </a:p>
-          <a:p>
-            <a:pPr marL="457200" indent="-457200">
-              <a:buAutoNum type="arabicPeriod"/>
-            </a:pPr>
-            <a:r>
-              <a:rPr lang="en-US" smtClean="0"/>
-              <a:t>Rechts-Klick </a:t>
-            </a:r>
-            <a:r>
-              <a:rPr lang="en-US" smtClean="0">
-                <a:sym typeface="Wingdings" panose="05000000000000000000" pitchFamily="2" charset="2"/>
-              </a:rPr>
-              <a:t>TortoiseGit Pull</a:t>
-            </a:r>
-          </a:p>
-          <a:p>
-            <a:pPr marL="457200" indent="-457200">
-              <a:buAutoNum type="arabicPeriod"/>
-            </a:pPr>
-            <a:endParaRPr lang="en-US">
-              <a:sym typeface="Wingdings" panose="05000000000000000000" pitchFamily="2" charset="2"/>
-            </a:endParaRPr>
-          </a:p>
-          <a:p>
-            <a:r>
-              <a:rPr lang="en-US" smtClean="0">
-                <a:sym typeface="Wingdings" panose="05000000000000000000" pitchFamily="2" charset="2"/>
-              </a:rPr>
-              <a:t>Dieses Repo wird erst f</a:t>
-            </a:r>
-            <a:r>
-              <a:rPr lang="de-DE" smtClean="0">
-                <a:sym typeface="Wingdings" panose="05000000000000000000" pitchFamily="2" charset="2"/>
-              </a:rPr>
-              <a:t>ür die Microcontroller-Entwicklung gebraucht.</a:t>
-            </a:r>
-          </a:p>
-          <a:p>
-            <a:endParaRPr lang="de-DE">
-              <a:sym typeface="Wingdings" panose="05000000000000000000" pitchFamily="2" charset="2"/>
-            </a:endParaRPr>
-          </a:p>
-          <a:p>
-            <a:r>
-              <a:rPr lang="de-DE" b="1"/>
-              <a:t>Wo finde ich WinIDEA? </a:t>
-            </a:r>
-            <a:r>
-              <a:rPr lang="de-DE"/>
-              <a:t>C:\PortableApps\iSYSTEM\winIDEAOpen9\winIDEA.exe</a:t>
-            </a:r>
-            <a:endParaRPr lang="en-US"/>
-          </a:p>
-          <a:p>
-            <a:endParaRPr lang="en-US"/>
+              <a:rPr lang="de-DE" smtClean="0"/>
+              <a:t>Siehe </a:t>
+            </a:r>
+            <a:r>
+              <a:rPr lang="de-DE" b="1" smtClean="0"/>
+              <a:t>changelog.txt</a:t>
+            </a:r>
+            <a:endParaRPr lang="en-US" b="1" smtClean="0"/>
           </a:p>
         </p:txBody>
       </p:sp>
     </p:spTree>
     <p:extLst>
       <p:ext uri="{BB962C8B-B14F-4D97-AF65-F5344CB8AC3E}">
-        <p14:creationId xmlns:p14="http://schemas.microsoft.com/office/powerpoint/2010/main" val="202498790"/>
+        <p14:creationId xmlns:p14="http://schemas.microsoft.com/office/powerpoint/2010/main" val="2412699480"/>
       </p:ext>
     </p:extLst>
   </p:cSld>
   <p:clrMapOvr>
     <a:masterClrMapping/>
   </p:clrMapOvr>
+  <p:timing>
+    <p:tnLst>
+      <p:par>
+        <p:cTn id="1" dur="indefinite" restart="never" nodeType="tmRoot"/>
+      </p:par>
+    </p:tnLst>
+  </p:timing>
 </p:sld>
 </file>
 
@@ -8325,7 +8407,7 @@
       </p:grpSpPr>
       <p:sp>
         <p:nvSpPr>
-          <p:cNvPr id="7" name="Titel 6"/>
+          <p:cNvPr id="2" name="Titel 1"/>
           <p:cNvSpPr>
             <a:spLocks noGrp="1"/>
           </p:cNvSpPr>
@@ -8340,15 +8422,23 @@
           <a:p>
             <a:r>
               <a:rPr lang="en-US" smtClean="0"/>
-              <a:t>Tag 1-Nachmittag: Anmerkungen</a:t>
-            </a:r>
-            <a:endParaRPr lang="en-US" dirty="0"/>
+              <a:t>Tag </a:t>
+            </a:r>
+            <a:r>
+              <a:rPr lang="en-US" smtClean="0"/>
+              <a:t>3-Vormittag</a:t>
+            </a:r>
+            <a:r>
+              <a:rPr lang="en-US" smtClean="0"/>
+              <a:t>: Anmerkungen</a:t>
+            </a:r>
+            <a:endParaRPr lang="en-US"/>
           </a:p>
         </p:txBody>
       </p:sp>
       <p:sp>
         <p:nvSpPr>
-          <p:cNvPr id="8" name="Inhaltsplatzhalter 7"/>
+          <p:cNvPr id="3" name="Inhaltsplatzhalter 2"/>
           <p:cNvSpPr>
             <a:spLocks noGrp="1"/>
           </p:cNvSpPr>
@@ -8358,144 +8448,110 @@
         </p:nvSpPr>
         <p:spPr/>
         <p:txBody>
-          <a:bodyPr>
-            <a:normAutofit/>
-          </a:bodyPr>
+          <a:bodyPr/>
           <a:lstStyle/>
           <a:p>
-            <a:pPr marL="342900" indent="-342900">
-              <a:buFontTx/>
-              <a:buChar char="-"/>
+            <a:r>
+              <a:rPr lang="en-US" b="1" smtClean="0"/>
+              <a:t>Auf den Pool-PCs liegt ein relative aktueller Stand des Repositories</a:t>
+            </a:r>
+            <a:endParaRPr lang="en-US"/>
+          </a:p>
+          <a:p>
+            <a:endParaRPr lang="en-US" smtClean="0"/>
+          </a:p>
+          <a:p>
+            <a:r>
+              <a:rPr lang="en-US" smtClean="0"/>
+              <a:t>Ort: C:\VMs\tud-cppp.zip</a:t>
+            </a:r>
+          </a:p>
+          <a:p>
+            <a:endParaRPr lang="en-US"/>
+          </a:p>
+          <a:p>
+            <a:r>
+              <a:rPr lang="en-US" smtClean="0"/>
+              <a:t>Zum Aktualisieren und Verwenden:</a:t>
+            </a:r>
+          </a:p>
+          <a:p>
+            <a:pPr marL="457200" indent="-457200">
+              <a:buAutoNum type="arabicPeriod"/>
             </a:pPr>
             <a:r>
-              <a:rPr lang="en-US" b="1" smtClean="0"/>
-              <a:t>Wir sind sehr dankbar für </a:t>
-            </a:r>
-            <a:r>
-              <a:rPr lang="en-US" b="1" smtClean="0"/>
-              <a:t>Feedback, wie wir die Aufgaben konkret verbessern können, bspw. unter </a:t>
-            </a:r>
-            <a:endParaRPr lang="en-US" b="1" smtClean="0"/>
-          </a:p>
-          <a:p>
-            <a:pPr marL="692150" lvl="1" indent="-342900">
-              <a:buFontTx/>
-              <a:buChar char="-"/>
+              <a:rPr lang="en-US" smtClean="0"/>
+              <a:t>Entpacken</a:t>
+            </a:r>
+          </a:p>
+          <a:p>
+            <a:pPr marL="457200" indent="-457200">
+              <a:buAutoNum type="arabicPeriod"/>
             </a:pPr>
             <a:r>
-              <a:rPr lang="en-US">
-                <a:hlinkClick r:id="rId2"/>
+              <a:rPr lang="en-US" smtClean="0"/>
+              <a:t>Rechts-Klick </a:t>
+            </a:r>
+            <a:r>
+              <a:rPr lang="en-US" smtClean="0">
+                <a:sym typeface="Wingdings" panose="05000000000000000000" pitchFamily="2" charset="2"/>
               </a:rPr>
-              <a:t>https://github.com/Echtzeitsysteme/tud-cppp</a:t>
-            </a:r>
+              <a:t>TortoiseGit Pull</a:t>
+            </a:r>
+          </a:p>
+          <a:p>
+            <a:pPr marL="457200" indent="-457200">
+              <a:buAutoNum type="arabicPeriod"/>
+            </a:pPr>
+            <a:endParaRPr lang="en-US">
+              <a:sym typeface="Wingdings" panose="05000000000000000000" pitchFamily="2" charset="2"/>
+            </a:endParaRPr>
+          </a:p>
+          <a:p>
             <a:r>
               <a:rPr lang="en-US" smtClean="0">
-                <a:hlinkClick r:id="rId2"/>
+                <a:sym typeface="Wingdings" panose="05000000000000000000" pitchFamily="2" charset="2"/>
               </a:rPr>
-              <a:t>/</a:t>
-            </a:r>
-            <a:r>
-              <a:rPr lang="en-US" smtClean="0"/>
-              <a:t> </a:t>
-            </a:r>
-          </a:p>
-          <a:p>
-            <a:pPr marL="692150" lvl="1" indent="-342900">
-              <a:buFontTx/>
-              <a:buChar char="-"/>
-            </a:pPr>
-            <a:r>
-              <a:rPr lang="en-US" smtClean="0">
-                <a:hlinkClick r:id="rId3"/>
+              <a:t>Dieses Repo wird erst f</a:t>
+            </a:r>
+            <a:r>
+              <a:rPr lang="de-DE" smtClean="0">
+                <a:sym typeface="Wingdings" panose="05000000000000000000" pitchFamily="2" charset="2"/>
               </a:rPr>
-              <a:t>roland.kluge@es.tu</a:t>
-            </a:r>
-            <a:r>
-              <a:rPr lang="en-US" smtClean="0"/>
-              <a:t>...</a:t>
-            </a:r>
-          </a:p>
-          <a:p>
-            <a:pPr marL="692150" lvl="1" indent="-342900">
-              <a:buFontTx/>
-              <a:buChar char="-"/>
-            </a:pPr>
-            <a:endParaRPr lang="en-US" b="1"/>
-          </a:p>
-          <a:p>
-            <a:pPr marL="342900" indent="-342900">
-              <a:buFontTx/>
-              <a:buChar char="-"/>
-            </a:pPr>
-            <a:r>
-              <a:rPr lang="en-US" b="1" smtClean="0"/>
-              <a:t>Am Ende des Tages bitte…</a:t>
-            </a:r>
-          </a:p>
-          <a:p>
-            <a:pPr marL="692150" lvl="1" indent="-342900">
-              <a:buFontTx/>
-              <a:buChar char="-"/>
-            </a:pPr>
-            <a:r>
-              <a:rPr lang="en-US" b="1" smtClean="0"/>
-              <a:t>… </a:t>
-            </a:r>
-            <a:r>
-              <a:rPr lang="en-US" b="1" smtClean="0"/>
-              <a:t>nur </a:t>
-            </a:r>
-            <a:r>
-              <a:rPr lang="en-US" b="1" smtClean="0"/>
-              <a:t>abmelden, </a:t>
-            </a:r>
-            <a:r>
-              <a:rPr lang="en-US" smtClean="0"/>
-              <a:t>nicht den PC ausschalten</a:t>
-            </a:r>
-            <a:r>
-              <a:rPr lang="en-US" b="1" smtClean="0"/>
-              <a:t>.</a:t>
-            </a:r>
-          </a:p>
-          <a:p>
-            <a:pPr marL="692150" lvl="1" indent="-342900">
-              <a:buFontTx/>
-              <a:buChar char="-"/>
-            </a:pPr>
-            <a:r>
-              <a:rPr lang="en-US" b="1" smtClean="0"/>
-              <a:t>… Ergebnisse sichern</a:t>
-            </a:r>
-            <a:r>
-              <a:rPr lang="en-US" smtClean="0"/>
-              <a:t> – wir können leider für nichts außerhalb von %HOME% garantieren</a:t>
-            </a:r>
-            <a:r>
-              <a:rPr lang="en-US" smtClean="0"/>
-              <a:t>.</a:t>
-            </a:r>
-            <a:endParaRPr lang="en-US" smtClean="0"/>
+              <a:t>ür die Microcontroller-Entwicklung gebraucht.</a:t>
+            </a:r>
+          </a:p>
+          <a:p>
+            <a:endParaRPr lang="de-DE">
+              <a:sym typeface="Wingdings" panose="05000000000000000000" pitchFamily="2" charset="2"/>
+            </a:endParaRPr>
+          </a:p>
+          <a:p>
+            <a:r>
+              <a:rPr lang="de-DE" b="1"/>
+              <a:t>Wo finde ich WinIDEA? </a:t>
+            </a:r>
+            <a:r>
+              <a:rPr lang="de-DE"/>
+              <a:t>C:\PortableApps\iSYSTEM\winIDEAOpen9\winIDEA.exe</a:t>
+            </a:r>
+            <a:endParaRPr lang="en-US"/>
+          </a:p>
+          <a:p>
+            <a:endParaRPr lang="en-US"/>
           </a:p>
         </p:txBody>
       </p:sp>
     </p:spTree>
     <p:extLst>
       <p:ext uri="{BB962C8B-B14F-4D97-AF65-F5344CB8AC3E}">
-        <p14:creationId xmlns:p14="http://schemas.microsoft.com/office/powerpoint/2010/main" val="2412699480"/>
+        <p14:creationId xmlns:p14="http://schemas.microsoft.com/office/powerpoint/2010/main" val="202498790"/>
       </p:ext>
     </p:extLst>
   </p:cSld>
   <p:clrMapOvr>
     <a:masterClrMapping/>
   </p:clrMapOvr>
-  <p:timing>
-    <p:tnLst>
-      <p:par>
-        <p:cTn id="1" dur="indefinite" restart="never" nodeType="tmRoot"/>
-      </p:par>
-    </p:tnLst>
-  </p:timing>
 </p:sld>
 </file>
 
@@ -8616,11 +8672,7 @@
             </a:pPr>
             <a:r>
               <a:rPr lang="en-US" smtClean="0"/>
-              <a:t>Selbsteinschätzung </a:t>
-            </a:r>
-            <a:r>
-              <a:rPr lang="en-US" smtClean="0"/>
-              <a:t>deiner C++-Kenntnisse (1=Keine Vorkenntnisse, 3=Eigene kleinere Projekte, 5=Sehr erfahrener C++-Programmierer)</a:t>
+              <a:t>Selbsteinschätzung deiner C++-Kenntnisse (1=Keine Vorkenntnisse, 3=Eigene kleinere Projekte, 5=Sehr erfahrener C++-Programmierer)</a:t>
             </a:r>
           </a:p>
           <a:p>

</xml_diff>

<commit_message>
Fix bug in slide 80
</commit_message>
<xml_diff>
--- a/2018/recap_and_warmup_slides.pptx
+++ b/2018/recap_and_warmup_slides.pptx
@@ -5,19 +5,20 @@
     <p:sldMasterId id="2147483650" r:id="rId1"/>
   </p:sldMasterIdLst>
   <p:notesMasterIdLst>
-    <p:notesMasterId r:id="rId9"/>
+    <p:notesMasterId r:id="rId10"/>
   </p:notesMasterIdLst>
   <p:handoutMasterIdLst>
-    <p:handoutMasterId r:id="rId10"/>
+    <p:handoutMasterId r:id="rId11"/>
   </p:handoutMasterIdLst>
   <p:sldIdLst>
     <p:sldId id="454" r:id="rId2"/>
     <p:sldId id="470" r:id="rId3"/>
     <p:sldId id="463" r:id="rId4"/>
-    <p:sldId id="498" r:id="rId5"/>
-    <p:sldId id="479" r:id="rId6"/>
-    <p:sldId id="481" r:id="rId7"/>
-    <p:sldId id="480" r:id="rId8"/>
+    <p:sldId id="499" r:id="rId5"/>
+    <p:sldId id="498" r:id="rId6"/>
+    <p:sldId id="479" r:id="rId7"/>
+    <p:sldId id="481" r:id="rId8"/>
+    <p:sldId id="480" r:id="rId9"/>
   </p:sldIdLst>
   <p:sldSz cx="9144000" cy="6858000" type="screen4x3"/>
   <p:notesSz cx="7099300" cy="10234613"/>
@@ -194,6 +195,7 @@
             <p14:sldId id="454"/>
             <p14:sldId id="470"/>
             <p14:sldId id="463"/>
+            <p14:sldId id="499"/>
             <p14:sldId id="498"/>
             <p14:sldId id="479"/>
             <p14:sldId id="481"/>
@@ -2651,7 +2653,7 @@
                 <a:latin typeface="Stafford" pitchFamily="2" charset="0"/>
               </a:rPr>
               <a:pPr eaLnBrk="1" hangingPunct="1"/>
-              <a:t>7</a:t>
+              <a:t>8</a:t>
             </a:fld>
             <a:endParaRPr lang="en-US" altLang="de-DE" smtClean="0">
               <a:solidFill>
@@ -7121,7 +7123,7 @@
           <a:graphicData uri="http://schemas.openxmlformats.org/presentationml/2006/ole">
             <mc:AlternateContent xmlns:mc="http://schemas.openxmlformats.org/markup-compatibility/2006">
               <mc:Choice xmlns:v="urn:schemas-microsoft-com:vml" Requires="v">
-                <p:oleObj spid="_x0000_s2035" r:id="rId16" imgW="1038370" imgH="980952" progId="">
+                <p:oleObj spid="_x0000_s2039" r:id="rId16" imgW="1038370" imgH="980952" progId="">
                   <p:embed/>
                 </p:oleObj>
               </mc:Choice>
@@ -8210,11 +8212,7 @@
             </a:pPr>
             <a:r>
               <a:rPr lang="en-US" b="1" smtClean="0"/>
-              <a:t>Am </a:t>
-            </a:r>
-            <a:r>
-              <a:rPr lang="en-US" b="1" smtClean="0"/>
-              <a:t>Ende des Tages bitte…</a:t>
+              <a:t>Am Ende des Tages bitte…</a:t>
             </a:r>
           </a:p>
           <a:p>
@@ -8224,11 +8222,7 @@
             </a:pPr>
             <a:r>
               <a:rPr lang="en-US" b="1" smtClean="0"/>
-              <a:t>… </a:t>
-            </a:r>
-            <a:r>
-              <a:rPr lang="en-US" b="1" smtClean="0"/>
-              <a:t>nur abmelden, </a:t>
+              <a:t>… nur abmelden, </a:t>
             </a:r>
             <a:r>
               <a:rPr lang="en-US" smtClean="0"/>
@@ -8246,19 +8240,11 @@
             </a:pPr>
             <a:r>
               <a:rPr lang="en-US" b="1" smtClean="0"/>
-              <a:t>… </a:t>
-            </a:r>
-            <a:r>
-              <a:rPr lang="en-US" b="1" smtClean="0"/>
-              <a:t>Ergebnisse sichern</a:t>
+              <a:t>… Ergebnisse sichern</a:t>
             </a:r>
             <a:r>
               <a:rPr lang="en-US" smtClean="0"/>
-              <a:t> – wir können leider für nichts außerhalb von %HOME% garantieren</a:t>
-            </a:r>
-            <a:r>
-              <a:rPr lang="en-US" smtClean="0"/>
-              <a:t>.</a:t>
+              <a:t> – wir können leider für nichts außerhalb von %HOME% garantieren.</a:t>
             </a:r>
           </a:p>
           <a:p>
@@ -8344,11 +8330,7 @@
             </a:br>
             <a:r>
               <a:rPr lang="en-US" smtClean="0"/>
-              <a:t>Es </a:t>
-            </a:r>
-            <a:r>
-              <a:rPr lang="en-US" smtClean="0"/>
-              <a:t>gibt ein paar Bugfixes</a:t>
+              <a:t>Es gibt ein paar Bugfixes</a:t>
             </a:r>
           </a:p>
           <a:p>
@@ -8421,16 +8403,8 @@
           <a:lstStyle/>
           <a:p>
             <a:r>
-              <a:rPr lang="en-US" smtClean="0"/>
-              <a:t>Tag </a:t>
-            </a:r>
-            <a:r>
-              <a:rPr lang="en-US" smtClean="0"/>
-              <a:t>3-Vormittag</a:t>
-            </a:r>
-            <a:r>
-              <a:rPr lang="en-US" smtClean="0"/>
-              <a:t>: Anmerkungen</a:t>
+              <a:rPr lang="de-DE" smtClean="0"/>
+              <a:t>Tag 2-Vormittag</a:t>
             </a:r>
             <a:endParaRPr lang="en-US"/>
           </a:p>
@@ -8452,6 +8426,490 @@
           <a:lstStyle/>
           <a:p>
             <a:r>
+              <a:rPr lang="de-DE" b="1" smtClean="0"/>
+              <a:t>Bugfix</a:t>
+            </a:r>
+            <a:r>
+              <a:rPr lang="de-DE" smtClean="0"/>
+              <a:t>: Folie 80</a:t>
+            </a:r>
+          </a:p>
+          <a:p>
+            <a:endParaRPr lang="de-DE" altLang="de-DE" u="sng" smtClean="0">
+              <a:solidFill>
+                <a:srgbClr val="7F0055"/>
+              </a:solidFill>
+              <a:latin typeface="Consolas" pitchFamily="49" charset="0"/>
+            </a:endParaRPr>
+          </a:p>
+          <a:p>
+            <a:r>
+              <a:rPr lang="de-DE" altLang="de-DE" b="1" smtClean="0">
+                <a:solidFill>
+                  <a:srgbClr val="7F0055"/>
+                </a:solidFill>
+                <a:latin typeface="Consolas" pitchFamily="49" charset="0"/>
+              </a:rPr>
+              <a:t>const</a:t>
+            </a:r>
+            <a:r>
+              <a:rPr lang="de-DE" altLang="de-DE" b="1" smtClean="0">
+                <a:solidFill>
+                  <a:srgbClr val="000000"/>
+                </a:solidFill>
+                <a:latin typeface="Consolas" pitchFamily="49" charset="0"/>
+              </a:rPr>
+              <a:t> </a:t>
+            </a:r>
+            <a:r>
+              <a:rPr lang="de-DE" altLang="de-DE" b="1">
+                <a:solidFill>
+                  <a:srgbClr val="7F0055"/>
+                </a:solidFill>
+                <a:latin typeface="Consolas" pitchFamily="49" charset="0"/>
+              </a:rPr>
+              <a:t>int</a:t>
+            </a:r>
+            <a:r>
+              <a:rPr lang="de-DE" altLang="de-DE" b="1">
+                <a:solidFill>
+                  <a:srgbClr val="000000"/>
+                </a:solidFill>
+                <a:latin typeface="Consolas" pitchFamily="49" charset="0"/>
+              </a:rPr>
+              <a:t> </a:t>
+            </a:r>
+            <a:r>
+              <a:rPr lang="de-DE" altLang="de-DE">
+                <a:solidFill>
+                  <a:srgbClr val="000000"/>
+                </a:solidFill>
+                <a:latin typeface="Consolas" pitchFamily="49" charset="0"/>
+              </a:rPr>
+              <a:t>i = </a:t>
+            </a:r>
+            <a:r>
+              <a:rPr lang="de-DE" altLang="de-DE">
+                <a:solidFill>
+                  <a:srgbClr val="000000"/>
+                </a:solidFill>
+                <a:latin typeface="Consolas" pitchFamily="49" charset="0"/>
+              </a:rPr>
+              <a:t>42</a:t>
+            </a:r>
+            <a:r>
+              <a:rPr lang="de-DE" altLang="de-DE" smtClean="0">
+                <a:solidFill>
+                  <a:srgbClr val="000000"/>
+                </a:solidFill>
+                <a:latin typeface="Consolas" pitchFamily="49" charset="0"/>
+              </a:rPr>
+              <a:t>;</a:t>
+            </a:r>
+            <a:endParaRPr lang="de-DE" altLang="de-DE" smtClean="0">
+              <a:solidFill>
+                <a:srgbClr val="7F0055"/>
+              </a:solidFill>
+              <a:latin typeface="Consolas" pitchFamily="49" charset="0"/>
+            </a:endParaRPr>
+          </a:p>
+          <a:p>
+            <a:r>
+              <a:rPr lang="de-DE" altLang="de-DE" b="1" smtClean="0">
+                <a:solidFill>
+                  <a:srgbClr val="7F0055"/>
+                </a:solidFill>
+                <a:latin typeface="Consolas" pitchFamily="49" charset="0"/>
+              </a:rPr>
+              <a:t>int *</a:t>
+            </a:r>
+            <a:r>
+              <a:rPr lang="de-DE" altLang="de-DE" smtClean="0">
+                <a:solidFill>
+                  <a:srgbClr val="000000"/>
+                </a:solidFill>
+                <a:latin typeface="Consolas" pitchFamily="49" charset="0"/>
+              </a:rPr>
+              <a:t>j </a:t>
+            </a:r>
+            <a:r>
+              <a:rPr lang="de-DE" altLang="de-DE">
+                <a:solidFill>
+                  <a:srgbClr val="000000"/>
+                </a:solidFill>
+                <a:latin typeface="Consolas" pitchFamily="49" charset="0"/>
+              </a:rPr>
+              <a:t>= &amp;i; // </a:t>
+            </a:r>
+            <a:r>
+              <a:rPr lang="de-DE" altLang="de-DE">
+                <a:solidFill>
+                  <a:srgbClr val="FF0000"/>
+                </a:solidFill>
+                <a:latin typeface="Consolas" pitchFamily="49" charset="0"/>
+              </a:rPr>
+              <a:t>✘ </a:t>
+            </a:r>
+            <a:r>
+              <a:rPr lang="de-DE" altLang="de-DE">
+                <a:solidFill>
+                  <a:srgbClr val="000000"/>
+                </a:solidFill>
+                <a:latin typeface="Consolas" pitchFamily="49" charset="0"/>
+              </a:rPr>
+              <a:t>invalid conversion from const int* </a:t>
+            </a:r>
+            <a:r>
+              <a:rPr lang="de-DE" altLang="de-DE">
+                <a:solidFill>
+                  <a:srgbClr val="000000"/>
+                </a:solidFill>
+                <a:latin typeface="Consolas" pitchFamily="49" charset="0"/>
+              </a:rPr>
+              <a:t>to </a:t>
+            </a:r>
+            <a:r>
+              <a:rPr lang="de-DE" altLang="de-DE" smtClean="0">
+                <a:solidFill>
+                  <a:srgbClr val="000000"/>
+                </a:solidFill>
+                <a:latin typeface="Consolas" pitchFamily="49" charset="0"/>
+              </a:rPr>
+              <a:t>int</a:t>
+            </a:r>
+          </a:p>
+          <a:p>
+            <a:endParaRPr lang="de-DE" altLang="de-DE">
+              <a:solidFill>
+                <a:srgbClr val="000000"/>
+              </a:solidFill>
+              <a:latin typeface="Consolas" pitchFamily="49" charset="0"/>
+            </a:endParaRPr>
+          </a:p>
+          <a:p>
+            <a:r>
+              <a:rPr lang="de-DE" altLang="de-DE" b="1" smtClean="0"/>
+              <a:t>Aber</a:t>
+            </a:r>
+            <a:br>
+              <a:rPr lang="de-DE" altLang="de-DE" b="1" smtClean="0"/>
+            </a:br>
+            <a:endParaRPr lang="de-DE" altLang="de-DE" b="1" smtClean="0">
+              <a:solidFill>
+                <a:srgbClr val="000000"/>
+              </a:solidFill>
+              <a:latin typeface="Consolas" pitchFamily="49" charset="0"/>
+            </a:endParaRPr>
+          </a:p>
+          <a:p>
+            <a:r>
+              <a:rPr lang="de-DE" altLang="de-DE" b="1" smtClean="0">
+                <a:solidFill>
+                  <a:srgbClr val="7F0055"/>
+                </a:solidFill>
+                <a:latin typeface="Consolas" pitchFamily="49" charset="0"/>
+              </a:rPr>
+              <a:t>int</a:t>
+            </a:r>
+            <a:r>
+              <a:rPr lang="de-DE" altLang="de-DE" b="1" smtClean="0">
+                <a:solidFill>
+                  <a:srgbClr val="000000"/>
+                </a:solidFill>
+                <a:latin typeface="Consolas" pitchFamily="49" charset="0"/>
+              </a:rPr>
+              <a:t> </a:t>
+            </a:r>
+            <a:r>
+              <a:rPr lang="de-DE" altLang="de-DE">
+                <a:solidFill>
+                  <a:srgbClr val="000000"/>
+                </a:solidFill>
+                <a:latin typeface="Consolas" pitchFamily="49" charset="0"/>
+              </a:rPr>
+              <a:t>i = 42;</a:t>
+            </a:r>
+            <a:endParaRPr lang="de-DE" altLang="de-DE">
+              <a:solidFill>
+                <a:srgbClr val="7F0055"/>
+              </a:solidFill>
+              <a:latin typeface="Consolas" pitchFamily="49" charset="0"/>
+            </a:endParaRPr>
+          </a:p>
+          <a:p>
+            <a:endParaRPr lang="de-DE" altLang="de-DE" b="1" smtClean="0">
+              <a:solidFill>
+                <a:srgbClr val="7F0055"/>
+              </a:solidFill>
+              <a:latin typeface="Consolas" pitchFamily="49" charset="0"/>
+            </a:endParaRPr>
+          </a:p>
+          <a:p>
+            <a:r>
+              <a:rPr lang="de-DE" altLang="de-DE" b="1" smtClean="0">
+                <a:solidFill>
+                  <a:srgbClr val="7F0055"/>
+                </a:solidFill>
+                <a:latin typeface="Consolas" pitchFamily="49" charset="0"/>
+              </a:rPr>
+              <a:t>const int *</a:t>
+            </a:r>
+            <a:r>
+              <a:rPr lang="de-DE" altLang="de-DE">
+                <a:solidFill>
+                  <a:srgbClr val="000000"/>
+                </a:solidFill>
+                <a:latin typeface="Consolas" pitchFamily="49" charset="0"/>
+              </a:rPr>
+              <a:t>iP1 = &amp;</a:t>
+            </a:r>
+            <a:r>
+              <a:rPr lang="de-DE" altLang="de-DE">
+                <a:solidFill>
+                  <a:srgbClr val="000000"/>
+                </a:solidFill>
+                <a:latin typeface="Consolas" pitchFamily="49" charset="0"/>
+              </a:rPr>
+              <a:t>i</a:t>
+            </a:r>
+            <a:r>
+              <a:rPr lang="de-DE" altLang="de-DE" smtClean="0">
+                <a:solidFill>
+                  <a:srgbClr val="000000"/>
+                </a:solidFill>
+                <a:latin typeface="Consolas" pitchFamily="49" charset="0"/>
+              </a:rPr>
+              <a:t>;</a:t>
+            </a:r>
+            <a:br>
+              <a:rPr lang="de-DE" altLang="de-DE" smtClean="0">
+                <a:solidFill>
+                  <a:srgbClr val="000000"/>
+                </a:solidFill>
+                <a:latin typeface="Consolas" pitchFamily="49" charset="0"/>
+              </a:rPr>
+            </a:br>
+            <a:r>
+              <a:rPr lang="de-DE" altLang="de-DE" smtClean="0">
+                <a:solidFill>
+                  <a:srgbClr val="000000"/>
+                </a:solidFill>
+                <a:latin typeface="Consolas" pitchFamily="49" charset="0"/>
+              </a:rPr>
+              <a:t>(*iP1)++; </a:t>
+            </a:r>
+            <a:r>
+              <a:rPr lang="de-DE" altLang="de-DE" sz="2400">
+                <a:solidFill>
+                  <a:srgbClr val="FF0000"/>
+                </a:solidFill>
+                <a:latin typeface="Consolas" pitchFamily="49" charset="0"/>
+              </a:rPr>
+              <a:t>✘</a:t>
+            </a:r>
+            <a:r>
+              <a:rPr lang="de-DE" altLang="de-DE">
+                <a:solidFill>
+                  <a:srgbClr val="000000"/>
+                </a:solidFill>
+                <a:latin typeface="Consolas" pitchFamily="49" charset="0"/>
+              </a:rPr>
+              <a:t/>
+            </a:r>
+            <a:br>
+              <a:rPr lang="de-DE" altLang="de-DE">
+                <a:solidFill>
+                  <a:srgbClr val="000000"/>
+                </a:solidFill>
+                <a:latin typeface="Consolas" pitchFamily="49" charset="0"/>
+              </a:rPr>
+            </a:br>
+            <a:endParaRPr lang="de-DE" altLang="de-DE" smtClean="0">
+              <a:solidFill>
+                <a:srgbClr val="000000"/>
+              </a:solidFill>
+              <a:latin typeface="Consolas" pitchFamily="49" charset="0"/>
+            </a:endParaRPr>
+          </a:p>
+          <a:p>
+            <a:r>
+              <a:rPr lang="de-DE" altLang="de-DE" b="1" smtClean="0">
+                <a:solidFill>
+                  <a:srgbClr val="7F0055"/>
+                </a:solidFill>
+                <a:latin typeface="Consolas" pitchFamily="49" charset="0"/>
+              </a:rPr>
+              <a:t>int </a:t>
+            </a:r>
+            <a:r>
+              <a:rPr lang="de-DE" altLang="de-DE" b="1">
+                <a:solidFill>
+                  <a:srgbClr val="7F0055"/>
+                </a:solidFill>
+                <a:latin typeface="Consolas" pitchFamily="49" charset="0"/>
+              </a:rPr>
+              <a:t>*</a:t>
+            </a:r>
+            <a:r>
+              <a:rPr lang="de-DE" altLang="de-DE" smtClean="0">
+                <a:solidFill>
+                  <a:srgbClr val="000000"/>
+                </a:solidFill>
+                <a:latin typeface="Consolas" pitchFamily="49" charset="0"/>
+              </a:rPr>
+              <a:t>iP2 </a:t>
+            </a:r>
+            <a:r>
+              <a:rPr lang="de-DE" altLang="de-DE">
+                <a:solidFill>
+                  <a:srgbClr val="000000"/>
+                </a:solidFill>
+                <a:latin typeface="Consolas" pitchFamily="49" charset="0"/>
+              </a:rPr>
+              <a:t>= &amp;</a:t>
+            </a:r>
+            <a:r>
+              <a:rPr lang="de-DE" altLang="de-DE">
+                <a:solidFill>
+                  <a:srgbClr val="000000"/>
+                </a:solidFill>
+                <a:latin typeface="Consolas" pitchFamily="49" charset="0"/>
+              </a:rPr>
+              <a:t>i</a:t>
+            </a:r>
+            <a:r>
+              <a:rPr lang="de-DE" altLang="de-DE" smtClean="0">
+                <a:solidFill>
+                  <a:srgbClr val="000000"/>
+                </a:solidFill>
+                <a:latin typeface="Consolas" pitchFamily="49" charset="0"/>
+              </a:rPr>
+              <a:t>;</a:t>
+            </a:r>
+            <a:br>
+              <a:rPr lang="de-DE" altLang="de-DE" smtClean="0">
+                <a:solidFill>
+                  <a:srgbClr val="000000"/>
+                </a:solidFill>
+                <a:latin typeface="Consolas" pitchFamily="49" charset="0"/>
+              </a:rPr>
+            </a:br>
+            <a:r>
+              <a:rPr lang="de-DE" altLang="de-DE">
+                <a:solidFill>
+                  <a:srgbClr val="000000"/>
+                </a:solidFill>
+                <a:latin typeface="Consolas" pitchFamily="49" charset="0"/>
+              </a:rPr>
+              <a:t>(*</a:t>
+            </a:r>
+            <a:r>
+              <a:rPr lang="de-DE" altLang="de-DE" smtClean="0">
+                <a:solidFill>
+                  <a:srgbClr val="000000"/>
+                </a:solidFill>
+                <a:latin typeface="Consolas" pitchFamily="49" charset="0"/>
+              </a:rPr>
+              <a:t>iP2)++; </a:t>
+            </a:r>
+            <a:r>
+              <a:rPr lang="de-DE" altLang="de-DE" sz="2400">
+                <a:solidFill>
+                  <a:srgbClr val="00B050"/>
+                </a:solidFill>
+                <a:latin typeface="Consolas" pitchFamily="49" charset="0"/>
+              </a:rPr>
+              <a:t>✔</a:t>
+            </a:r>
+            <a:endParaRPr lang="de-DE" altLang="de-DE">
+              <a:solidFill>
+                <a:srgbClr val="000000"/>
+              </a:solidFill>
+              <a:latin typeface="Consolas" pitchFamily="49" charset="0"/>
+            </a:endParaRPr>
+          </a:p>
+          <a:p>
+            <a:endParaRPr lang="de-DE" altLang="de-DE" smtClean="0">
+              <a:solidFill>
+                <a:srgbClr val="00B050"/>
+              </a:solidFill>
+              <a:latin typeface="Consolas" pitchFamily="49" charset="0"/>
+            </a:endParaRPr>
+          </a:p>
+          <a:p>
+            <a:endParaRPr lang="en-US"/>
+          </a:p>
+        </p:txBody>
+      </p:sp>
+    </p:spTree>
+    <p:extLst>
+      <p:ext uri="{BB962C8B-B14F-4D97-AF65-F5344CB8AC3E}">
+        <p14:creationId xmlns:p14="http://schemas.microsoft.com/office/powerpoint/2010/main" val="59432261"/>
+      </p:ext>
+    </p:extLst>
+  </p:cSld>
+  <p:clrMapOvr>
+    <a:masterClrMapping/>
+  </p:clrMapOvr>
+</p:sld>
+</file>
+
+<file path=ppt/slides/slide5.xml><?xml version="1.0" encoding="utf-8"?>
+<p:sld xmlns:a="http://schemas.openxmlformats.org/drawingml/2006/main" xmlns:r="http://schemas.openxmlformats.org/officeDocument/2006/relationships" xmlns:p="http://schemas.openxmlformats.org/presentationml/2006/main">
+  <p:cSld>
+    <p:spTree>
+      <p:nvGrpSpPr>
+        <p:cNvPr id="1" name=""/>
+        <p:cNvGrpSpPr/>
+        <p:nvPr/>
+      </p:nvGrpSpPr>
+      <p:grpSpPr>
+        <a:xfrm>
+          <a:off x="0" y="0"/>
+          <a:ext cx="0" cy="0"/>
+          <a:chOff x="0" y="0"/>
+          <a:chExt cx="0" cy="0"/>
+        </a:xfrm>
+      </p:grpSpPr>
+      <p:sp>
+        <p:nvSpPr>
+          <p:cNvPr id="2" name="Titel 1"/>
+          <p:cNvSpPr>
+            <a:spLocks noGrp="1"/>
+          </p:cNvSpPr>
+          <p:nvPr>
+            <p:ph type="title"/>
+          </p:nvPr>
+        </p:nvSpPr>
+        <p:spPr/>
+        <p:txBody>
+          <a:bodyPr/>
+          <a:lstStyle/>
+          <a:p>
+            <a:r>
+              <a:rPr lang="en-US" smtClean="0"/>
+              <a:t>Tag 3-Vormittag: Anmerkungen</a:t>
+            </a:r>
+            <a:endParaRPr lang="en-US"/>
+          </a:p>
+        </p:txBody>
+      </p:sp>
+      <p:sp>
+        <p:nvSpPr>
+          <p:cNvPr id="3" name="Inhaltsplatzhalter 2"/>
+          <p:cNvSpPr>
+            <a:spLocks noGrp="1"/>
+          </p:cNvSpPr>
+          <p:nvPr>
+            <p:ph idx="1"/>
+          </p:nvPr>
+        </p:nvSpPr>
+        <p:spPr/>
+        <p:txBody>
+          <a:bodyPr/>
+          <a:lstStyle/>
+          <a:p>
+            <a:r>
               <a:rPr lang="en-US" b="1" smtClean="0"/>
               <a:t>Auf den Pool-PCs liegt ein relative aktueller Stand des Repositories</a:t>
             </a:r>
@@ -8552,10 +9010,17 @@
   <p:clrMapOvr>
     <a:masterClrMapping/>
   </p:clrMapOvr>
+  <p:timing>
+    <p:tnLst>
+      <p:par>
+        <p:cTn id="1" dur="indefinite" restart="never" nodeType="tmRoot"/>
+      </p:par>
+    </p:tnLst>
+  </p:timing>
 </p:sld>
 </file>
 
-<file path=ppt/slides/slide5.xml><?xml version="1.0" encoding="utf-8"?>
+<file path=ppt/slides/slide6.xml><?xml version="1.0" encoding="utf-8"?>
 <p:sld xmlns:a="http://schemas.openxmlformats.org/drawingml/2006/main" xmlns:r="http://schemas.openxmlformats.org/officeDocument/2006/relationships" xmlns:p="http://schemas.openxmlformats.org/presentationml/2006/main">
   <p:cSld>
     <p:spTree>
@@ -8943,7 +9408,7 @@
 </p:sld>
 </file>
 
-<file path=ppt/slides/slide6.xml><?xml version="1.0" encoding="utf-8"?>
+<file path=ppt/slides/slide7.xml><?xml version="1.0" encoding="utf-8"?>
 <p:sld xmlns:a="http://schemas.openxmlformats.org/drawingml/2006/main" xmlns:r="http://schemas.openxmlformats.org/officeDocument/2006/relationships" xmlns:p="http://schemas.openxmlformats.org/presentationml/2006/main">
   <p:cSld>
     <p:spTree>
@@ -9135,7 +9600,7 @@
 </p:sld>
 </file>
 
-<file path=ppt/slides/slide7.xml><?xml version="1.0" encoding="utf-8"?>
+<file path=ppt/slides/slide8.xml><?xml version="1.0" encoding="utf-8"?>
 <p:sld xmlns:a="http://schemas.openxmlformats.org/drawingml/2006/main" xmlns:r="http://schemas.openxmlformats.org/officeDocument/2006/relationships" xmlns:p="http://schemas.openxmlformats.org/presentationml/2006/main">
   <p:cSld>
     <p:spTree>

</xml_diff>

<commit_message>
Reorganization (swap advanced C++ part and embedded C part and move literals slide)
</commit_message>
<xml_diff>
--- a/2018/recap_and_warmup_slides.pptx
+++ b/2018/recap_and_warmup_slides.pptx
@@ -5,10 +5,10 @@
     <p:sldMasterId id="2147483650" r:id="rId1"/>
   </p:sldMasterIdLst>
   <p:notesMasterIdLst>
-    <p:notesMasterId r:id="rId10"/>
+    <p:notesMasterId r:id="rId11"/>
   </p:notesMasterIdLst>
   <p:handoutMasterIdLst>
-    <p:handoutMasterId r:id="rId11"/>
+    <p:handoutMasterId r:id="rId12"/>
   </p:handoutMasterIdLst>
   <p:sldIdLst>
     <p:sldId id="454" r:id="rId2"/>
@@ -17,8 +17,9 @@
     <p:sldId id="499" r:id="rId5"/>
     <p:sldId id="479" r:id="rId6"/>
     <p:sldId id="498" r:id="rId7"/>
-    <p:sldId id="481" r:id="rId8"/>
-    <p:sldId id="480" r:id="rId9"/>
+    <p:sldId id="500" r:id="rId8"/>
+    <p:sldId id="481" r:id="rId9"/>
+    <p:sldId id="480" r:id="rId10"/>
   </p:sldIdLst>
   <p:sldSz cx="9144000" cy="6858000" type="screen4x3"/>
   <p:notesSz cx="7099300" cy="10234613"/>
@@ -198,6 +199,7 @@
             <p14:sldId id="499"/>
             <p14:sldId id="479"/>
             <p14:sldId id="498"/>
+            <p14:sldId id="500"/>
             <p14:sldId id="481"/>
             <p14:sldId id="480"/>
           </p14:sldIdLst>
@@ -2653,7 +2655,7 @@
                 <a:latin typeface="Stafford" pitchFamily="2" charset="0"/>
               </a:rPr>
               <a:pPr eaLnBrk="1" hangingPunct="1"/>
-              <a:t>8</a:t>
+              <a:t>9</a:t>
             </a:fld>
             <a:endParaRPr lang="en-US" altLang="de-DE" smtClean="0">
               <a:solidFill>
@@ -7123,7 +7125,7 @@
           <a:graphicData uri="http://schemas.openxmlformats.org/presentationml/2006/ole">
             <mc:AlternateContent xmlns:mc="http://schemas.openxmlformats.org/markup-compatibility/2006">
               <mc:Choice xmlns:v="urn:schemas-microsoft-com:vml" Requires="v">
-                <p:oleObj spid="_x0000_s2044" r:id="rId16" imgW="1038370" imgH="980952" progId="">
+                <p:oleObj spid="_x0000_s2049" r:id="rId16" imgW="1038370" imgH="980952" progId="">
                   <p:embed/>
                 </p:oleObj>
               </mc:Choice>
@@ -7561,7 +7563,7 @@
                 </a:lnSpc>
                 <a:defRPr/>
               </a:pPr>
-              <a:t>2018-08-27</a:t>
+              <a:t>2018-08-28</a:t>
             </a:fld>
             <a:r>
               <a:rPr lang="en-GB" altLang="de-DE" sz="1000" smtClean="0">
@@ -8852,11 +8854,7 @@
           <a:p>
             <a:r>
               <a:rPr lang="en-US" smtClean="0"/>
-              <a:t>Tag </a:t>
-            </a:r>
-            <a:r>
-              <a:rPr lang="en-US" smtClean="0"/>
-              <a:t>3-Vormittag: Ankündigung</a:t>
+              <a:t>Tag 3-Vormittag: Ankündigung</a:t>
             </a:r>
             <a:endParaRPr lang="en-US" dirty="0"/>
           </a:p>
@@ -8896,7 +8894,6 @@
               <a:rPr lang="en-US" smtClean="0"/>
               <a:t>: Zusatzfragen</a:t>
             </a:r>
-            <a:endParaRPr lang="en-US" smtClean="0"/>
           </a:p>
           <a:p>
             <a:pPr marL="692150" lvl="1" indent="-342900">
@@ -8940,11 +8937,7 @@
             </a:r>
             <a:r>
               <a:rPr lang="en-US" b="1" smtClean="0"/>
-              <a:t>am </a:t>
-            </a:r>
-            <a:r>
-              <a:rPr lang="en-US" b="1" smtClean="0"/>
-              <a:t>Mittwoch</a:t>
+              <a:t>am Mittwoch</a:t>
             </a:r>
             <a:r>
               <a:rPr lang="en-US" smtClean="0"/>
@@ -8956,11 +8949,7 @@
             </a:r>
             <a:r>
               <a:rPr lang="en-US" smtClean="0"/>
-              <a:t>von </a:t>
-            </a:r>
-            <a:r>
-              <a:rPr lang="en-US" smtClean="0"/>
-              <a:t>Cypress</a:t>
+              <a:t>von Cypress</a:t>
             </a:r>
             <a:r>
               <a:rPr lang="en-US" dirty="0" smtClean="0"/>
@@ -9228,15 +9217,7 @@
           <a:p>
             <a:r>
               <a:rPr lang="en-US" smtClean="0"/>
-              <a:t>Tag </a:t>
-            </a:r>
-            <a:r>
-              <a:rPr lang="en-US" smtClean="0"/>
-              <a:t>3-Nachmittag: </a:t>
-            </a:r>
-            <a:r>
-              <a:rPr lang="en-US" smtClean="0"/>
-              <a:t>Anmerkungen</a:t>
+              <a:t>Tag 3-Nachmittag: Anmerkungen</a:t>
             </a:r>
             <a:endParaRPr lang="en-US"/>
           </a:p>
@@ -9278,7 +9259,23 @@
           <a:p>
             <a:r>
               <a:rPr lang="en-US" smtClean="0"/>
-              <a:t>Zum Aktualisieren und Verwenden:</a:t>
+              <a:t>Zum </a:t>
+            </a:r>
+            <a:r>
+              <a:rPr lang="en-US" b="1" smtClean="0"/>
+              <a:t>Aktualisieren</a:t>
+            </a:r>
+            <a:r>
+              <a:rPr lang="en-US" smtClean="0"/>
+              <a:t> und </a:t>
+            </a:r>
+            <a:r>
+              <a:rPr lang="en-US" b="1" smtClean="0"/>
+              <a:t>Verwenden</a:t>
+            </a:r>
+            <a:r>
+              <a:rPr lang="en-US" smtClean="0"/>
+              <a:t>:</a:t>
             </a:r>
           </a:p>
           <a:p>
@@ -9318,7 +9315,7 @@
               <a:rPr lang="en-US" smtClean="0">
                 <a:sym typeface="Wingdings" panose="05000000000000000000" pitchFamily="2" charset="2"/>
               </a:rPr>
-              <a:t>Dieses Repo wird erst f</a:t>
+              <a:t>Dieses Repo wird nur f</a:t>
             </a:r>
             <a:r>
               <a:rPr lang="de-DE" smtClean="0">
@@ -9400,6 +9397,938 @@
           <a:bodyPr/>
           <a:lstStyle/>
           <a:p>
+            <a:r>
+              <a:rPr lang="de-DE" altLang="de-DE"/>
+              <a:t>Tag </a:t>
+            </a:r>
+            <a:r>
+              <a:rPr lang="de-DE" altLang="de-DE" smtClean="0"/>
+              <a:t>4: Rule of Three</a:t>
+            </a:r>
+            <a:endParaRPr lang="en-US"/>
+          </a:p>
+        </p:txBody>
+      </p:sp>
+      <p:sp>
+        <p:nvSpPr>
+          <p:cNvPr id="3" name="Inhaltsplatzhalter 2"/>
+          <p:cNvSpPr>
+            <a:spLocks noGrp="1"/>
+          </p:cNvSpPr>
+          <p:nvPr>
+            <p:ph idx="1"/>
+          </p:nvPr>
+        </p:nvSpPr>
+        <p:spPr/>
+        <p:txBody>
+          <a:bodyPr>
+            <a:normAutofit/>
+          </a:bodyPr>
+          <a:lstStyle/>
+          <a:p>
+            <a:pPr eaLnBrk="1" hangingPunct="1">
+              <a:spcBef>
+                <a:spcPct val="0"/>
+              </a:spcBef>
+            </a:pPr>
+            <a:r>
+              <a:rPr lang="de-DE" altLang="de-DE">
+                <a:solidFill>
+                  <a:srgbClr val="000000"/>
+                </a:solidFill>
+                <a:latin typeface="Consolas" pitchFamily="49" charset="0"/>
+              </a:rPr>
+              <a:t>Floor::Floor(</a:t>
+            </a:r>
+          </a:p>
+          <a:p>
+            <a:pPr eaLnBrk="1" hangingPunct="1">
+              <a:spcBef>
+                <a:spcPct val="0"/>
+              </a:spcBef>
+            </a:pPr>
+            <a:r>
+              <a:rPr lang="de-DE" altLang="de-DE">
+                <a:solidFill>
+                  <a:srgbClr val="000000"/>
+                </a:solidFill>
+                <a:latin typeface="Consolas" pitchFamily="49" charset="0"/>
+              </a:rPr>
+              <a:t>      </a:t>
+            </a:r>
+            <a:r>
+              <a:rPr lang="de-DE" altLang="de-DE">
+                <a:solidFill>
+                  <a:srgbClr val="7F0055"/>
+                </a:solidFill>
+                <a:latin typeface="Consolas" pitchFamily="49" charset="0"/>
+              </a:rPr>
+              <a:t>std::string</a:t>
+            </a:r>
+            <a:r>
+              <a:rPr lang="de-DE" altLang="de-DE">
+                <a:solidFill>
+                  <a:srgbClr val="000000"/>
+                </a:solidFill>
+                <a:latin typeface="Consolas" pitchFamily="49" charset="0"/>
+              </a:rPr>
+              <a:t> label, </a:t>
+            </a:r>
+            <a:r>
+              <a:rPr lang="de-DE" altLang="de-DE">
+                <a:solidFill>
+                  <a:srgbClr val="7F0055"/>
+                </a:solidFill>
+                <a:latin typeface="Consolas" pitchFamily="49" charset="0"/>
+              </a:rPr>
+              <a:t>int</a:t>
+            </a:r>
+            <a:r>
+              <a:rPr lang="de-DE" altLang="de-DE">
+                <a:solidFill>
+                  <a:srgbClr val="000000"/>
+                </a:solidFill>
+                <a:latin typeface="Consolas" pitchFamily="49" charset="0"/>
+              </a:rPr>
+              <a:t> number):</a:t>
+            </a:r>
+          </a:p>
+          <a:p>
+            <a:pPr eaLnBrk="1" hangingPunct="1">
+              <a:spcBef>
+                <a:spcPct val="0"/>
+              </a:spcBef>
+            </a:pPr>
+            <a:r>
+              <a:rPr lang="de-DE" altLang="de-DE">
+                <a:solidFill>
+                  <a:srgbClr val="0000C0"/>
+                </a:solidFill>
+                <a:latin typeface="Consolas" pitchFamily="49" charset="0"/>
+              </a:rPr>
+              <a:t>    label</a:t>
+            </a:r>
+            <a:r>
+              <a:rPr lang="de-DE" altLang="de-DE">
+                <a:solidFill>
+                  <a:srgbClr val="000000"/>
+                </a:solidFill>
+                <a:latin typeface="Consolas" pitchFamily="49" charset="0"/>
+              </a:rPr>
+              <a:t>(label), </a:t>
+            </a:r>
+            <a:br>
+              <a:rPr lang="de-DE" altLang="de-DE">
+                <a:solidFill>
+                  <a:srgbClr val="000000"/>
+                </a:solidFill>
+                <a:latin typeface="Consolas" pitchFamily="49" charset="0"/>
+              </a:rPr>
+            </a:br>
+            <a:r>
+              <a:rPr lang="de-DE" altLang="de-DE">
+                <a:solidFill>
+                  <a:srgbClr val="000000"/>
+                </a:solidFill>
+                <a:latin typeface="Consolas" pitchFamily="49" charset="0"/>
+              </a:rPr>
+              <a:t>    </a:t>
+            </a:r>
+            <a:r>
+              <a:rPr lang="de-DE" altLang="de-DE">
+                <a:solidFill>
+                  <a:srgbClr val="0000C0"/>
+                </a:solidFill>
+                <a:latin typeface="Consolas" pitchFamily="49" charset="0"/>
+              </a:rPr>
+              <a:t>number</a:t>
+            </a:r>
+            <a:r>
+              <a:rPr lang="de-DE" altLang="de-DE">
+                <a:solidFill>
+                  <a:srgbClr val="000000"/>
+                </a:solidFill>
+                <a:latin typeface="Consolas" pitchFamily="49" charset="0"/>
+              </a:rPr>
+              <a:t>(number) {</a:t>
+            </a:r>
+            <a:br>
+              <a:rPr lang="de-DE" altLang="de-DE">
+                <a:solidFill>
+                  <a:srgbClr val="000000"/>
+                </a:solidFill>
+                <a:latin typeface="Consolas" pitchFamily="49" charset="0"/>
+              </a:rPr>
+            </a:br>
+            <a:r>
+              <a:rPr lang="de-DE" altLang="de-DE">
+                <a:solidFill>
+                  <a:srgbClr val="000000"/>
+                </a:solidFill>
+                <a:latin typeface="Consolas" pitchFamily="49" charset="0"/>
+              </a:rPr>
+              <a:t>  cout &lt;&lt; </a:t>
+            </a:r>
+            <a:r>
+              <a:rPr lang="de-DE" altLang="de-DE">
+                <a:solidFill>
+                  <a:srgbClr val="2A00FF"/>
+                </a:solidFill>
+                <a:latin typeface="Consolas" pitchFamily="49" charset="0"/>
+              </a:rPr>
+              <a:t>"Creating floor</a:t>
+            </a:r>
+            <a:r>
+              <a:rPr lang="de-DE" altLang="de-DE" smtClean="0">
+                <a:solidFill>
+                  <a:srgbClr val="2A00FF"/>
+                </a:solidFill>
+                <a:latin typeface="Consolas" pitchFamily="49" charset="0"/>
+              </a:rPr>
+              <a:t>" </a:t>
+            </a:r>
+            <a:r>
+              <a:rPr lang="de-DE" altLang="de-DE" smtClean="0">
+                <a:solidFill>
+                  <a:srgbClr val="000000"/>
+                </a:solidFill>
+                <a:latin typeface="Consolas" pitchFamily="49" charset="0"/>
+              </a:rPr>
+              <a:t>&lt;&lt; </a:t>
+            </a:r>
+            <a:r>
+              <a:rPr lang="de-DE" altLang="de-DE">
+                <a:solidFill>
+                  <a:srgbClr val="0000C0"/>
+                </a:solidFill>
+                <a:latin typeface="Consolas" pitchFamily="49" charset="0"/>
+              </a:rPr>
+              <a:t>number</a:t>
+            </a:r>
+            <a:r>
+              <a:rPr lang="de-DE" altLang="de-DE">
+                <a:solidFill>
+                  <a:srgbClr val="000000"/>
+                </a:solidFill>
+                <a:latin typeface="Consolas" pitchFamily="49" charset="0"/>
+              </a:rPr>
+              <a:t>  &lt;&lt; </a:t>
+            </a:r>
+            <a:r>
+              <a:rPr lang="de-DE" altLang="de-DE">
+                <a:solidFill>
+                  <a:srgbClr val="2A00FF"/>
+                </a:solidFill>
+                <a:latin typeface="Consolas" pitchFamily="49" charset="0"/>
+              </a:rPr>
+              <a:t>"]"</a:t>
+            </a:r>
+            <a:r>
+              <a:rPr lang="de-DE" altLang="de-DE">
+                <a:solidFill>
+                  <a:srgbClr val="000000"/>
+                </a:solidFill>
+                <a:latin typeface="Consolas" pitchFamily="49" charset="0"/>
+              </a:rPr>
+              <a:t> &lt;&lt; </a:t>
+            </a:r>
+            <a:r>
+              <a:rPr lang="de-DE" altLang="de-DE">
+                <a:solidFill>
+                  <a:srgbClr val="642880"/>
+                </a:solidFill>
+                <a:latin typeface="Consolas" pitchFamily="49" charset="0"/>
+              </a:rPr>
+              <a:t>endl</a:t>
+            </a:r>
+            <a:r>
+              <a:rPr lang="de-DE" altLang="de-DE">
+                <a:solidFill>
+                  <a:srgbClr val="000000"/>
+                </a:solidFill>
+                <a:latin typeface="Consolas" pitchFamily="49" charset="0"/>
+              </a:rPr>
+              <a:t>;</a:t>
+            </a:r>
+          </a:p>
+          <a:p>
+            <a:pPr eaLnBrk="1" hangingPunct="1">
+              <a:spcBef>
+                <a:spcPct val="0"/>
+              </a:spcBef>
+            </a:pPr>
+            <a:r>
+              <a:rPr lang="de-DE" altLang="de-DE">
+                <a:solidFill>
+                  <a:srgbClr val="000000"/>
+                </a:solidFill>
+                <a:latin typeface="Consolas" pitchFamily="49" charset="0"/>
+              </a:rPr>
+              <a:t>}</a:t>
+            </a:r>
+          </a:p>
+          <a:p>
+            <a:pPr eaLnBrk="1" hangingPunct="1">
+              <a:spcBef>
+                <a:spcPct val="0"/>
+              </a:spcBef>
+            </a:pPr>
+            <a:endParaRPr lang="de-DE" altLang="de-DE">
+              <a:latin typeface="Consolas" pitchFamily="49" charset="0"/>
+            </a:endParaRPr>
+          </a:p>
+          <a:p>
+            <a:pPr eaLnBrk="1" hangingPunct="1">
+              <a:spcBef>
+                <a:spcPct val="0"/>
+              </a:spcBef>
+            </a:pPr>
+            <a:r>
+              <a:rPr lang="de-DE" altLang="de-DE">
+                <a:solidFill>
+                  <a:srgbClr val="000000"/>
+                </a:solidFill>
+                <a:latin typeface="Consolas" pitchFamily="49" charset="0"/>
+              </a:rPr>
+              <a:t>Floor::Floor(</a:t>
+            </a:r>
+            <a:r>
+              <a:rPr lang="de-DE" altLang="de-DE">
+                <a:solidFill>
+                  <a:srgbClr val="7F0055"/>
+                </a:solidFill>
+                <a:latin typeface="Consolas" pitchFamily="49" charset="0"/>
+              </a:rPr>
+              <a:t>const</a:t>
+            </a:r>
+            <a:r>
+              <a:rPr lang="de-DE" altLang="de-DE">
+                <a:solidFill>
+                  <a:srgbClr val="000000"/>
+                </a:solidFill>
+                <a:latin typeface="Consolas" pitchFamily="49" charset="0"/>
+              </a:rPr>
+              <a:t> </a:t>
+            </a:r>
+            <a:r>
+              <a:rPr lang="de-DE" altLang="de-DE">
+                <a:solidFill>
+                  <a:srgbClr val="005032"/>
+                </a:solidFill>
+                <a:latin typeface="Consolas" pitchFamily="49" charset="0"/>
+              </a:rPr>
+              <a:t>Floor </a:t>
+            </a:r>
+            <a:r>
+              <a:rPr lang="de-DE" altLang="de-DE">
+                <a:solidFill>
+                  <a:srgbClr val="000000"/>
+                </a:solidFill>
+                <a:latin typeface="Consolas" pitchFamily="49" charset="0"/>
+              </a:rPr>
+              <a:t>&amp;floor):</a:t>
+            </a:r>
+          </a:p>
+          <a:p>
+            <a:pPr eaLnBrk="1" hangingPunct="1">
+              <a:spcBef>
+                <a:spcPct val="0"/>
+              </a:spcBef>
+            </a:pPr>
+            <a:r>
+              <a:rPr lang="de-DE" altLang="de-DE">
+                <a:solidFill>
+                  <a:srgbClr val="0000C0"/>
+                </a:solidFill>
+                <a:latin typeface="Consolas" pitchFamily="49" charset="0"/>
+              </a:rPr>
+              <a:t>    label</a:t>
+            </a:r>
+            <a:r>
+              <a:rPr lang="de-DE" altLang="de-DE">
+                <a:solidFill>
+                  <a:srgbClr val="000000"/>
+                </a:solidFill>
+                <a:latin typeface="Consolas" pitchFamily="49" charset="0"/>
+              </a:rPr>
+              <a:t>(floor.label), </a:t>
+            </a:r>
+            <a:br>
+              <a:rPr lang="de-DE" altLang="de-DE">
+                <a:solidFill>
+                  <a:srgbClr val="000000"/>
+                </a:solidFill>
+                <a:latin typeface="Consolas" pitchFamily="49" charset="0"/>
+              </a:rPr>
+            </a:br>
+            <a:r>
+              <a:rPr lang="de-DE" altLang="de-DE">
+                <a:solidFill>
+                  <a:srgbClr val="000000"/>
+                </a:solidFill>
+                <a:latin typeface="Consolas" pitchFamily="49" charset="0"/>
+              </a:rPr>
+              <a:t>    </a:t>
+            </a:r>
+            <a:r>
+              <a:rPr lang="de-DE" altLang="de-DE">
+                <a:solidFill>
+                  <a:srgbClr val="0000C0"/>
+                </a:solidFill>
+                <a:latin typeface="Consolas" pitchFamily="49" charset="0"/>
+              </a:rPr>
+              <a:t>number</a:t>
+            </a:r>
+            <a:r>
+              <a:rPr lang="de-DE" altLang="de-DE">
+                <a:solidFill>
+                  <a:srgbClr val="000000"/>
+                </a:solidFill>
+                <a:latin typeface="Consolas" pitchFamily="49" charset="0"/>
+              </a:rPr>
+              <a:t>(floor.</a:t>
+            </a:r>
+            <a:r>
+              <a:rPr lang="de-DE" altLang="de-DE">
+                <a:solidFill>
+                  <a:srgbClr val="0000C0"/>
+                </a:solidFill>
+                <a:latin typeface="Consolas" pitchFamily="49" charset="0"/>
+              </a:rPr>
+              <a:t>number+1</a:t>
+            </a:r>
+            <a:r>
+              <a:rPr lang="de-DE" altLang="de-DE">
+                <a:solidFill>
+                  <a:srgbClr val="000000"/>
+                </a:solidFill>
+                <a:latin typeface="Consolas" pitchFamily="49" charset="0"/>
+              </a:rPr>
+              <a:t>) {</a:t>
+            </a:r>
+            <a:br>
+              <a:rPr lang="de-DE" altLang="de-DE">
+                <a:solidFill>
+                  <a:srgbClr val="000000"/>
+                </a:solidFill>
+                <a:latin typeface="Consolas" pitchFamily="49" charset="0"/>
+              </a:rPr>
+            </a:br>
+            <a:r>
+              <a:rPr lang="de-DE" altLang="de-DE">
+                <a:solidFill>
+                  <a:srgbClr val="000000"/>
+                </a:solidFill>
+                <a:latin typeface="Consolas" pitchFamily="49" charset="0"/>
+              </a:rPr>
+              <a:t>  cout &lt;&lt; </a:t>
+            </a:r>
+            <a:r>
+              <a:rPr lang="de-DE" altLang="de-DE">
+                <a:solidFill>
+                  <a:srgbClr val="2A00FF"/>
+                </a:solidFill>
+                <a:latin typeface="Consolas" pitchFamily="49" charset="0"/>
+              </a:rPr>
+              <a:t>"Copying floor</a:t>
+            </a:r>
+            <a:r>
+              <a:rPr lang="de-DE" altLang="de-DE" smtClean="0">
+                <a:solidFill>
+                  <a:srgbClr val="2A00FF"/>
+                </a:solidFill>
+                <a:latin typeface="Consolas" pitchFamily="49" charset="0"/>
+              </a:rPr>
+              <a:t>" </a:t>
+            </a:r>
+            <a:r>
+              <a:rPr lang="de-DE" altLang="de-DE" smtClean="0">
+                <a:solidFill>
+                  <a:srgbClr val="000000"/>
+                </a:solidFill>
+                <a:latin typeface="Consolas" pitchFamily="49" charset="0"/>
+              </a:rPr>
+              <a:t>&lt;&lt; </a:t>
+            </a:r>
+            <a:r>
+              <a:rPr lang="de-DE" altLang="de-DE">
+                <a:solidFill>
+                  <a:srgbClr val="0000C0"/>
+                </a:solidFill>
+                <a:latin typeface="Consolas" pitchFamily="49" charset="0"/>
+              </a:rPr>
+              <a:t>floor.number</a:t>
+            </a:r>
+            <a:r>
+              <a:rPr lang="de-DE" altLang="de-DE">
+                <a:solidFill>
+                  <a:srgbClr val="000000"/>
+                </a:solidFill>
+                <a:latin typeface="Consolas" pitchFamily="49" charset="0"/>
+              </a:rPr>
+              <a:t>  &lt;&lt; </a:t>
+            </a:r>
+            <a:r>
+              <a:rPr lang="de-DE" altLang="de-DE">
+                <a:solidFill>
+                  <a:srgbClr val="2A00FF"/>
+                </a:solidFill>
+                <a:latin typeface="Consolas" pitchFamily="49" charset="0"/>
+              </a:rPr>
+              <a:t>"]"</a:t>
+            </a:r>
+            <a:r>
+              <a:rPr lang="de-DE" altLang="de-DE">
+                <a:solidFill>
+                  <a:srgbClr val="000000"/>
+                </a:solidFill>
+                <a:latin typeface="Consolas" pitchFamily="49" charset="0"/>
+              </a:rPr>
+              <a:t> &lt;&lt; </a:t>
+            </a:r>
+            <a:r>
+              <a:rPr lang="de-DE" altLang="de-DE">
+                <a:solidFill>
+                  <a:srgbClr val="642880"/>
+                </a:solidFill>
+                <a:latin typeface="Consolas" pitchFamily="49" charset="0"/>
+              </a:rPr>
+              <a:t>endl</a:t>
+            </a:r>
+            <a:r>
+              <a:rPr lang="de-DE" altLang="de-DE">
+                <a:solidFill>
+                  <a:srgbClr val="000000"/>
+                </a:solidFill>
+                <a:latin typeface="Consolas" pitchFamily="49" charset="0"/>
+              </a:rPr>
+              <a:t>;</a:t>
+            </a:r>
+          </a:p>
+          <a:p>
+            <a:pPr eaLnBrk="1" hangingPunct="1">
+              <a:spcBef>
+                <a:spcPct val="0"/>
+              </a:spcBef>
+            </a:pPr>
+            <a:r>
+              <a:rPr lang="de-DE" altLang="de-DE">
+                <a:solidFill>
+                  <a:srgbClr val="000000"/>
+                </a:solidFill>
+                <a:latin typeface="Consolas" pitchFamily="49" charset="0"/>
+              </a:rPr>
+              <a:t>}</a:t>
+            </a:r>
+          </a:p>
+          <a:p>
+            <a:pPr eaLnBrk="1" hangingPunct="1">
+              <a:spcBef>
+                <a:spcPct val="0"/>
+              </a:spcBef>
+            </a:pPr>
+            <a:endParaRPr lang="de-DE" altLang="de-DE">
+              <a:latin typeface="Consolas" pitchFamily="49" charset="0"/>
+            </a:endParaRPr>
+          </a:p>
+          <a:p>
+            <a:pPr eaLnBrk="1" hangingPunct="1">
+              <a:spcBef>
+                <a:spcPct val="0"/>
+              </a:spcBef>
+            </a:pPr>
+            <a:r>
+              <a:rPr lang="de-DE" altLang="de-DE">
+                <a:solidFill>
+                  <a:srgbClr val="000000"/>
+                </a:solidFill>
+                <a:latin typeface="Consolas" pitchFamily="49" charset="0"/>
+              </a:rPr>
+              <a:t>Floor::~Floor() {</a:t>
+            </a:r>
+          </a:p>
+          <a:p>
+            <a:pPr eaLnBrk="1" hangingPunct="1">
+              <a:spcBef>
+                <a:spcPct val="0"/>
+              </a:spcBef>
+            </a:pPr>
+            <a:r>
+              <a:rPr lang="de-DE" altLang="de-DE">
+                <a:solidFill>
+                  <a:srgbClr val="000000"/>
+                </a:solidFill>
+                <a:latin typeface="Consolas" pitchFamily="49" charset="0"/>
+              </a:rPr>
+              <a:t>  cout &lt;&lt; </a:t>
+            </a:r>
+            <a:r>
+              <a:rPr lang="de-DE" altLang="de-DE">
+                <a:solidFill>
+                  <a:srgbClr val="2A00FF"/>
+                </a:solidFill>
+                <a:latin typeface="Consolas" pitchFamily="49" charset="0"/>
+              </a:rPr>
+              <a:t>"Destroying floor </a:t>
+            </a:r>
+            <a:r>
+              <a:rPr lang="de-DE" altLang="de-DE" smtClean="0">
+                <a:solidFill>
+                  <a:srgbClr val="2A00FF"/>
+                </a:solidFill>
+                <a:latin typeface="Consolas" pitchFamily="49" charset="0"/>
+              </a:rPr>
+              <a:t>[" </a:t>
+            </a:r>
+            <a:r>
+              <a:rPr lang="de-DE" altLang="de-DE" smtClean="0">
+                <a:solidFill>
+                  <a:srgbClr val="000000"/>
+                </a:solidFill>
+                <a:latin typeface="Consolas" pitchFamily="49" charset="0"/>
+              </a:rPr>
+              <a:t>&lt;&lt; </a:t>
+            </a:r>
+            <a:r>
+              <a:rPr lang="de-DE" altLang="de-DE">
+                <a:solidFill>
+                  <a:srgbClr val="0000C0"/>
+                </a:solidFill>
+                <a:latin typeface="Consolas" pitchFamily="49" charset="0"/>
+              </a:rPr>
+              <a:t>number</a:t>
+            </a:r>
+            <a:r>
+              <a:rPr lang="de-DE" altLang="de-DE">
+                <a:solidFill>
+                  <a:srgbClr val="000000"/>
+                </a:solidFill>
+                <a:latin typeface="Consolas" pitchFamily="49" charset="0"/>
+              </a:rPr>
+              <a:t> &lt;&lt; </a:t>
+            </a:r>
+            <a:r>
+              <a:rPr lang="de-DE" altLang="de-DE">
+                <a:solidFill>
+                  <a:srgbClr val="2A00FF"/>
+                </a:solidFill>
+                <a:latin typeface="Consolas" pitchFamily="49" charset="0"/>
+              </a:rPr>
+              <a:t>"]"</a:t>
+            </a:r>
+            <a:r>
+              <a:rPr lang="de-DE" altLang="de-DE">
+                <a:solidFill>
+                  <a:srgbClr val="000000"/>
+                </a:solidFill>
+                <a:latin typeface="Consolas" pitchFamily="49" charset="0"/>
+              </a:rPr>
+              <a:t> &lt;&lt; </a:t>
+            </a:r>
+            <a:r>
+              <a:rPr lang="de-DE" altLang="de-DE">
+                <a:solidFill>
+                  <a:srgbClr val="642880"/>
+                </a:solidFill>
+                <a:latin typeface="Consolas" pitchFamily="49" charset="0"/>
+              </a:rPr>
+              <a:t>endl</a:t>
+            </a:r>
+            <a:r>
+              <a:rPr lang="de-DE" altLang="de-DE">
+                <a:solidFill>
+                  <a:srgbClr val="000000"/>
+                </a:solidFill>
+                <a:latin typeface="Consolas" pitchFamily="49" charset="0"/>
+              </a:rPr>
+              <a:t>;</a:t>
+            </a:r>
+          </a:p>
+          <a:p>
+            <a:pPr eaLnBrk="1" hangingPunct="1">
+              <a:spcBef>
+                <a:spcPct val="0"/>
+              </a:spcBef>
+            </a:pPr>
+            <a:r>
+              <a:rPr lang="de-DE" altLang="de-DE">
+                <a:solidFill>
+                  <a:srgbClr val="000000"/>
+                </a:solidFill>
+                <a:latin typeface="Consolas" pitchFamily="49" charset="0"/>
+              </a:rPr>
+              <a:t>}</a:t>
+            </a:r>
+          </a:p>
+        </p:txBody>
+      </p:sp>
+      <p:sp>
+        <p:nvSpPr>
+          <p:cNvPr id="4" name="Abgerundete rechteckige Legende 3"/>
+          <p:cNvSpPr/>
+          <p:nvPr/>
+        </p:nvSpPr>
+        <p:spPr>
+          <a:xfrm>
+            <a:off x="5232996" y="3068960"/>
+            <a:ext cx="3672408" cy="1440160"/>
+          </a:xfrm>
+          <a:prstGeom prst="wedgeRoundRectCallout">
+            <a:avLst>
+              <a:gd name="adj1" fmla="val -74347"/>
+              <a:gd name="adj2" fmla="val -11331"/>
+              <a:gd name="adj3" fmla="val 16667"/>
+            </a:avLst>
+          </a:prstGeom>
+          <a:solidFill>
+            <a:schemeClr val="tx1"/>
+          </a:solidFill>
+          <a:ln>
+            <a:solidFill>
+              <a:schemeClr val="tx1"/>
+            </a:solidFill>
+          </a:ln>
+        </p:spPr>
+        <p:style>
+          <a:lnRef idx="2">
+            <a:schemeClr val="accent1">
+              <a:shade val="50000"/>
+            </a:schemeClr>
+          </a:lnRef>
+          <a:fillRef idx="1">
+            <a:schemeClr val="accent1"/>
+          </a:fillRef>
+          <a:effectRef idx="0">
+            <a:schemeClr val="accent1"/>
+          </a:effectRef>
+          <a:fontRef idx="minor">
+            <a:schemeClr val="lt1"/>
+          </a:fontRef>
+        </p:style>
+        <p:txBody>
+          <a:bodyPr anchor="ctr"/>
+          <a:lstStyle/>
+          <a:p>
+            <a:pPr algn="l">
+              <a:defRPr/>
+            </a:pPr>
+            <a:r>
+              <a:rPr lang="de-DE" b="1" smtClean="0">
+                <a:solidFill>
+                  <a:schemeClr val="bg1"/>
+                </a:solidFill>
+              </a:rPr>
+              <a:t>Was fehlt? Vergleiche:</a:t>
+            </a:r>
+            <a:r>
+              <a:rPr lang="de-DE" smtClean="0">
+                <a:solidFill>
+                  <a:schemeClr val="bg1"/>
+                </a:solidFill>
+              </a:rPr>
+              <a:t/>
+            </a:r>
+            <a:br>
+              <a:rPr lang="de-DE" smtClean="0">
+                <a:solidFill>
+                  <a:schemeClr val="bg1"/>
+                </a:solidFill>
+              </a:rPr>
+            </a:br>
+            <a:r>
+              <a:rPr lang="de-DE" smtClean="0">
+                <a:solidFill>
+                  <a:schemeClr val="bg1"/>
+                </a:solidFill>
+              </a:rPr>
+              <a:t>Floor f1("f1", 1);</a:t>
+            </a:r>
+          </a:p>
+          <a:p>
+            <a:pPr algn="l">
+              <a:defRPr/>
+            </a:pPr>
+            <a:r>
+              <a:rPr lang="de-DE" smtClean="0">
+                <a:solidFill>
+                  <a:schemeClr val="bg1"/>
+                </a:solidFill>
+                <a:latin typeface="Consolas" panose="020B0609020204030204" pitchFamily="49" charset="0"/>
+                <a:cs typeface="Consolas" panose="020B0609020204030204" pitchFamily="49" charset="0"/>
+              </a:rPr>
+              <a:t>Floor f2 = f1;</a:t>
+            </a:r>
+          </a:p>
+          <a:p>
+            <a:pPr algn="l">
+              <a:defRPr/>
+            </a:pPr>
+            <a:r>
+              <a:rPr lang="de-DE" smtClean="0">
+                <a:solidFill>
+                  <a:schemeClr val="bg1"/>
+                </a:solidFill>
+                <a:latin typeface="Consolas" panose="020B0609020204030204" pitchFamily="49" charset="0"/>
+                <a:cs typeface="Consolas" panose="020B0609020204030204" pitchFamily="49" charset="0"/>
+              </a:rPr>
+              <a:t>Floor f3("f3", 3);</a:t>
+            </a:r>
+          </a:p>
+          <a:p>
+            <a:pPr algn="l">
+              <a:defRPr/>
+            </a:pPr>
+            <a:r>
+              <a:rPr lang="de-DE" smtClean="0">
+                <a:solidFill>
+                  <a:schemeClr val="bg1"/>
+                </a:solidFill>
+                <a:latin typeface="Consolas" panose="020B0609020204030204" pitchFamily="49" charset="0"/>
+                <a:cs typeface="Consolas" panose="020B0609020204030204" pitchFamily="49" charset="0"/>
+              </a:rPr>
+              <a:t>f3 = f1;</a:t>
+            </a:r>
+            <a:endParaRPr lang="de-DE">
+              <a:solidFill>
+                <a:schemeClr val="bg1"/>
+              </a:solidFill>
+              <a:latin typeface="Consolas" panose="020B0609020204030204" pitchFamily="49" charset="0"/>
+              <a:cs typeface="Consolas" panose="020B0609020204030204" pitchFamily="49" charset="0"/>
+            </a:endParaRPr>
+          </a:p>
+        </p:txBody>
+      </p:sp>
+    </p:spTree>
+    <p:extLst>
+      <p:ext uri="{BB962C8B-B14F-4D97-AF65-F5344CB8AC3E}">
+        <p14:creationId xmlns:p14="http://schemas.microsoft.com/office/powerpoint/2010/main" val="875996084"/>
+      </p:ext>
+    </p:extLst>
+  </p:cSld>
+  <p:clrMapOvr>
+    <a:masterClrMapping/>
+  </p:clrMapOvr>
+  <p:timing>
+    <p:tnLst>
+      <p:par>
+        <p:cTn id="1" dur="indefinite" restart="never" nodeType="tmRoot">
+          <p:childTnLst>
+            <p:seq concurrent="1" nextAc="seek">
+              <p:cTn id="2" dur="indefinite" nodeType="mainSeq">
+                <p:childTnLst>
+                  <p:par>
+                    <p:cTn id="3" fill="hold">
+                      <p:stCondLst>
+                        <p:cond delay="indefinite"/>
+                      </p:stCondLst>
+                      <p:childTnLst>
+                        <p:par>
+                          <p:cTn id="4" fill="hold">
+                            <p:stCondLst>
+                              <p:cond delay="0"/>
+                            </p:stCondLst>
+                            <p:childTnLst>
+                              <p:par>
+                                <p:cTn id="5" presetID="10" presetClass="entr" presetSubtype="0" fill="hold" grpId="0" nodeType="clickEffect">
+                                  <p:stCondLst>
+                                    <p:cond delay="0"/>
+                                  </p:stCondLst>
+                                  <p:childTnLst>
+                                    <p:set>
+                                      <p:cBhvr>
+                                        <p:cTn id="6" dur="1" fill="hold">
+                                          <p:stCondLst>
+                                            <p:cond delay="0"/>
+                                          </p:stCondLst>
+                                        </p:cTn>
+                                        <p:tgtEl>
+                                          <p:spTgt spid="4"/>
+                                        </p:tgtEl>
+                                        <p:attrNameLst>
+                                          <p:attrName>style.visibility</p:attrName>
+                                        </p:attrNameLst>
+                                      </p:cBhvr>
+                                      <p:to>
+                                        <p:strVal val="visible"/>
+                                      </p:to>
+                                    </p:set>
+                                    <p:animEffect transition="in" filter="fade">
+                                      <p:cBhvr>
+                                        <p:cTn id="7" dur="500"/>
+                                        <p:tgtEl>
+                                          <p:spTgt spid="4"/>
+                                        </p:tgtEl>
+                                      </p:cBhvr>
+                                    </p:animEffect>
+                                  </p:childTnLst>
+                                </p:cTn>
+                              </p:par>
+                            </p:childTnLst>
+                          </p:cTn>
+                        </p:par>
+                      </p:childTnLst>
+                    </p:cTn>
+                  </p:par>
+                </p:childTnLst>
+              </p:cTn>
+              <p:prevCondLst>
+                <p:cond evt="onPrev" delay="0">
+                  <p:tgtEl>
+                    <p:sldTgt/>
+                  </p:tgtEl>
+                </p:cond>
+              </p:prevCondLst>
+              <p:nextCondLst>
+                <p:cond evt="onNext" delay="0">
+                  <p:tgtEl>
+                    <p:sldTgt/>
+                  </p:tgtEl>
+                </p:cond>
+              </p:nextCondLst>
+            </p:seq>
+          </p:childTnLst>
+        </p:cTn>
+      </p:par>
+    </p:tnLst>
+    <p:bldLst>
+      <p:bldP spid="4" grpId="0" animBg="1"/>
+    </p:bldLst>
+  </p:timing>
+</p:sld>
+</file>
+
+<file path=ppt/slides/slide8.xml><?xml version="1.0" encoding="utf-8"?>
+<p:sld xmlns:a="http://schemas.openxmlformats.org/drawingml/2006/main" xmlns:r="http://schemas.openxmlformats.org/officeDocument/2006/relationships" xmlns:p="http://schemas.openxmlformats.org/presentationml/2006/main">
+  <p:cSld>
+    <p:spTree>
+      <p:nvGrpSpPr>
+        <p:cNvPr id="1" name=""/>
+        <p:cNvGrpSpPr/>
+        <p:nvPr/>
+      </p:nvGrpSpPr>
+      <p:grpSpPr>
+        <a:xfrm>
+          <a:off x="0" y="0"/>
+          <a:ext cx="0" cy="0"/>
+          <a:chOff x="0" y="0"/>
+          <a:chExt cx="0" cy="0"/>
+        </a:xfrm>
+      </p:grpSpPr>
+      <p:sp>
+        <p:nvSpPr>
+          <p:cNvPr id="2" name="Titel 1"/>
+          <p:cNvSpPr>
+            <a:spLocks noGrp="1"/>
+          </p:cNvSpPr>
+          <p:nvPr>
+            <p:ph type="title"/>
+          </p:nvPr>
+        </p:nvSpPr>
+        <p:spPr/>
+        <p:txBody>
+          <a:bodyPr/>
+          <a:lstStyle/>
+          <a:p>
             <a:pPr>
               <a:tabLst>
                 <a:tab pos="2155825" algn="l"/>
@@ -9407,11 +10336,11 @@
             </a:pPr>
             <a:r>
               <a:rPr lang="de-DE" altLang="de-DE"/>
-              <a:t>Tag </a:t>
+              <a:t>Tag 4</a:t>
             </a:r>
             <a:r>
               <a:rPr lang="de-DE" altLang="de-DE" smtClean="0"/>
-              <a:t>5: </a:t>
+              <a:t>: </a:t>
             </a:r>
             <a:r>
               <a:rPr lang="en-US"/>
@@ -9560,7 +10489,7 @@
 </p:sld>
 </file>
 
-<file path=ppt/slides/slide8.xml><?xml version="1.0" encoding="utf-8"?>
+<file path=ppt/slides/slide9.xml><?xml version="1.0" encoding="utf-8"?>
 <p:sld xmlns:a="http://schemas.openxmlformats.org/drawingml/2006/main" xmlns:r="http://schemas.openxmlformats.org/officeDocument/2006/relationships" xmlns:p="http://schemas.openxmlformats.org/presentationml/2006/main">
   <p:cSld>
     <p:spTree>
@@ -9594,15 +10523,7 @@
           <a:p>
             <a:r>
               <a:rPr lang="de-DE" altLang="de-DE" smtClean="0"/>
-              <a:t>Tag </a:t>
-            </a:r>
-            <a:r>
-              <a:rPr lang="de-DE" altLang="de-DE" smtClean="0"/>
-              <a:t>5: </a:t>
-            </a:r>
-            <a:r>
-              <a:rPr lang="de-DE" altLang="de-DE" smtClean="0"/>
-              <a:t>Evaluationsfragen</a:t>
+              <a:t>Tag 5: Evaluationsfragen</a:t>
             </a:r>
             <a:endParaRPr lang="de-DE" altLang="de-DE" dirty="0" smtClean="0"/>
           </a:p>

</xml_diff>

<commit_message>
Add docu to C files and update evaluation slide
</commit_message>
<xml_diff>
--- a/2018/recap_and_warmup_slides.pptx
+++ b/2018/recap_and_warmup_slides.pptx
@@ -7125,7 +7125,7 @@
           <a:graphicData uri="http://schemas.openxmlformats.org/presentationml/2006/ole">
             <mc:AlternateContent xmlns:mc="http://schemas.openxmlformats.org/markup-compatibility/2006">
               <mc:Choice xmlns:v="urn:schemas-microsoft-com:vml" Requires="v">
-                <p:oleObj spid="_x0000_s2049" r:id="rId16" imgW="1038370" imgH="980952" progId="">
+                <p:oleObj spid="_x0000_s2051" r:id="rId16" imgW="1038370" imgH="980952" progId="">
                   <p:embed/>
                 </p:oleObj>
               </mc:Choice>
@@ -7563,7 +7563,7 @@
                 </a:lnSpc>
                 <a:defRPr/>
               </a:pPr>
-              <a:t>2018-08-28</a:t>
+              <a:t>2018-08-29</a:t>
             </a:fld>
             <a:r>
               <a:rPr lang="en-GB" altLang="de-DE" sz="1000" smtClean="0">
@@ -10568,13 +10568,16 @@
             </a:r>
           </a:p>
           <a:p>
-            <a:pPr marL="523875" lvl="1" indent="-342900">
-              <a:buFont typeface="+mj-lt"/>
-              <a:buAutoNum type="arabicPeriod"/>
+            <a:pPr marL="180975" lvl="1" indent="0">
+              <a:buNone/>
             </a:pPr>
             <a:r>
               <a:rPr lang="en-US" smtClean="0"/>
-              <a:t>Stärkeren Fokus auf C++(11) legen (= weniger Fokus auf C)?</a:t>
+              <a:t>5.1 Stärkeren </a:t>
+            </a:r>
+            <a:r>
+              <a:rPr lang="en-US" smtClean="0"/>
+              <a:t>Fokus auf C++(11) legen (= weniger Fokus auf C)?</a:t>
             </a:r>
           </a:p>
           <a:p>
@@ -10599,13 +10602,16 @@
             </a:r>
           </a:p>
           <a:p>
-            <a:pPr marL="523875" lvl="1" indent="-342900">
-              <a:buFont typeface="+mj-lt"/>
-              <a:buAutoNum type="arabicPeriod"/>
+            <a:pPr marL="180975" lvl="1" indent="0">
+              <a:buNone/>
             </a:pPr>
             <a:r>
               <a:rPr lang="en-US" smtClean="0"/>
-              <a:t>Ich hatte vorher keine C++-Kenntnisse</a:t>
+              <a:t>5.2 Ich </a:t>
+            </a:r>
+            <a:r>
+              <a:rPr lang="en-US" smtClean="0"/>
+              <a:t>hatte vorher keine C++-Kenntnisse</a:t>
             </a:r>
           </a:p>
           <a:p>
@@ -10616,7 +10622,15 @@
             </a:pPr>
             <a:r>
               <a:rPr lang="en-US" smtClean="0"/>
-              <a:t>"trifft zu" 	= Keine Vorkenntnisse</a:t>
+              <a:t>"trifft zu" 	= </a:t>
+            </a:r>
+            <a:r>
+              <a:rPr lang="en-US" smtClean="0"/>
+              <a:t>keine </a:t>
+            </a:r>
+            <a:r>
+              <a:rPr lang="en-US" smtClean="0"/>
+              <a:t>Vorkenntnisse</a:t>
             </a:r>
           </a:p>
           <a:p>
@@ -10627,7 +10641,15 @@
             </a:pPr>
             <a:r>
               <a:rPr lang="en-US" smtClean="0"/>
-              <a:t>"Mitte"	= Eigene kleinere Projekte</a:t>
+              <a:t>"Mitte"	= </a:t>
+            </a:r>
+            <a:r>
+              <a:rPr lang="en-US" smtClean="0"/>
+              <a:t>eigene </a:t>
+            </a:r>
+            <a:r>
+              <a:rPr lang="en-US" smtClean="0"/>
+              <a:t>kleinere Projekte</a:t>
             </a:r>
           </a:p>
           <a:p>
@@ -10638,8 +10660,13 @@
             </a:pPr>
             <a:r>
               <a:rPr lang="en-US" smtClean="0"/>
-              <a:t>"trifft nicht zu" 	= Sehr erfahrener C++-Programmierer</a:t>
-            </a:r>
+              <a:t>"trifft nicht zu" 	= </a:t>
+            </a:r>
+            <a:r>
+              <a:rPr lang="en-US" smtClean="0"/>
+              <a:t>sehr erfahrene(r) Programmierer(in)</a:t>
+            </a:r>
+            <a:endParaRPr lang="en-US" smtClean="0"/>
           </a:p>
           <a:p>
             <a:pPr marL="350838" lvl="2" indent="0">

</xml_diff>

<commit_message>
Improve explanations how to compile using Codelite icons
</commit_message>
<xml_diff>
--- a/2018/recap_and_warmup_slides.pptx
+++ b/2018/recap_and_warmup_slides.pptx
@@ -5,10 +5,10 @@
     <p:sldMasterId id="2147483650" r:id="rId1"/>
   </p:sldMasterIdLst>
   <p:notesMasterIdLst>
-    <p:notesMasterId r:id="rId11"/>
+    <p:notesMasterId r:id="rId16"/>
   </p:notesMasterIdLst>
   <p:handoutMasterIdLst>
-    <p:handoutMasterId r:id="rId12"/>
+    <p:handoutMasterId r:id="rId17"/>
   </p:handoutMasterIdLst>
   <p:sldIdLst>
     <p:sldId id="454" r:id="rId2"/>
@@ -20,6 +20,11 @@
     <p:sldId id="500" r:id="rId8"/>
     <p:sldId id="481" r:id="rId9"/>
     <p:sldId id="480" r:id="rId10"/>
+    <p:sldId id="501" r:id="rId11"/>
+    <p:sldId id="502" r:id="rId12"/>
+    <p:sldId id="503" r:id="rId13"/>
+    <p:sldId id="504" r:id="rId14"/>
+    <p:sldId id="505" r:id="rId15"/>
   </p:sldIdLst>
   <p:sldSz cx="9144000" cy="6858000" type="screen4x3"/>
   <p:notesSz cx="7099300" cy="10234613"/>
@@ -202,6 +207,11 @@
             <p14:sldId id="500"/>
             <p14:sldId id="481"/>
             <p14:sldId id="480"/>
+            <p14:sldId id="501"/>
+            <p14:sldId id="502"/>
+            <p14:sldId id="503"/>
+            <p14:sldId id="504"/>
+            <p14:sldId id="505"/>
           </p14:sldIdLst>
         </p14:section>
       </p14:sectionLst>
@@ -2679,6 +2689,826 @@
 </p:notes>
 </file>
 
+<file path=ppt/notesSlides/notesSlide2.xml><?xml version="1.0" encoding="utf-8"?>
+<p:notes xmlns:a="http://schemas.openxmlformats.org/drawingml/2006/main" xmlns:r="http://schemas.openxmlformats.org/officeDocument/2006/relationships" xmlns:p="http://schemas.openxmlformats.org/presentationml/2006/main">
+  <p:cSld>
+    <p:spTree>
+      <p:nvGrpSpPr>
+        <p:cNvPr id="1" name=""/>
+        <p:cNvGrpSpPr/>
+        <p:nvPr/>
+      </p:nvGrpSpPr>
+      <p:grpSpPr>
+        <a:xfrm>
+          <a:off x="0" y="0"/>
+          <a:ext cx="0" cy="0"/>
+          <a:chOff x="0" y="0"/>
+          <a:chExt cx="0" cy="0"/>
+        </a:xfrm>
+      </p:grpSpPr>
+      <p:sp>
+        <p:nvSpPr>
+          <p:cNvPr id="53250" name="Folienbildplatzhalter 1"/>
+          <p:cNvSpPr>
+            <a:spLocks noGrp="1" noRot="1" noChangeAspect="1" noTextEdit="1"/>
+          </p:cNvSpPr>
+          <p:nvPr>
+            <p:ph type="sldImg"/>
+          </p:nvPr>
+        </p:nvSpPr>
+        <p:spPr>
+          <a:ln/>
+        </p:spPr>
+      </p:sp>
+      <p:sp>
+        <p:nvSpPr>
+          <p:cNvPr id="53251" name="Notizenplatzhalter 2"/>
+          <p:cNvSpPr>
+            <a:spLocks noGrp="1"/>
+          </p:cNvSpPr>
+          <p:nvPr>
+            <p:ph type="body" idx="1"/>
+          </p:nvPr>
+        </p:nvSpPr>
+        <p:spPr>
+          <a:noFill/>
+          <a:extLst>
+            <a:ext uri="{909E8E84-426E-40DD-AFC4-6F175D3DCCD1}">
+              <a14:hiddenFill xmlns:a14="http://schemas.microsoft.com/office/drawing/2010/main">
+                <a:solidFill>
+                  <a:srgbClr val="FFFFFF"/>
+                </a:solidFill>
+              </a14:hiddenFill>
+            </a:ext>
+            <a:ext uri="{91240B29-F687-4F45-9708-019B960494DF}">
+              <a14:hiddenLine xmlns:a14="http://schemas.microsoft.com/office/drawing/2010/main" w="9525">
+                <a:solidFill>
+                  <a:srgbClr val="000000"/>
+                </a:solidFill>
+                <a:miter lim="800000"/>
+                <a:headEnd/>
+                <a:tailEnd/>
+              </a14:hiddenLine>
+            </a:ext>
+          </a:extLst>
+        </p:spPr>
+        <p:txBody>
+          <a:bodyPr/>
+          <a:lstStyle/>
+          <a:p>
+            <a:pPr marL="0" indent="0">
+              <a:buFontTx/>
+              <a:buNone/>
+            </a:pPr>
+            <a:endParaRPr lang="de-DE" altLang="de-DE" b="1" i="0" dirty="0" smtClean="0">
+              <a:latin typeface="Times New Roman" pitchFamily="16" charset="0"/>
+            </a:endParaRPr>
+          </a:p>
+        </p:txBody>
+      </p:sp>
+      <p:sp>
+        <p:nvSpPr>
+          <p:cNvPr id="53252" name="Datumsplatzhalter 3"/>
+          <p:cNvSpPr>
+            <a:spLocks noGrp="1"/>
+          </p:cNvSpPr>
+          <p:nvPr>
+            <p:ph type="dt" sz="quarter"/>
+          </p:nvPr>
+        </p:nvSpPr>
+        <p:spPr>
+          <a:noFill/>
+          <a:extLst>
+            <a:ext uri="{909E8E84-426E-40DD-AFC4-6F175D3DCCD1}">
+              <a14:hiddenFill xmlns:a14="http://schemas.microsoft.com/office/drawing/2010/main">
+                <a:solidFill>
+                  <a:srgbClr val="FFFFFF"/>
+                </a:solidFill>
+              </a14:hiddenFill>
+            </a:ext>
+            <a:ext uri="{91240B29-F687-4F45-9708-019B960494DF}">
+              <a14:hiddenLine xmlns:a14="http://schemas.microsoft.com/office/drawing/2010/main" w="9525">
+                <a:solidFill>
+                  <a:srgbClr val="000000"/>
+                </a:solidFill>
+                <a:miter lim="800000"/>
+                <a:headEnd/>
+                <a:tailEnd/>
+              </a14:hiddenLine>
+            </a:ext>
+          </a:extLst>
+        </p:spPr>
+        <p:txBody>
+          <a:bodyPr/>
+          <a:lstStyle>
+            <a:lvl1pPr defTabSz="463550" eaLnBrk="0" hangingPunct="0">
+              <a:tabLst>
+                <a:tab pos="746125" algn="l"/>
+                <a:tab pos="1492250" algn="l"/>
+              </a:tabLst>
+              <a:defRPr>
+                <a:solidFill>
+                  <a:schemeClr val="tx1"/>
+                </a:solidFill>
+                <a:latin typeface="Arial" charset="0"/>
+                <a:ea typeface="Lucida Sans Unicode" pitchFamily="34" charset="0"/>
+                <a:cs typeface="Lucida Sans Unicode" pitchFamily="34" charset="0"/>
+              </a:defRPr>
+            </a:lvl1pPr>
+            <a:lvl2pPr marL="742950" indent="-285750" defTabSz="463550" eaLnBrk="0" hangingPunct="0">
+              <a:tabLst>
+                <a:tab pos="746125" algn="l"/>
+                <a:tab pos="1492250" algn="l"/>
+              </a:tabLst>
+              <a:defRPr>
+                <a:solidFill>
+                  <a:schemeClr val="tx1"/>
+                </a:solidFill>
+                <a:latin typeface="Arial" charset="0"/>
+                <a:ea typeface="Lucida Sans Unicode" pitchFamily="34" charset="0"/>
+                <a:cs typeface="Lucida Sans Unicode" pitchFamily="34" charset="0"/>
+              </a:defRPr>
+            </a:lvl2pPr>
+            <a:lvl3pPr marL="1143000" indent="-228600" defTabSz="463550" eaLnBrk="0" hangingPunct="0">
+              <a:tabLst>
+                <a:tab pos="746125" algn="l"/>
+                <a:tab pos="1492250" algn="l"/>
+              </a:tabLst>
+              <a:defRPr>
+                <a:solidFill>
+                  <a:schemeClr val="tx1"/>
+                </a:solidFill>
+                <a:latin typeface="Arial" charset="0"/>
+                <a:ea typeface="Lucida Sans Unicode" pitchFamily="34" charset="0"/>
+                <a:cs typeface="Lucida Sans Unicode" pitchFamily="34" charset="0"/>
+              </a:defRPr>
+            </a:lvl3pPr>
+            <a:lvl4pPr marL="1600200" indent="-228600" defTabSz="463550" eaLnBrk="0" hangingPunct="0">
+              <a:tabLst>
+                <a:tab pos="746125" algn="l"/>
+                <a:tab pos="1492250" algn="l"/>
+              </a:tabLst>
+              <a:defRPr>
+                <a:solidFill>
+                  <a:schemeClr val="tx1"/>
+                </a:solidFill>
+                <a:latin typeface="Arial" charset="0"/>
+                <a:ea typeface="Lucida Sans Unicode" pitchFamily="34" charset="0"/>
+                <a:cs typeface="Lucida Sans Unicode" pitchFamily="34" charset="0"/>
+              </a:defRPr>
+            </a:lvl4pPr>
+            <a:lvl5pPr marL="2057400" indent="-228600" defTabSz="463550" eaLnBrk="0" hangingPunct="0">
+              <a:tabLst>
+                <a:tab pos="746125" algn="l"/>
+                <a:tab pos="1492250" algn="l"/>
+              </a:tabLst>
+              <a:defRPr>
+                <a:solidFill>
+                  <a:schemeClr val="tx1"/>
+                </a:solidFill>
+                <a:latin typeface="Arial" charset="0"/>
+                <a:ea typeface="Lucida Sans Unicode" pitchFamily="34" charset="0"/>
+                <a:cs typeface="Lucida Sans Unicode" pitchFamily="34" charset="0"/>
+              </a:defRPr>
+            </a:lvl5pPr>
+            <a:lvl6pPr marL="2514600" indent="-228600" algn="ctr" defTabSz="463550" eaLnBrk="0" fontAlgn="base" hangingPunct="0">
+              <a:lnSpc>
+                <a:spcPct val="93000"/>
+              </a:lnSpc>
+              <a:spcBef>
+                <a:spcPct val="0"/>
+              </a:spcBef>
+              <a:spcAft>
+                <a:spcPct val="0"/>
+              </a:spcAft>
+              <a:buClr>
+                <a:srgbClr val="000000"/>
+              </a:buClr>
+              <a:buSzPct val="100000"/>
+              <a:buFont typeface="Arial" charset="0"/>
+              <a:tabLst>
+                <a:tab pos="746125" algn="l"/>
+                <a:tab pos="1492250" algn="l"/>
+              </a:tabLst>
+              <a:defRPr>
+                <a:solidFill>
+                  <a:schemeClr val="tx1"/>
+                </a:solidFill>
+                <a:latin typeface="Arial" charset="0"/>
+                <a:ea typeface="Lucida Sans Unicode" pitchFamily="34" charset="0"/>
+                <a:cs typeface="Lucida Sans Unicode" pitchFamily="34" charset="0"/>
+              </a:defRPr>
+            </a:lvl6pPr>
+            <a:lvl7pPr marL="2971800" indent="-228600" algn="ctr" defTabSz="463550" eaLnBrk="0" fontAlgn="base" hangingPunct="0">
+              <a:lnSpc>
+                <a:spcPct val="93000"/>
+              </a:lnSpc>
+              <a:spcBef>
+                <a:spcPct val="0"/>
+              </a:spcBef>
+              <a:spcAft>
+                <a:spcPct val="0"/>
+              </a:spcAft>
+              <a:buClr>
+                <a:srgbClr val="000000"/>
+              </a:buClr>
+              <a:buSzPct val="100000"/>
+              <a:buFont typeface="Arial" charset="0"/>
+              <a:tabLst>
+                <a:tab pos="746125" algn="l"/>
+                <a:tab pos="1492250" algn="l"/>
+              </a:tabLst>
+              <a:defRPr>
+                <a:solidFill>
+                  <a:schemeClr val="tx1"/>
+                </a:solidFill>
+                <a:latin typeface="Arial" charset="0"/>
+                <a:ea typeface="Lucida Sans Unicode" pitchFamily="34" charset="0"/>
+                <a:cs typeface="Lucida Sans Unicode" pitchFamily="34" charset="0"/>
+              </a:defRPr>
+            </a:lvl7pPr>
+            <a:lvl8pPr marL="3429000" indent="-228600" algn="ctr" defTabSz="463550" eaLnBrk="0" fontAlgn="base" hangingPunct="0">
+              <a:lnSpc>
+                <a:spcPct val="93000"/>
+              </a:lnSpc>
+              <a:spcBef>
+                <a:spcPct val="0"/>
+              </a:spcBef>
+              <a:spcAft>
+                <a:spcPct val="0"/>
+              </a:spcAft>
+              <a:buClr>
+                <a:srgbClr val="000000"/>
+              </a:buClr>
+              <a:buSzPct val="100000"/>
+              <a:buFont typeface="Arial" charset="0"/>
+              <a:tabLst>
+                <a:tab pos="746125" algn="l"/>
+                <a:tab pos="1492250" algn="l"/>
+              </a:tabLst>
+              <a:defRPr>
+                <a:solidFill>
+                  <a:schemeClr val="tx1"/>
+                </a:solidFill>
+                <a:latin typeface="Arial" charset="0"/>
+                <a:ea typeface="Lucida Sans Unicode" pitchFamily="34" charset="0"/>
+                <a:cs typeface="Lucida Sans Unicode" pitchFamily="34" charset="0"/>
+              </a:defRPr>
+            </a:lvl8pPr>
+            <a:lvl9pPr marL="3886200" indent="-228600" algn="ctr" defTabSz="463550" eaLnBrk="0" fontAlgn="base" hangingPunct="0">
+              <a:lnSpc>
+                <a:spcPct val="93000"/>
+              </a:lnSpc>
+              <a:spcBef>
+                <a:spcPct val="0"/>
+              </a:spcBef>
+              <a:spcAft>
+                <a:spcPct val="0"/>
+              </a:spcAft>
+              <a:buClr>
+                <a:srgbClr val="000000"/>
+              </a:buClr>
+              <a:buSzPct val="100000"/>
+              <a:buFont typeface="Arial" charset="0"/>
+              <a:tabLst>
+                <a:tab pos="746125" algn="l"/>
+                <a:tab pos="1492250" algn="l"/>
+              </a:tabLst>
+              <a:defRPr>
+                <a:solidFill>
+                  <a:schemeClr val="tx1"/>
+                </a:solidFill>
+                <a:latin typeface="Arial" charset="0"/>
+                <a:ea typeface="Lucida Sans Unicode" pitchFamily="34" charset="0"/>
+                <a:cs typeface="Lucida Sans Unicode" pitchFamily="34" charset="0"/>
+              </a:defRPr>
+            </a:lvl9pPr>
+          </a:lstStyle>
+          <a:p>
+            <a:pPr eaLnBrk="1" hangingPunct="1"/>
+            <a:r>
+              <a:rPr lang="en-US" altLang="de-DE" smtClean="0">
+                <a:solidFill>
+                  <a:srgbClr val="000000"/>
+                </a:solidFill>
+                <a:latin typeface="Stafford" pitchFamily="2" charset="0"/>
+              </a:rPr>
+              <a:t>November 19, 2007</a:t>
+            </a:r>
+          </a:p>
+        </p:txBody>
+      </p:sp>
+      <p:sp>
+        <p:nvSpPr>
+          <p:cNvPr id="53253" name="Fußzeilenplatzhalter 4"/>
+          <p:cNvSpPr>
+            <a:spLocks noGrp="1"/>
+          </p:cNvSpPr>
+          <p:nvPr>
+            <p:ph type="ftr" sz="quarter"/>
+          </p:nvPr>
+        </p:nvSpPr>
+        <p:spPr>
+          <a:noFill/>
+          <a:extLst>
+            <a:ext uri="{909E8E84-426E-40DD-AFC4-6F175D3DCCD1}">
+              <a14:hiddenFill xmlns:a14="http://schemas.microsoft.com/office/drawing/2010/main">
+                <a:solidFill>
+                  <a:srgbClr val="FFFFFF"/>
+                </a:solidFill>
+              </a14:hiddenFill>
+            </a:ext>
+            <a:ext uri="{91240B29-F687-4F45-9708-019B960494DF}">
+              <a14:hiddenLine xmlns:a14="http://schemas.microsoft.com/office/drawing/2010/main" w="9525">
+                <a:solidFill>
+                  <a:srgbClr val="000000"/>
+                </a:solidFill>
+                <a:miter lim="800000"/>
+                <a:headEnd/>
+                <a:tailEnd/>
+              </a14:hiddenLine>
+            </a:ext>
+          </a:extLst>
+        </p:spPr>
+        <p:txBody>
+          <a:bodyPr/>
+          <a:lstStyle>
+            <a:lvl1pPr defTabSz="463550" eaLnBrk="0" hangingPunct="0">
+              <a:tabLst>
+                <a:tab pos="746125" algn="l"/>
+                <a:tab pos="1492250" algn="l"/>
+                <a:tab pos="2238375" algn="l"/>
+                <a:tab pos="2986088" algn="l"/>
+                <a:tab pos="3732213" algn="l"/>
+              </a:tabLst>
+              <a:defRPr>
+                <a:solidFill>
+                  <a:schemeClr val="tx1"/>
+                </a:solidFill>
+                <a:latin typeface="Arial" charset="0"/>
+                <a:ea typeface="Lucida Sans Unicode" pitchFamily="34" charset="0"/>
+                <a:cs typeface="Lucida Sans Unicode" pitchFamily="34" charset="0"/>
+              </a:defRPr>
+            </a:lvl1pPr>
+            <a:lvl2pPr marL="742950" indent="-285750" defTabSz="463550" eaLnBrk="0" hangingPunct="0">
+              <a:tabLst>
+                <a:tab pos="746125" algn="l"/>
+                <a:tab pos="1492250" algn="l"/>
+                <a:tab pos="2238375" algn="l"/>
+                <a:tab pos="2986088" algn="l"/>
+                <a:tab pos="3732213" algn="l"/>
+              </a:tabLst>
+              <a:defRPr>
+                <a:solidFill>
+                  <a:schemeClr val="tx1"/>
+                </a:solidFill>
+                <a:latin typeface="Arial" charset="0"/>
+                <a:ea typeface="Lucida Sans Unicode" pitchFamily="34" charset="0"/>
+                <a:cs typeface="Lucida Sans Unicode" pitchFamily="34" charset="0"/>
+              </a:defRPr>
+            </a:lvl2pPr>
+            <a:lvl3pPr marL="1143000" indent="-228600" defTabSz="463550" eaLnBrk="0" hangingPunct="0">
+              <a:tabLst>
+                <a:tab pos="746125" algn="l"/>
+                <a:tab pos="1492250" algn="l"/>
+                <a:tab pos="2238375" algn="l"/>
+                <a:tab pos="2986088" algn="l"/>
+                <a:tab pos="3732213" algn="l"/>
+              </a:tabLst>
+              <a:defRPr>
+                <a:solidFill>
+                  <a:schemeClr val="tx1"/>
+                </a:solidFill>
+                <a:latin typeface="Arial" charset="0"/>
+                <a:ea typeface="Lucida Sans Unicode" pitchFamily="34" charset="0"/>
+                <a:cs typeface="Lucida Sans Unicode" pitchFamily="34" charset="0"/>
+              </a:defRPr>
+            </a:lvl3pPr>
+            <a:lvl4pPr marL="1600200" indent="-228600" defTabSz="463550" eaLnBrk="0" hangingPunct="0">
+              <a:tabLst>
+                <a:tab pos="746125" algn="l"/>
+                <a:tab pos="1492250" algn="l"/>
+                <a:tab pos="2238375" algn="l"/>
+                <a:tab pos="2986088" algn="l"/>
+                <a:tab pos="3732213" algn="l"/>
+              </a:tabLst>
+              <a:defRPr>
+                <a:solidFill>
+                  <a:schemeClr val="tx1"/>
+                </a:solidFill>
+                <a:latin typeface="Arial" charset="0"/>
+                <a:ea typeface="Lucida Sans Unicode" pitchFamily="34" charset="0"/>
+                <a:cs typeface="Lucida Sans Unicode" pitchFamily="34" charset="0"/>
+              </a:defRPr>
+            </a:lvl4pPr>
+            <a:lvl5pPr marL="2057400" indent="-228600" defTabSz="463550" eaLnBrk="0" hangingPunct="0">
+              <a:tabLst>
+                <a:tab pos="746125" algn="l"/>
+                <a:tab pos="1492250" algn="l"/>
+                <a:tab pos="2238375" algn="l"/>
+                <a:tab pos="2986088" algn="l"/>
+                <a:tab pos="3732213" algn="l"/>
+              </a:tabLst>
+              <a:defRPr>
+                <a:solidFill>
+                  <a:schemeClr val="tx1"/>
+                </a:solidFill>
+                <a:latin typeface="Arial" charset="0"/>
+                <a:ea typeface="Lucida Sans Unicode" pitchFamily="34" charset="0"/>
+                <a:cs typeface="Lucida Sans Unicode" pitchFamily="34" charset="0"/>
+              </a:defRPr>
+            </a:lvl5pPr>
+            <a:lvl6pPr marL="2514600" indent="-228600" algn="ctr" defTabSz="463550" eaLnBrk="0" fontAlgn="base" hangingPunct="0">
+              <a:lnSpc>
+                <a:spcPct val="93000"/>
+              </a:lnSpc>
+              <a:spcBef>
+                <a:spcPct val="0"/>
+              </a:spcBef>
+              <a:spcAft>
+                <a:spcPct val="0"/>
+              </a:spcAft>
+              <a:buClr>
+                <a:srgbClr val="000000"/>
+              </a:buClr>
+              <a:buSzPct val="100000"/>
+              <a:buFont typeface="Arial" charset="0"/>
+              <a:tabLst>
+                <a:tab pos="746125" algn="l"/>
+                <a:tab pos="1492250" algn="l"/>
+                <a:tab pos="2238375" algn="l"/>
+                <a:tab pos="2986088" algn="l"/>
+                <a:tab pos="3732213" algn="l"/>
+              </a:tabLst>
+              <a:defRPr>
+                <a:solidFill>
+                  <a:schemeClr val="tx1"/>
+                </a:solidFill>
+                <a:latin typeface="Arial" charset="0"/>
+                <a:ea typeface="Lucida Sans Unicode" pitchFamily="34" charset="0"/>
+                <a:cs typeface="Lucida Sans Unicode" pitchFamily="34" charset="0"/>
+              </a:defRPr>
+            </a:lvl6pPr>
+            <a:lvl7pPr marL="2971800" indent="-228600" algn="ctr" defTabSz="463550" eaLnBrk="0" fontAlgn="base" hangingPunct="0">
+              <a:lnSpc>
+                <a:spcPct val="93000"/>
+              </a:lnSpc>
+              <a:spcBef>
+                <a:spcPct val="0"/>
+              </a:spcBef>
+              <a:spcAft>
+                <a:spcPct val="0"/>
+              </a:spcAft>
+              <a:buClr>
+                <a:srgbClr val="000000"/>
+              </a:buClr>
+              <a:buSzPct val="100000"/>
+              <a:buFont typeface="Arial" charset="0"/>
+              <a:tabLst>
+                <a:tab pos="746125" algn="l"/>
+                <a:tab pos="1492250" algn="l"/>
+                <a:tab pos="2238375" algn="l"/>
+                <a:tab pos="2986088" algn="l"/>
+                <a:tab pos="3732213" algn="l"/>
+              </a:tabLst>
+              <a:defRPr>
+                <a:solidFill>
+                  <a:schemeClr val="tx1"/>
+                </a:solidFill>
+                <a:latin typeface="Arial" charset="0"/>
+                <a:ea typeface="Lucida Sans Unicode" pitchFamily="34" charset="0"/>
+                <a:cs typeface="Lucida Sans Unicode" pitchFamily="34" charset="0"/>
+              </a:defRPr>
+            </a:lvl7pPr>
+            <a:lvl8pPr marL="3429000" indent="-228600" algn="ctr" defTabSz="463550" eaLnBrk="0" fontAlgn="base" hangingPunct="0">
+              <a:lnSpc>
+                <a:spcPct val="93000"/>
+              </a:lnSpc>
+              <a:spcBef>
+                <a:spcPct val="0"/>
+              </a:spcBef>
+              <a:spcAft>
+                <a:spcPct val="0"/>
+              </a:spcAft>
+              <a:buClr>
+                <a:srgbClr val="000000"/>
+              </a:buClr>
+              <a:buSzPct val="100000"/>
+              <a:buFont typeface="Arial" charset="0"/>
+              <a:tabLst>
+                <a:tab pos="746125" algn="l"/>
+                <a:tab pos="1492250" algn="l"/>
+                <a:tab pos="2238375" algn="l"/>
+                <a:tab pos="2986088" algn="l"/>
+                <a:tab pos="3732213" algn="l"/>
+              </a:tabLst>
+              <a:defRPr>
+                <a:solidFill>
+                  <a:schemeClr val="tx1"/>
+                </a:solidFill>
+                <a:latin typeface="Arial" charset="0"/>
+                <a:ea typeface="Lucida Sans Unicode" pitchFamily="34" charset="0"/>
+                <a:cs typeface="Lucida Sans Unicode" pitchFamily="34" charset="0"/>
+              </a:defRPr>
+            </a:lvl8pPr>
+            <a:lvl9pPr marL="3886200" indent="-228600" algn="ctr" defTabSz="463550" eaLnBrk="0" fontAlgn="base" hangingPunct="0">
+              <a:lnSpc>
+                <a:spcPct val="93000"/>
+              </a:lnSpc>
+              <a:spcBef>
+                <a:spcPct val="0"/>
+              </a:spcBef>
+              <a:spcAft>
+                <a:spcPct val="0"/>
+              </a:spcAft>
+              <a:buClr>
+                <a:srgbClr val="000000"/>
+              </a:buClr>
+              <a:buSzPct val="100000"/>
+              <a:buFont typeface="Arial" charset="0"/>
+              <a:tabLst>
+                <a:tab pos="746125" algn="l"/>
+                <a:tab pos="1492250" algn="l"/>
+                <a:tab pos="2238375" algn="l"/>
+                <a:tab pos="2986088" algn="l"/>
+                <a:tab pos="3732213" algn="l"/>
+              </a:tabLst>
+              <a:defRPr>
+                <a:solidFill>
+                  <a:schemeClr val="tx1"/>
+                </a:solidFill>
+                <a:latin typeface="Arial" charset="0"/>
+                <a:ea typeface="Lucida Sans Unicode" pitchFamily="34" charset="0"/>
+                <a:cs typeface="Lucida Sans Unicode" pitchFamily="34" charset="0"/>
+              </a:defRPr>
+            </a:lvl9pPr>
+          </a:lstStyle>
+          <a:p>
+            <a:pPr eaLnBrk="1" hangingPunct="1"/>
+            <a:r>
+              <a:rPr lang="en-US" altLang="de-DE" smtClean="0">
+                <a:solidFill>
+                  <a:srgbClr val="000000"/>
+                </a:solidFill>
+                <a:latin typeface="Stafford" pitchFamily="2" charset="0"/>
+              </a:rPr>
+              <a:t>|  </a:t>
+            </a:r>
+          </a:p>
+        </p:txBody>
+      </p:sp>
+      <p:sp>
+        <p:nvSpPr>
+          <p:cNvPr id="53254" name="Foliennummernplatzhalter 5"/>
+          <p:cNvSpPr>
+            <a:spLocks noGrp="1"/>
+          </p:cNvSpPr>
+          <p:nvPr>
+            <p:ph type="sldNum" sz="quarter"/>
+          </p:nvPr>
+        </p:nvSpPr>
+        <p:spPr>
+          <a:noFill/>
+          <a:extLst>
+            <a:ext uri="{909E8E84-426E-40DD-AFC4-6F175D3DCCD1}">
+              <a14:hiddenFill xmlns:a14="http://schemas.microsoft.com/office/drawing/2010/main">
+                <a:solidFill>
+                  <a:srgbClr val="FFFFFF"/>
+                </a:solidFill>
+              </a14:hiddenFill>
+            </a:ext>
+            <a:ext uri="{91240B29-F687-4F45-9708-019B960494DF}">
+              <a14:hiddenLine xmlns:a14="http://schemas.microsoft.com/office/drawing/2010/main" w="9525">
+                <a:solidFill>
+                  <a:srgbClr val="000000"/>
+                </a:solidFill>
+                <a:miter lim="800000"/>
+                <a:headEnd/>
+                <a:tailEnd/>
+              </a14:hiddenLine>
+            </a:ext>
+          </a:extLst>
+        </p:spPr>
+        <p:txBody>
+          <a:bodyPr/>
+          <a:lstStyle>
+            <a:lvl1pPr defTabSz="463550" eaLnBrk="0" hangingPunct="0">
+              <a:tabLst>
+                <a:tab pos="746125" algn="l"/>
+              </a:tabLst>
+              <a:defRPr>
+                <a:solidFill>
+                  <a:schemeClr val="tx1"/>
+                </a:solidFill>
+                <a:latin typeface="Arial" charset="0"/>
+                <a:ea typeface="Lucida Sans Unicode" pitchFamily="34" charset="0"/>
+                <a:cs typeface="Lucida Sans Unicode" pitchFamily="34" charset="0"/>
+              </a:defRPr>
+            </a:lvl1pPr>
+            <a:lvl2pPr marL="742950" indent="-285750" defTabSz="463550" eaLnBrk="0" hangingPunct="0">
+              <a:tabLst>
+                <a:tab pos="746125" algn="l"/>
+              </a:tabLst>
+              <a:defRPr>
+                <a:solidFill>
+                  <a:schemeClr val="tx1"/>
+                </a:solidFill>
+                <a:latin typeface="Arial" charset="0"/>
+                <a:ea typeface="Lucida Sans Unicode" pitchFamily="34" charset="0"/>
+                <a:cs typeface="Lucida Sans Unicode" pitchFamily="34" charset="0"/>
+              </a:defRPr>
+            </a:lvl2pPr>
+            <a:lvl3pPr marL="1143000" indent="-228600" defTabSz="463550" eaLnBrk="0" hangingPunct="0">
+              <a:tabLst>
+                <a:tab pos="746125" algn="l"/>
+              </a:tabLst>
+              <a:defRPr>
+                <a:solidFill>
+                  <a:schemeClr val="tx1"/>
+                </a:solidFill>
+                <a:latin typeface="Arial" charset="0"/>
+                <a:ea typeface="Lucida Sans Unicode" pitchFamily="34" charset="0"/>
+                <a:cs typeface="Lucida Sans Unicode" pitchFamily="34" charset="0"/>
+              </a:defRPr>
+            </a:lvl3pPr>
+            <a:lvl4pPr marL="1600200" indent="-228600" defTabSz="463550" eaLnBrk="0" hangingPunct="0">
+              <a:tabLst>
+                <a:tab pos="746125" algn="l"/>
+              </a:tabLst>
+              <a:defRPr>
+                <a:solidFill>
+                  <a:schemeClr val="tx1"/>
+                </a:solidFill>
+                <a:latin typeface="Arial" charset="0"/>
+                <a:ea typeface="Lucida Sans Unicode" pitchFamily="34" charset="0"/>
+                <a:cs typeface="Lucida Sans Unicode" pitchFamily="34" charset="0"/>
+              </a:defRPr>
+            </a:lvl4pPr>
+            <a:lvl5pPr marL="2057400" indent="-228600" defTabSz="463550" eaLnBrk="0" hangingPunct="0">
+              <a:tabLst>
+                <a:tab pos="746125" algn="l"/>
+              </a:tabLst>
+              <a:defRPr>
+                <a:solidFill>
+                  <a:schemeClr val="tx1"/>
+                </a:solidFill>
+                <a:latin typeface="Arial" charset="0"/>
+                <a:ea typeface="Lucida Sans Unicode" pitchFamily="34" charset="0"/>
+                <a:cs typeface="Lucida Sans Unicode" pitchFamily="34" charset="0"/>
+              </a:defRPr>
+            </a:lvl5pPr>
+            <a:lvl6pPr marL="2514600" indent="-228600" algn="ctr" defTabSz="463550" eaLnBrk="0" fontAlgn="base" hangingPunct="0">
+              <a:lnSpc>
+                <a:spcPct val="93000"/>
+              </a:lnSpc>
+              <a:spcBef>
+                <a:spcPct val="0"/>
+              </a:spcBef>
+              <a:spcAft>
+                <a:spcPct val="0"/>
+              </a:spcAft>
+              <a:buClr>
+                <a:srgbClr val="000000"/>
+              </a:buClr>
+              <a:buSzPct val="100000"/>
+              <a:buFont typeface="Arial" charset="0"/>
+              <a:tabLst>
+                <a:tab pos="746125" algn="l"/>
+              </a:tabLst>
+              <a:defRPr>
+                <a:solidFill>
+                  <a:schemeClr val="tx1"/>
+                </a:solidFill>
+                <a:latin typeface="Arial" charset="0"/>
+                <a:ea typeface="Lucida Sans Unicode" pitchFamily="34" charset="0"/>
+                <a:cs typeface="Lucida Sans Unicode" pitchFamily="34" charset="0"/>
+              </a:defRPr>
+            </a:lvl6pPr>
+            <a:lvl7pPr marL="2971800" indent="-228600" algn="ctr" defTabSz="463550" eaLnBrk="0" fontAlgn="base" hangingPunct="0">
+              <a:lnSpc>
+                <a:spcPct val="93000"/>
+              </a:lnSpc>
+              <a:spcBef>
+                <a:spcPct val="0"/>
+              </a:spcBef>
+              <a:spcAft>
+                <a:spcPct val="0"/>
+              </a:spcAft>
+              <a:buClr>
+                <a:srgbClr val="000000"/>
+              </a:buClr>
+              <a:buSzPct val="100000"/>
+              <a:buFont typeface="Arial" charset="0"/>
+              <a:tabLst>
+                <a:tab pos="746125" algn="l"/>
+              </a:tabLst>
+              <a:defRPr>
+                <a:solidFill>
+                  <a:schemeClr val="tx1"/>
+                </a:solidFill>
+                <a:latin typeface="Arial" charset="0"/>
+                <a:ea typeface="Lucida Sans Unicode" pitchFamily="34" charset="0"/>
+                <a:cs typeface="Lucida Sans Unicode" pitchFamily="34" charset="0"/>
+              </a:defRPr>
+            </a:lvl7pPr>
+            <a:lvl8pPr marL="3429000" indent="-228600" algn="ctr" defTabSz="463550" eaLnBrk="0" fontAlgn="base" hangingPunct="0">
+              <a:lnSpc>
+                <a:spcPct val="93000"/>
+              </a:lnSpc>
+              <a:spcBef>
+                <a:spcPct val="0"/>
+              </a:spcBef>
+              <a:spcAft>
+                <a:spcPct val="0"/>
+              </a:spcAft>
+              <a:buClr>
+                <a:srgbClr val="000000"/>
+              </a:buClr>
+              <a:buSzPct val="100000"/>
+              <a:buFont typeface="Arial" charset="0"/>
+              <a:tabLst>
+                <a:tab pos="746125" algn="l"/>
+              </a:tabLst>
+              <a:defRPr>
+                <a:solidFill>
+                  <a:schemeClr val="tx1"/>
+                </a:solidFill>
+                <a:latin typeface="Arial" charset="0"/>
+                <a:ea typeface="Lucida Sans Unicode" pitchFamily="34" charset="0"/>
+                <a:cs typeface="Lucida Sans Unicode" pitchFamily="34" charset="0"/>
+              </a:defRPr>
+            </a:lvl8pPr>
+            <a:lvl9pPr marL="3886200" indent="-228600" algn="ctr" defTabSz="463550" eaLnBrk="0" fontAlgn="base" hangingPunct="0">
+              <a:lnSpc>
+                <a:spcPct val="93000"/>
+              </a:lnSpc>
+              <a:spcBef>
+                <a:spcPct val="0"/>
+              </a:spcBef>
+              <a:spcAft>
+                <a:spcPct val="0"/>
+              </a:spcAft>
+              <a:buClr>
+                <a:srgbClr val="000000"/>
+              </a:buClr>
+              <a:buSzPct val="100000"/>
+              <a:buFont typeface="Arial" charset="0"/>
+              <a:tabLst>
+                <a:tab pos="746125" algn="l"/>
+              </a:tabLst>
+              <a:defRPr>
+                <a:solidFill>
+                  <a:schemeClr val="tx1"/>
+                </a:solidFill>
+                <a:latin typeface="Arial" charset="0"/>
+                <a:ea typeface="Lucida Sans Unicode" pitchFamily="34" charset="0"/>
+                <a:cs typeface="Lucida Sans Unicode" pitchFamily="34" charset="0"/>
+              </a:defRPr>
+            </a:lvl9pPr>
+          </a:lstStyle>
+          <a:p>
+            <a:pPr eaLnBrk="1" hangingPunct="1"/>
+            <a:r>
+              <a:rPr lang="en-US" altLang="de-DE" smtClean="0">
+                <a:solidFill>
+                  <a:srgbClr val="000000"/>
+                </a:solidFill>
+                <a:latin typeface="Stafford" pitchFamily="2" charset="0"/>
+              </a:rPr>
+              <a:t>|  </a:t>
+            </a:r>
+            <a:fld id="{6775A062-1A8A-4084-8B81-E33BA407A859}" type="slidenum">
+              <a:rPr lang="en-US" altLang="de-DE" smtClean="0">
+                <a:solidFill>
+                  <a:srgbClr val="000000"/>
+                </a:solidFill>
+                <a:latin typeface="Stafford" pitchFamily="2" charset="0"/>
+              </a:rPr>
+              <a:pPr eaLnBrk="1" hangingPunct="1"/>
+              <a:t>14</a:t>
+            </a:fld>
+            <a:endParaRPr lang="en-US" altLang="de-DE" smtClean="0">
+              <a:solidFill>
+                <a:srgbClr val="000000"/>
+              </a:solidFill>
+              <a:latin typeface="Stafford" pitchFamily="2" charset="0"/>
+            </a:endParaRPr>
+          </a:p>
+        </p:txBody>
+      </p:sp>
+    </p:spTree>
+    <p:extLst>
+      <p:ext uri="{BB962C8B-B14F-4D97-AF65-F5344CB8AC3E}">
+        <p14:creationId xmlns:p14="http://schemas.microsoft.com/office/powerpoint/2010/main" val="708471988"/>
+      </p:ext>
+    </p:extLst>
+  </p:cSld>
+  <p:clrMapOvr>
+    <a:masterClrMapping/>
+  </p:clrMapOvr>
+</p:notes>
+</file>
+
 <file path=ppt/slideLayouts/slideLayout1.xml><?xml version="1.0" encoding="utf-8"?>
 <p:sldLayout xmlns:a="http://schemas.openxmlformats.org/drawingml/2006/main" xmlns:r="http://schemas.openxmlformats.org/officeDocument/2006/relationships" xmlns:p="http://schemas.openxmlformats.org/presentationml/2006/main" showMasterSp="0" type="title" preserve="1">
   <p:cSld name="Titelfolie">
@@ -7125,7 +7955,7 @@
           <a:graphicData uri="http://schemas.openxmlformats.org/presentationml/2006/ole">
             <mc:AlternateContent xmlns:mc="http://schemas.openxmlformats.org/markup-compatibility/2006">
               <mc:Choice xmlns:v="urn:schemas-microsoft-com:vml" Requires="v">
-                <p:oleObj spid="_x0000_s2051" r:id="rId16" imgW="1038370" imgH="980952" progId="">
+                <p:oleObj spid="_x0000_s2052" r:id="rId16" imgW="1038370" imgH="980952" progId="">
                   <p:embed/>
                 </p:oleObj>
               </mc:Choice>
@@ -7563,7 +8393,7 @@
                 </a:lnSpc>
                 <a:defRPr/>
               </a:pPr>
-              <a:t>2018-08-29</a:t>
+              <a:t>2018-09-06</a:t>
             </a:fld>
             <a:r>
               <a:rPr lang="en-GB" altLang="de-DE" sz="1000" smtClean="0">
@@ -8091,6 +8921,1024 @@
 </p:sld>
 </file>
 
+<file path=ppt/slides/slide10.xml><?xml version="1.0" encoding="utf-8"?>
+<p:sld xmlns:a="http://schemas.openxmlformats.org/drawingml/2006/main" xmlns:r="http://schemas.openxmlformats.org/officeDocument/2006/relationships" xmlns:p="http://schemas.openxmlformats.org/presentationml/2006/main">
+  <p:cSld>
+    <p:spTree>
+      <p:nvGrpSpPr>
+        <p:cNvPr id="1" name=""/>
+        <p:cNvGrpSpPr/>
+        <p:nvPr/>
+      </p:nvGrpSpPr>
+      <p:grpSpPr>
+        <a:xfrm>
+          <a:off x="0" y="0"/>
+          <a:ext cx="0" cy="0"/>
+          <a:chOff x="0" y="0"/>
+          <a:chExt cx="0" cy="0"/>
+        </a:xfrm>
+      </p:grpSpPr>
+      <p:sp>
+        <p:nvSpPr>
+          <p:cNvPr id="2" name="Titel 1"/>
+          <p:cNvSpPr>
+            <a:spLocks noGrp="1"/>
+          </p:cNvSpPr>
+          <p:nvPr>
+            <p:ph type="title"/>
+          </p:nvPr>
+        </p:nvSpPr>
+        <p:spPr/>
+        <p:txBody>
+          <a:bodyPr/>
+          <a:lstStyle/>
+          <a:p>
+            <a:r>
+              <a:rPr lang="en-US" smtClean="0"/>
+              <a:t>Block </a:t>
+            </a:r>
+            <a:r>
+              <a:rPr lang="en-US" smtClean="0"/>
+              <a:t>2</a:t>
+            </a:r>
+            <a:endParaRPr lang="en-US"/>
+          </a:p>
+        </p:txBody>
+      </p:sp>
+    </p:spTree>
+    <p:extLst>
+      <p:ext uri="{BB962C8B-B14F-4D97-AF65-F5344CB8AC3E}">
+        <p14:creationId xmlns:p14="http://schemas.microsoft.com/office/powerpoint/2010/main" val="2248377310"/>
+      </p:ext>
+    </p:extLst>
+  </p:cSld>
+  <p:clrMapOvr>
+    <a:masterClrMapping/>
+  </p:clrMapOvr>
+  <p:timing>
+    <p:tnLst>
+      <p:par>
+        <p:cTn id="1" dur="indefinite" restart="never" nodeType="tmRoot"/>
+      </p:par>
+    </p:tnLst>
+  </p:timing>
+</p:sld>
+</file>
+
+<file path=ppt/slides/slide11.xml><?xml version="1.0" encoding="utf-8"?>
+<p:sld xmlns:a="http://schemas.openxmlformats.org/drawingml/2006/main" xmlns:r="http://schemas.openxmlformats.org/officeDocument/2006/relationships" xmlns:p="http://schemas.openxmlformats.org/presentationml/2006/main">
+  <p:cSld>
+    <p:spTree>
+      <p:nvGrpSpPr>
+        <p:cNvPr id="1" name=""/>
+        <p:cNvGrpSpPr/>
+        <p:nvPr/>
+      </p:nvGrpSpPr>
+      <p:grpSpPr>
+        <a:xfrm>
+          <a:off x="0" y="0"/>
+          <a:ext cx="0" cy="0"/>
+          <a:chOff x="0" y="0"/>
+          <a:chExt cx="0" cy="0"/>
+        </a:xfrm>
+      </p:grpSpPr>
+      <p:sp>
+        <p:nvSpPr>
+          <p:cNvPr id="7" name="Titel 6"/>
+          <p:cNvSpPr>
+            <a:spLocks noGrp="1"/>
+          </p:cNvSpPr>
+          <p:nvPr>
+            <p:ph type="title"/>
+          </p:nvPr>
+        </p:nvSpPr>
+        <p:spPr/>
+        <p:txBody>
+          <a:bodyPr/>
+          <a:lstStyle/>
+          <a:p>
+            <a:r>
+              <a:rPr lang="en-US" smtClean="0"/>
+              <a:t>Tag 1-Nachmittag: Anmerkungen</a:t>
+            </a:r>
+            <a:endParaRPr lang="en-US" dirty="0"/>
+          </a:p>
+        </p:txBody>
+      </p:sp>
+      <p:sp>
+        <p:nvSpPr>
+          <p:cNvPr id="8" name="Inhaltsplatzhalter 7"/>
+          <p:cNvSpPr>
+            <a:spLocks noGrp="1"/>
+          </p:cNvSpPr>
+          <p:nvPr>
+            <p:ph idx="1"/>
+          </p:nvPr>
+        </p:nvSpPr>
+        <p:spPr/>
+        <p:txBody>
+          <a:bodyPr>
+            <a:normAutofit/>
+          </a:bodyPr>
+          <a:lstStyle/>
+          <a:p>
+            <a:pPr marL="342900" indent="-342900">
+              <a:buFontTx/>
+              <a:buChar char="-"/>
+            </a:pPr>
+            <a:r>
+              <a:rPr lang="en-US" b="1" smtClean="0"/>
+              <a:t>Am Ende des Tages bitte…</a:t>
+            </a:r>
+          </a:p>
+          <a:p>
+            <a:pPr marL="692150" lvl="1" indent="-342900">
+              <a:buFontTx/>
+              <a:buChar char="-"/>
+            </a:pPr>
+            <a:r>
+              <a:rPr lang="en-US" b="1" smtClean="0"/>
+              <a:t>… nur abmelden, </a:t>
+            </a:r>
+            <a:r>
+              <a:rPr lang="en-US" smtClean="0"/>
+              <a:t>nicht den PC ausschalten</a:t>
+            </a:r>
+            <a:r>
+              <a:rPr lang="en-US" b="1" smtClean="0"/>
+              <a:t>.</a:t>
+            </a:r>
+          </a:p>
+          <a:p>
+            <a:pPr marL="692150" lvl="1" indent="-342900">
+              <a:buFontTx/>
+              <a:buChar char="-"/>
+            </a:pPr>
+            <a:r>
+              <a:rPr lang="en-US" b="1" smtClean="0"/>
+              <a:t>… Ergebnisse sichern</a:t>
+            </a:r>
+            <a:r>
+              <a:rPr lang="en-US" smtClean="0"/>
+              <a:t> – wir können leider für nichts außerhalb von %HOME% garantieren.</a:t>
+            </a:r>
+          </a:p>
+          <a:p>
+            <a:pPr marL="692150" lvl="1" indent="-342900">
+              <a:buFontTx/>
+              <a:buChar char="-"/>
+            </a:pPr>
+            <a:endParaRPr lang="de-DE"/>
+          </a:p>
+          <a:p>
+            <a:pPr marL="342900" indent="-342900">
+              <a:buFontTx/>
+              <a:buChar char="-"/>
+            </a:pPr>
+            <a:r>
+              <a:rPr lang="de-DE" smtClean="0"/>
+              <a:t>Der PC-Pool hat eine </a:t>
+            </a:r>
+            <a:r>
+              <a:rPr lang="de-DE" b="1" smtClean="0"/>
+              <a:t>Klimaanlage</a:t>
+            </a:r>
+            <a:r>
+              <a:rPr lang="de-DE" smtClean="0"/>
+              <a:t>.</a:t>
+            </a:r>
+          </a:p>
+          <a:p>
+            <a:pPr marL="692150" lvl="1" indent="-342900">
+              <a:buFontTx/>
+              <a:buChar char="-"/>
+            </a:pPr>
+            <a:r>
+              <a:rPr lang="de-DE" smtClean="0"/>
+              <a:t>Falls </a:t>
+            </a:r>
+            <a:r>
+              <a:rPr lang="de-DE" b="1" smtClean="0"/>
+              <a:t>zu kalt oder warm</a:t>
+            </a:r>
+            <a:r>
+              <a:rPr lang="de-DE" smtClean="0"/>
+              <a:t>, bitte Bescheid sagen!</a:t>
+            </a:r>
+          </a:p>
+          <a:p>
+            <a:pPr marL="692150" lvl="1" indent="-342900">
+              <a:buFontTx/>
+              <a:buChar char="-"/>
+            </a:pPr>
+            <a:r>
+              <a:rPr lang="de-DE" smtClean="0"/>
+              <a:t>Bitte die </a:t>
+            </a:r>
+            <a:r>
+              <a:rPr lang="de-DE" b="1" smtClean="0"/>
+              <a:t>Türen anlehnen</a:t>
+            </a:r>
+            <a:r>
+              <a:rPr lang="de-DE" smtClean="0"/>
+              <a:t>.</a:t>
+            </a:r>
+          </a:p>
+          <a:p>
+            <a:pPr marL="692150" lvl="1" indent="-342900">
+              <a:buFontTx/>
+              <a:buChar char="-"/>
+            </a:pPr>
+            <a:endParaRPr lang="en-US" smtClean="0"/>
+          </a:p>
+          <a:p>
+            <a:pPr marL="342900" indent="-342900">
+              <a:buFontTx/>
+              <a:buChar char="-"/>
+            </a:pPr>
+            <a:r>
+              <a:rPr lang="en-US" b="1" smtClean="0"/>
+              <a:t>Danke fürs Feedback! </a:t>
+            </a:r>
+            <a:br>
+              <a:rPr lang="en-US" b="1" smtClean="0"/>
+            </a:br>
+            <a:r>
+              <a:rPr lang="en-US" smtClean="0"/>
+              <a:t>Es gibt ein paar Bugfixes</a:t>
+            </a:r>
+          </a:p>
+          <a:p>
+            <a:pPr marL="692150" lvl="1" indent="-342900">
+              <a:buFontTx/>
+              <a:buChar char="-"/>
+            </a:pPr>
+            <a:r>
+              <a:rPr lang="de-DE" smtClean="0"/>
+              <a:t>Siehe </a:t>
+            </a:r>
+            <a:r>
+              <a:rPr lang="de-DE" b="1" smtClean="0"/>
+              <a:t>changelog.txt</a:t>
+            </a:r>
+            <a:endParaRPr lang="en-US" b="1" smtClean="0"/>
+          </a:p>
+        </p:txBody>
+      </p:sp>
+    </p:spTree>
+    <p:extLst>
+      <p:ext uri="{BB962C8B-B14F-4D97-AF65-F5344CB8AC3E}">
+        <p14:creationId xmlns:p14="http://schemas.microsoft.com/office/powerpoint/2010/main" val="1369873813"/>
+      </p:ext>
+    </p:extLst>
+  </p:cSld>
+  <p:clrMapOvr>
+    <a:masterClrMapping/>
+  </p:clrMapOvr>
+  <p:timing>
+    <p:tnLst>
+      <p:par>
+        <p:cTn id="1" dur="indefinite" restart="never" nodeType="tmRoot"/>
+      </p:par>
+    </p:tnLst>
+  </p:timing>
+</p:sld>
+</file>
+
+<file path=ppt/slides/slide12.xml><?xml version="1.0" encoding="utf-8"?>
+<p:sld xmlns:a="http://schemas.openxmlformats.org/drawingml/2006/main" xmlns:r="http://schemas.openxmlformats.org/officeDocument/2006/relationships" xmlns:p="http://schemas.openxmlformats.org/presentationml/2006/main">
+  <p:cSld>
+    <p:spTree>
+      <p:nvGrpSpPr>
+        <p:cNvPr id="1" name=""/>
+        <p:cNvGrpSpPr/>
+        <p:nvPr/>
+      </p:nvGrpSpPr>
+      <p:grpSpPr>
+        <a:xfrm>
+          <a:off x="0" y="0"/>
+          <a:ext cx="0" cy="0"/>
+          <a:chOff x="0" y="0"/>
+          <a:chExt cx="0" cy="0"/>
+        </a:xfrm>
+      </p:grpSpPr>
+      <p:sp>
+        <p:nvSpPr>
+          <p:cNvPr id="2" name="Titel 1"/>
+          <p:cNvSpPr>
+            <a:spLocks noGrp="1"/>
+          </p:cNvSpPr>
+          <p:nvPr>
+            <p:ph type="title"/>
+          </p:nvPr>
+        </p:nvSpPr>
+        <p:spPr/>
+        <p:txBody>
+          <a:bodyPr/>
+          <a:lstStyle/>
+          <a:p>
+            <a:r>
+              <a:rPr lang="en-US" smtClean="0"/>
+              <a:t>Tag 3-Vormittag: Ankündigung</a:t>
+            </a:r>
+            <a:endParaRPr lang="en-US" dirty="0"/>
+          </a:p>
+        </p:txBody>
+      </p:sp>
+      <p:sp>
+        <p:nvSpPr>
+          <p:cNvPr id="3" name="Inhaltsplatzhalter 2"/>
+          <p:cNvSpPr>
+            <a:spLocks noGrp="1"/>
+          </p:cNvSpPr>
+          <p:nvPr>
+            <p:ph idx="1"/>
+          </p:nvPr>
+        </p:nvSpPr>
+        <p:spPr/>
+        <p:txBody>
+          <a:bodyPr/>
+          <a:lstStyle/>
+          <a:p>
+            <a:pPr marL="342900" indent="-342900">
+              <a:buFontTx/>
+              <a:buChar char="-"/>
+            </a:pPr>
+            <a:endParaRPr lang="en-US" dirty="0" smtClean="0"/>
+          </a:p>
+          <a:p>
+            <a:pPr marL="342900" indent="-342900">
+              <a:buFontTx/>
+              <a:buChar char="-"/>
+            </a:pPr>
+            <a:r>
+              <a:rPr lang="en-US" b="1" smtClean="0"/>
+              <a:t>Evaluation am Mittwoch</a:t>
+            </a:r>
+            <a:r>
+              <a:rPr lang="en-US" smtClean="0"/>
+              <a:t>: Zusatzfragen</a:t>
+            </a:r>
+          </a:p>
+          <a:p>
+            <a:pPr marL="692150" lvl="1" indent="-342900">
+              <a:buFont typeface="+mj-lt"/>
+              <a:buAutoNum type="arabicPeriod"/>
+            </a:pPr>
+            <a:r>
+              <a:rPr lang="en-US" smtClean="0"/>
+              <a:t>Stärkerer Fokus auf C++(11) legen (= weniger Fokus auf C)?</a:t>
+            </a:r>
+          </a:p>
+          <a:p>
+            <a:pPr marL="692150" lvl="1" indent="-342900">
+              <a:buFont typeface="+mj-lt"/>
+              <a:buAutoNum type="arabicPeriod"/>
+            </a:pPr>
+            <a:r>
+              <a:rPr lang="en-US" smtClean="0"/>
+              <a:t>Selbsteinschätzung deiner C++-Kenntnisse (1=Keine Vorkenntnisse, 3=Eigene kleinere Projekte, 5=Sehr erfahrener C++-Programmierer)</a:t>
+            </a:r>
+          </a:p>
+          <a:p>
+            <a:pPr marL="692150" lvl="1" indent="-342900">
+              <a:buFont typeface="+mj-lt"/>
+              <a:buAutoNum type="arabicPeriod"/>
+            </a:pPr>
+            <a:endParaRPr lang="en-US" dirty="0"/>
+          </a:p>
+          <a:p>
+            <a:pPr marL="342900" indent="-342900">
+              <a:buFontTx/>
+              <a:buChar char="-"/>
+            </a:pPr>
+            <a:r>
+              <a:rPr lang="en-US" b="1" dirty="0" err="1" smtClean="0"/>
+              <a:t>Gastvortrag</a:t>
+            </a:r>
+            <a:r>
+              <a:rPr lang="en-US" b="1" dirty="0" smtClean="0"/>
+              <a:t> </a:t>
+            </a:r>
+            <a:r>
+              <a:rPr lang="en-US" b="1" smtClean="0"/>
+              <a:t>am Mittwoch</a:t>
+            </a:r>
+            <a:r>
+              <a:rPr lang="en-US" smtClean="0"/>
+              <a:t>: </a:t>
+            </a:r>
+            <a:r>
+              <a:rPr lang="en-US" dirty="0" smtClean="0"/>
+              <a:t>Holger Wech </a:t>
+            </a:r>
+            <a:r>
+              <a:rPr lang="en-US" smtClean="0"/>
+              <a:t>von Cypress</a:t>
+            </a:r>
+            <a:r>
+              <a:rPr lang="en-US" dirty="0" smtClean="0"/>
+              <a:t/>
+            </a:r>
+            <a:br>
+              <a:rPr lang="en-US" dirty="0" smtClean="0"/>
+            </a:br>
+            <a:endParaRPr lang="en-US" dirty="0"/>
+          </a:p>
+        </p:txBody>
+      </p:sp>
+      <p:grpSp>
+        <p:nvGrpSpPr>
+          <p:cNvPr id="8" name="Gruppieren 7"/>
+          <p:cNvGrpSpPr/>
+          <p:nvPr/>
+        </p:nvGrpSpPr>
+        <p:grpSpPr>
+          <a:xfrm>
+            <a:off x="1475656" y="3968750"/>
+            <a:ext cx="4992961" cy="1865682"/>
+            <a:chOff x="1475656" y="4521395"/>
+            <a:chExt cx="4992961" cy="1865682"/>
+          </a:xfrm>
+        </p:grpSpPr>
+        <p:pic>
+          <p:nvPicPr>
+            <p:cNvPr id="4" name="Grafik 3"/>
+            <p:cNvPicPr>
+              <a:picLocks noChangeAspect="1"/>
+            </p:cNvPicPr>
+            <p:nvPr/>
+          </p:nvPicPr>
+          <p:blipFill>
+            <a:blip r:embed="rId2"/>
+            <a:stretch>
+              <a:fillRect/>
+            </a:stretch>
+          </p:blipFill>
+          <p:spPr>
+            <a:xfrm>
+              <a:off x="1475656" y="4521395"/>
+              <a:ext cx="4824536" cy="1865682"/>
+            </a:xfrm>
+            <a:prstGeom prst="rect">
+              <a:avLst/>
+            </a:prstGeom>
+          </p:spPr>
+        </p:pic>
+        <p:sp>
+          <p:nvSpPr>
+            <p:cNvPr id="5" name="Rechteck 4"/>
+            <p:cNvSpPr/>
+            <p:nvPr/>
+          </p:nvSpPr>
+          <p:spPr bwMode="auto">
+            <a:xfrm>
+              <a:off x="4139952" y="5805264"/>
+              <a:ext cx="2328665" cy="170166"/>
+            </a:xfrm>
+            <a:prstGeom prst="rect">
+              <a:avLst/>
+            </a:prstGeom>
+            <a:solidFill>
+              <a:schemeClr val="bg1"/>
+            </a:solidFill>
+            <a:ln w="9525">
+              <a:noFill/>
+              <a:miter lim="800000"/>
+              <a:headEnd/>
+              <a:tailEnd/>
+            </a:ln>
+            <a:extLst/>
+          </p:spPr>
+          <p:txBody>
+            <a:bodyPr wrap="square" rtlCol="0" anchor="ctr">
+              <a:spAutoFit/>
+            </a:bodyPr>
+            <a:lstStyle/>
+            <a:p>
+              <a:pPr algn="ctr" eaLnBrk="1" hangingPunct="1">
+                <a:spcBef>
+                  <a:spcPct val="0"/>
+                </a:spcBef>
+                <a:buSzTx/>
+                <a:buFont typeface="Arial" charset="0"/>
+                <a:buNone/>
+              </a:pPr>
+              <a:endParaRPr lang="en-US" sz="1400" dirty="0" err="1">
+                <a:solidFill>
+                  <a:srgbClr val="7F0055"/>
+                </a:solidFill>
+                <a:latin typeface="Consolas" pitchFamily="49" charset="0"/>
+              </a:endParaRPr>
+            </a:p>
+          </p:txBody>
+        </p:sp>
+      </p:grpSp>
+      <p:sp>
+        <p:nvSpPr>
+          <p:cNvPr id="7" name="Abgerundete rechteckige Legende 6"/>
+          <p:cNvSpPr/>
+          <p:nvPr/>
+        </p:nvSpPr>
+        <p:spPr bwMode="auto">
+          <a:xfrm>
+            <a:off x="6300887" y="3995018"/>
+            <a:ext cx="2448272" cy="672241"/>
+          </a:xfrm>
+          <a:prstGeom prst="wedgeRoundRectCallout">
+            <a:avLst>
+              <a:gd name="adj1" fmla="val -64124"/>
+              <a:gd name="adj2" fmla="val 39314"/>
+              <a:gd name="adj3" fmla="val 16667"/>
+            </a:avLst>
+          </a:prstGeom>
+          <a:ln>
+            <a:headEnd/>
+            <a:tailEnd/>
+          </a:ln>
+          <a:extLst/>
+        </p:spPr>
+        <p:style>
+          <a:lnRef idx="2">
+            <a:schemeClr val="dk1">
+              <a:shade val="50000"/>
+            </a:schemeClr>
+          </a:lnRef>
+          <a:fillRef idx="1">
+            <a:schemeClr val="dk1"/>
+          </a:fillRef>
+          <a:effectRef idx="0">
+            <a:schemeClr val="dk1"/>
+          </a:effectRef>
+          <a:fontRef idx="minor">
+            <a:schemeClr val="lt1"/>
+          </a:fontRef>
+        </p:style>
+        <p:txBody>
+          <a:bodyPr rtlCol="0" anchor="ctr">
+            <a:spAutoFit/>
+          </a:bodyPr>
+          <a:lstStyle/>
+          <a:p>
+            <a:pPr algn="ctr" eaLnBrk="1" hangingPunct="1">
+              <a:spcBef>
+                <a:spcPct val="0"/>
+              </a:spcBef>
+              <a:buSzTx/>
+              <a:buFont typeface="Arial" charset="0"/>
+              <a:buNone/>
+            </a:pPr>
+            <a:r>
+              <a:rPr lang="en-US" smtClean="0">
+                <a:solidFill>
+                  <a:schemeClr val="bg1"/>
+                </a:solidFill>
+                <a:latin typeface="+mj-lt"/>
+              </a:rPr>
+              <a:t>Wir starten </a:t>
+            </a:r>
+            <a:r>
+              <a:rPr lang="en-US" b="1" smtClean="0">
+                <a:solidFill>
+                  <a:schemeClr val="bg1"/>
+                </a:solidFill>
+                <a:latin typeface="+mj-lt"/>
+              </a:rPr>
+              <a:t>pünktlich</a:t>
+            </a:r>
+            <a:r>
+              <a:rPr lang="en-US" smtClean="0">
+                <a:solidFill>
+                  <a:schemeClr val="bg1"/>
+                </a:solidFill>
+                <a:latin typeface="+mj-lt"/>
+              </a:rPr>
+              <a:t> um 9 Uhr</a:t>
+            </a:r>
+            <a:endParaRPr lang="en-US" dirty="0" err="1">
+              <a:solidFill>
+                <a:schemeClr val="bg1"/>
+              </a:solidFill>
+              <a:latin typeface="+mj-lt"/>
+            </a:endParaRPr>
+          </a:p>
+        </p:txBody>
+      </p:sp>
+      <p:pic>
+        <p:nvPicPr>
+          <p:cNvPr id="9" name="Grafik 8"/>
+          <p:cNvPicPr>
+            <a:picLocks noChangeAspect="1"/>
+          </p:cNvPicPr>
+          <p:nvPr/>
+        </p:nvPicPr>
+        <p:blipFill>
+          <a:blip r:embed="rId3"/>
+          <a:stretch>
+            <a:fillRect/>
+          </a:stretch>
+        </p:blipFill>
+        <p:spPr>
+          <a:xfrm>
+            <a:off x="6041955" y="5008848"/>
+            <a:ext cx="2707204" cy="837625"/>
+          </a:xfrm>
+          <a:prstGeom prst="rect">
+            <a:avLst/>
+          </a:prstGeom>
+        </p:spPr>
+      </p:pic>
+    </p:spTree>
+    <p:extLst>
+      <p:ext uri="{BB962C8B-B14F-4D97-AF65-F5344CB8AC3E}">
+        <p14:creationId xmlns:p14="http://schemas.microsoft.com/office/powerpoint/2010/main" val="3666139318"/>
+      </p:ext>
+    </p:extLst>
+  </p:cSld>
+  <p:clrMapOvr>
+    <a:masterClrMapping/>
+  </p:clrMapOvr>
+  <p:timing>
+    <p:tnLst>
+      <p:par>
+        <p:cTn id="1" dur="indefinite" restart="never" nodeType="tmRoot"/>
+      </p:par>
+    </p:tnLst>
+  </p:timing>
+</p:sld>
+</file>
+
+<file path=ppt/slides/slide13.xml><?xml version="1.0" encoding="utf-8"?>
+<p:sld xmlns:a="http://schemas.openxmlformats.org/drawingml/2006/main" xmlns:r="http://schemas.openxmlformats.org/officeDocument/2006/relationships" xmlns:p="http://schemas.openxmlformats.org/presentationml/2006/main">
+  <p:cSld>
+    <p:spTree>
+      <p:nvGrpSpPr>
+        <p:cNvPr id="1" name=""/>
+        <p:cNvGrpSpPr/>
+        <p:nvPr/>
+      </p:nvGrpSpPr>
+      <p:grpSpPr>
+        <a:xfrm>
+          <a:off x="0" y="0"/>
+          <a:ext cx="0" cy="0"/>
+          <a:chOff x="0" y="0"/>
+          <a:chExt cx="0" cy="0"/>
+        </a:xfrm>
+      </p:grpSpPr>
+      <p:sp>
+        <p:nvSpPr>
+          <p:cNvPr id="2" name="Titel 1"/>
+          <p:cNvSpPr>
+            <a:spLocks noGrp="1"/>
+          </p:cNvSpPr>
+          <p:nvPr>
+            <p:ph type="title"/>
+          </p:nvPr>
+        </p:nvSpPr>
+        <p:spPr/>
+        <p:txBody>
+          <a:bodyPr/>
+          <a:lstStyle/>
+          <a:p>
+            <a:r>
+              <a:rPr lang="en-US" smtClean="0"/>
+              <a:t>Tag 3-Nachmittag: Anmerkungen</a:t>
+            </a:r>
+            <a:endParaRPr lang="en-US"/>
+          </a:p>
+        </p:txBody>
+      </p:sp>
+      <p:sp>
+        <p:nvSpPr>
+          <p:cNvPr id="3" name="Inhaltsplatzhalter 2"/>
+          <p:cNvSpPr>
+            <a:spLocks noGrp="1"/>
+          </p:cNvSpPr>
+          <p:nvPr>
+            <p:ph idx="1"/>
+          </p:nvPr>
+        </p:nvSpPr>
+        <p:spPr/>
+        <p:txBody>
+          <a:bodyPr/>
+          <a:lstStyle/>
+          <a:p>
+            <a:r>
+              <a:rPr lang="en-US" b="1" smtClean="0"/>
+              <a:t>Auf den Pool-PCs liegt ein relative aktueller Stand des Repositories</a:t>
+            </a:r>
+            <a:endParaRPr lang="en-US"/>
+          </a:p>
+          <a:p>
+            <a:endParaRPr lang="en-US" smtClean="0"/>
+          </a:p>
+          <a:p>
+            <a:r>
+              <a:rPr lang="en-US" smtClean="0"/>
+              <a:t>Ort: C:\VMs\tud-cppp.zip</a:t>
+            </a:r>
+          </a:p>
+          <a:p>
+            <a:endParaRPr lang="en-US"/>
+          </a:p>
+          <a:p>
+            <a:r>
+              <a:rPr lang="en-US" smtClean="0"/>
+              <a:t>Zum </a:t>
+            </a:r>
+            <a:r>
+              <a:rPr lang="en-US" b="1" smtClean="0"/>
+              <a:t>Aktualisieren</a:t>
+            </a:r>
+            <a:r>
+              <a:rPr lang="en-US" smtClean="0"/>
+              <a:t> und </a:t>
+            </a:r>
+            <a:r>
+              <a:rPr lang="en-US" b="1" smtClean="0"/>
+              <a:t>Verwenden</a:t>
+            </a:r>
+            <a:r>
+              <a:rPr lang="en-US" smtClean="0"/>
+              <a:t>:</a:t>
+            </a:r>
+          </a:p>
+          <a:p>
+            <a:pPr marL="457200" indent="-457200">
+              <a:buAutoNum type="arabicPeriod"/>
+            </a:pPr>
+            <a:r>
+              <a:rPr lang="en-US" smtClean="0"/>
+              <a:t>Entpacken</a:t>
+            </a:r>
+          </a:p>
+          <a:p>
+            <a:pPr marL="457200" indent="-457200">
+              <a:buAutoNum type="arabicPeriod"/>
+            </a:pPr>
+            <a:r>
+              <a:rPr lang="en-US" smtClean="0"/>
+              <a:t>Rechts-Klick </a:t>
+            </a:r>
+            <a:r>
+              <a:rPr lang="en-US" smtClean="0">
+                <a:sym typeface="Wingdings" panose="05000000000000000000" pitchFamily="2" charset="2"/>
+              </a:rPr>
+              <a:t>TortoiseGit Pull</a:t>
+            </a:r>
+          </a:p>
+          <a:p>
+            <a:pPr marL="457200" indent="-457200">
+              <a:buAutoNum type="arabicPeriod"/>
+            </a:pPr>
+            <a:endParaRPr lang="en-US">
+              <a:sym typeface="Wingdings" panose="05000000000000000000" pitchFamily="2" charset="2"/>
+            </a:endParaRPr>
+          </a:p>
+          <a:p>
+            <a:r>
+              <a:rPr lang="en-US" smtClean="0">
+                <a:sym typeface="Wingdings" panose="05000000000000000000" pitchFamily="2" charset="2"/>
+              </a:rPr>
+              <a:t>Dieses Repo wird nur f</a:t>
+            </a:r>
+            <a:r>
+              <a:rPr lang="de-DE" smtClean="0">
+                <a:sym typeface="Wingdings" panose="05000000000000000000" pitchFamily="2" charset="2"/>
+              </a:rPr>
+              <a:t>ür die Microcontroller-Entwicklung gebraucht.</a:t>
+            </a:r>
+          </a:p>
+          <a:p>
+            <a:endParaRPr lang="de-DE">
+              <a:sym typeface="Wingdings" panose="05000000000000000000" pitchFamily="2" charset="2"/>
+            </a:endParaRPr>
+          </a:p>
+          <a:p>
+            <a:r>
+              <a:rPr lang="de-DE" b="1"/>
+              <a:t>Wo finde ich WinIDEA? </a:t>
+            </a:r>
+            <a:r>
+              <a:rPr lang="de-DE"/>
+              <a:t>C:\PortableApps\iSYSTEM\winIDEAOpen9\winIDEA.exe</a:t>
+            </a:r>
+            <a:endParaRPr lang="en-US"/>
+          </a:p>
+          <a:p>
+            <a:endParaRPr lang="en-US"/>
+          </a:p>
+        </p:txBody>
+      </p:sp>
+    </p:spTree>
+    <p:extLst>
+      <p:ext uri="{BB962C8B-B14F-4D97-AF65-F5344CB8AC3E}">
+        <p14:creationId xmlns:p14="http://schemas.microsoft.com/office/powerpoint/2010/main" val="51283523"/>
+      </p:ext>
+    </p:extLst>
+  </p:cSld>
+  <p:clrMapOvr>
+    <a:masterClrMapping/>
+  </p:clrMapOvr>
+  <p:timing>
+    <p:tnLst>
+      <p:par>
+        <p:cTn id="1" dur="indefinite" restart="never" nodeType="tmRoot"/>
+      </p:par>
+    </p:tnLst>
+  </p:timing>
+</p:sld>
+</file>
+
+<file path=ppt/slides/slide14.xml><?xml version="1.0" encoding="utf-8"?>
+<p:sld xmlns:a="http://schemas.openxmlformats.org/drawingml/2006/main" xmlns:r="http://schemas.openxmlformats.org/officeDocument/2006/relationships" xmlns:p="http://schemas.openxmlformats.org/presentationml/2006/main">
+  <p:cSld>
+    <p:spTree>
+      <p:nvGrpSpPr>
+        <p:cNvPr id="1" name=""/>
+        <p:cNvGrpSpPr/>
+        <p:nvPr/>
+      </p:nvGrpSpPr>
+      <p:grpSpPr>
+        <a:xfrm>
+          <a:off x="0" y="0"/>
+          <a:ext cx="0" cy="0"/>
+          <a:chOff x="0" y="0"/>
+          <a:chExt cx="0" cy="0"/>
+        </a:xfrm>
+      </p:grpSpPr>
+      <p:sp>
+        <p:nvSpPr>
+          <p:cNvPr id="15362" name="Titel 1"/>
+          <p:cNvSpPr>
+            <a:spLocks noGrp="1"/>
+          </p:cNvSpPr>
+          <p:nvPr>
+            <p:ph type="title"/>
+          </p:nvPr>
+        </p:nvSpPr>
+        <p:spPr/>
+        <p:txBody>
+          <a:bodyPr/>
+          <a:lstStyle/>
+          <a:p>
+            <a:r>
+              <a:rPr lang="de-DE" altLang="de-DE" smtClean="0"/>
+              <a:t>Tag 5: Evaluationsfragen</a:t>
+            </a:r>
+            <a:endParaRPr lang="de-DE" altLang="de-DE" dirty="0" smtClean="0"/>
+          </a:p>
+        </p:txBody>
+      </p:sp>
+      <p:sp>
+        <p:nvSpPr>
+          <p:cNvPr id="2" name="Inhaltsplatzhalter 1"/>
+          <p:cNvSpPr>
+            <a:spLocks noGrp="1"/>
+          </p:cNvSpPr>
+          <p:nvPr>
+            <p:ph idx="1"/>
+          </p:nvPr>
+        </p:nvSpPr>
+        <p:spPr/>
+        <p:txBody>
+          <a:bodyPr/>
+          <a:lstStyle/>
+          <a:p>
+            <a:r>
+              <a:rPr lang="en-US" b="1" smtClean="0"/>
+              <a:t>Versuchsgerät = Entwicklungsumgebung + Microcontrollerboards</a:t>
+            </a:r>
+          </a:p>
+          <a:p>
+            <a:endParaRPr lang="en-US" b="1"/>
+          </a:p>
+          <a:p>
+            <a:r>
+              <a:rPr lang="en-US" b="1" smtClean="0"/>
+              <a:t>Praktikumsgruppe = 1 für Block 1; 2 für Block 2</a:t>
+            </a:r>
+          </a:p>
+          <a:p>
+            <a:endParaRPr lang="en-US" b="1"/>
+          </a:p>
+          <a:p>
+            <a:r>
+              <a:rPr lang="en-US" b="1" smtClean="0"/>
+              <a:t>Fragen für die Evaluation</a:t>
+            </a:r>
+          </a:p>
+          <a:p>
+            <a:pPr marL="180975" lvl="1" indent="0">
+              <a:buNone/>
+            </a:pPr>
+            <a:r>
+              <a:rPr lang="en-US" smtClean="0"/>
+              <a:t>5.1 Stärkeren Fokus auf C++(11) legen (= weniger Fokus auf C)?</a:t>
+            </a:r>
+          </a:p>
+          <a:p>
+            <a:pPr lvl="2"/>
+            <a:r>
+              <a:rPr lang="en-US" smtClean="0"/>
+              <a:t>"trifft zu" = mehr C++</a:t>
+            </a:r>
+          </a:p>
+          <a:p>
+            <a:pPr lvl="2"/>
+            <a:r>
+              <a:rPr lang="en-US" smtClean="0"/>
+              <a:t>"Mitte" = gleich lassen</a:t>
+            </a:r>
+          </a:p>
+          <a:p>
+            <a:pPr lvl="2"/>
+            <a:r>
+              <a:rPr lang="en-US" smtClean="0"/>
+              <a:t>"trifft nicht zu" = mehr C</a:t>
+            </a:r>
+          </a:p>
+          <a:p>
+            <a:pPr marL="180975" lvl="1" indent="0">
+              <a:buNone/>
+            </a:pPr>
+            <a:r>
+              <a:rPr lang="en-US" smtClean="0"/>
+              <a:t>5.2 Ich hatte vorher keine C++-Kenntnisse</a:t>
+            </a:r>
+          </a:p>
+          <a:p>
+            <a:pPr lvl="2">
+              <a:tabLst>
+                <a:tab pos="2155825" algn="l"/>
+              </a:tabLst>
+            </a:pPr>
+            <a:r>
+              <a:rPr lang="en-US" smtClean="0"/>
+              <a:t>"trifft zu" 	= keine Vorkenntnisse</a:t>
+            </a:r>
+          </a:p>
+          <a:p>
+            <a:pPr lvl="2">
+              <a:tabLst>
+                <a:tab pos="2155825" algn="l"/>
+              </a:tabLst>
+            </a:pPr>
+            <a:r>
+              <a:rPr lang="en-US" smtClean="0"/>
+              <a:t>"Mitte"	= eigene kleinere Projekte</a:t>
+            </a:r>
+          </a:p>
+          <a:p>
+            <a:pPr lvl="2">
+              <a:tabLst>
+                <a:tab pos="2155825" algn="l"/>
+              </a:tabLst>
+            </a:pPr>
+            <a:r>
+              <a:rPr lang="en-US" smtClean="0"/>
+              <a:t>"trifft nicht zu" 	= sehr erfahrene(r) Programmierer(in)</a:t>
+            </a:r>
+          </a:p>
+          <a:p>
+            <a:pPr marL="350838" lvl="2" indent="0">
+              <a:buNone/>
+              <a:tabLst>
+                <a:tab pos="2155825" algn="l"/>
+              </a:tabLst>
+            </a:pPr>
+            <a:endParaRPr lang="en-US"/>
+          </a:p>
+        </p:txBody>
+      </p:sp>
+    </p:spTree>
+    <p:extLst>
+      <p:ext uri="{BB962C8B-B14F-4D97-AF65-F5344CB8AC3E}">
+        <p14:creationId xmlns:p14="http://schemas.microsoft.com/office/powerpoint/2010/main" val="1142875780"/>
+      </p:ext>
+    </p:extLst>
+  </p:cSld>
+  <p:clrMapOvr>
+    <a:masterClrMapping/>
+  </p:clrMapOvr>
+  <mc:AlternateContent xmlns:mc="http://schemas.openxmlformats.org/markup-compatibility/2006" xmlns:p14="http://schemas.microsoft.com/office/powerpoint/2010/main">
+    <mc:Choice Requires="p14">
+      <p:transition spd="slow" p14:dur="2000"/>
+    </mc:Choice>
+    <mc:Fallback xmlns="">
+      <p:transition spd="slow"/>
+    </mc:Fallback>
+  </mc:AlternateContent>
+  <p:timing>
+    <p:tnLst>
+      <p:par>
+        <p:cTn id="1" dur="indefinite" restart="never" nodeType="tmRoot"/>
+      </p:par>
+    </p:tnLst>
+  </p:timing>
+</p:sld>
+</file>
+
 <file path=ppt/slides/slide2.xml><?xml version="1.0" encoding="utf-8"?>
 <p:sld xmlns:a="http://schemas.openxmlformats.org/drawingml/2006/main" xmlns:r="http://schemas.openxmlformats.org/officeDocument/2006/relationships" xmlns:p="http://schemas.openxmlformats.org/presentationml/2006/main">
   <p:cSld>
@@ -10573,11 +12421,7 @@
             </a:pPr>
             <a:r>
               <a:rPr lang="en-US" smtClean="0"/>
-              <a:t>5.1 Stärkeren </a:t>
-            </a:r>
-            <a:r>
-              <a:rPr lang="en-US" smtClean="0"/>
-              <a:t>Fokus auf C++(11) legen (= weniger Fokus auf C)?</a:t>
+              <a:t>5.1 Stärkeren Fokus auf C++(11) legen (= weniger Fokus auf C)?</a:t>
             </a:r>
           </a:p>
           <a:p>
@@ -10607,11 +12451,7 @@
             </a:pPr>
             <a:r>
               <a:rPr lang="en-US" smtClean="0"/>
-              <a:t>5.2 Ich </a:t>
-            </a:r>
-            <a:r>
-              <a:rPr lang="en-US" smtClean="0"/>
-              <a:t>hatte vorher keine C++-Kenntnisse</a:t>
+              <a:t>5.2 Ich hatte vorher keine C++-Kenntnisse</a:t>
             </a:r>
           </a:p>
           <a:p>
@@ -10622,15 +12462,7 @@
             </a:pPr>
             <a:r>
               <a:rPr lang="en-US" smtClean="0"/>
-              <a:t>"trifft zu" 	= </a:t>
-            </a:r>
-            <a:r>
-              <a:rPr lang="en-US" smtClean="0"/>
-              <a:t>keine </a:t>
-            </a:r>
-            <a:r>
-              <a:rPr lang="en-US" smtClean="0"/>
-              <a:t>Vorkenntnisse</a:t>
+              <a:t>"trifft zu" 	= keine Vorkenntnisse</a:t>
             </a:r>
           </a:p>
           <a:p>
@@ -10641,15 +12473,7 @@
             </a:pPr>
             <a:r>
               <a:rPr lang="en-US" smtClean="0"/>
-              <a:t>"Mitte"	= </a:t>
-            </a:r>
-            <a:r>
-              <a:rPr lang="en-US" smtClean="0"/>
-              <a:t>eigene </a:t>
-            </a:r>
-            <a:r>
-              <a:rPr lang="en-US" smtClean="0"/>
-              <a:t>kleinere Projekte</a:t>
+              <a:t>"Mitte"	= eigene kleinere Projekte</a:t>
             </a:r>
           </a:p>
           <a:p>
@@ -10660,13 +12484,8 @@
             </a:pPr>
             <a:r>
               <a:rPr lang="en-US" smtClean="0"/>
-              <a:t>"trifft nicht zu" 	= </a:t>
-            </a:r>
-            <a:r>
-              <a:rPr lang="en-US" smtClean="0"/>
-              <a:t>sehr erfahrene(r) Programmierer(in)</a:t>
-            </a:r>
-            <a:endParaRPr lang="en-US" smtClean="0"/>
+              <a:t>"trifft nicht zu" 	= sehr erfahrene(r) Programmierer(in)</a:t>
+            </a:r>
           </a:p>
           <a:p>
             <a:pPr marL="350838" lvl="2" indent="0">

</xml_diff>

<commit_message>
Bugfix in foreach iterator
+ minor edits
</commit_message>
<xml_diff>
--- a/2018/recap_and_warmup_slides.pptx
+++ b/2018/recap_and_warmup_slides.pptx
@@ -7955,7 +7955,7 @@
           <a:graphicData uri="http://schemas.openxmlformats.org/presentationml/2006/ole">
             <mc:AlternateContent xmlns:mc="http://schemas.openxmlformats.org/markup-compatibility/2006">
               <mc:Choice xmlns:v="urn:schemas-microsoft-com:vml" Requires="v">
-                <p:oleObj spid="_x0000_s2052" r:id="rId16" imgW="1038370" imgH="980952" progId="">
+                <p:oleObj spid="_x0000_s2056" r:id="rId16" imgW="1038370" imgH="980952" progId="">
                   <p:embed/>
                 </p:oleObj>
               </mc:Choice>
@@ -8393,7 +8393,7 @@
                 </a:lnSpc>
                 <a:defRPr/>
               </a:pPr>
-              <a:t>2018-09-06</a:t>
+              <a:t>2018-09-07</a:t>
             </a:fld>
             <a:r>
               <a:rPr lang="en-GB" altLang="de-DE" sz="1000" smtClean="0">
@@ -8955,11 +8955,7 @@
           <a:p>
             <a:r>
               <a:rPr lang="en-US" smtClean="0"/>
-              <a:t>Block </a:t>
-            </a:r>
-            <a:r>
-              <a:rPr lang="en-US" smtClean="0"/>
-              <a:t>2</a:t>
+              <a:t>Block 2</a:t>
             </a:r>
             <a:endParaRPr lang="en-US"/>
           </a:p>
@@ -9042,46 +9038,79 @@
           </a:bodyPr>
           <a:lstStyle/>
           <a:p>
+            <a:r>
+              <a:rPr lang="en-US" b="1" smtClean="0"/>
+              <a:t>Danke fürs Feedback! </a:t>
+            </a:r>
+            <a:br>
+              <a:rPr lang="en-US" b="1" smtClean="0"/>
+            </a:br>
+            <a:endParaRPr lang="en-US" b="1" smtClean="0"/>
+          </a:p>
+          <a:p>
+            <a:r>
+              <a:rPr lang="en-US" b="1" smtClean="0"/>
+              <a:t>Am Ende des Tages bitte…</a:t>
+            </a:r>
+          </a:p>
+          <a:p>
             <a:pPr marL="342900" indent="-342900">
               <a:buFontTx/>
               <a:buChar char="-"/>
             </a:pPr>
             <a:r>
               <a:rPr lang="en-US" b="1" smtClean="0"/>
-              <a:t>Am Ende des Tages bitte…</a:t>
-            </a:r>
-          </a:p>
-          <a:p>
-            <a:pPr marL="692150" lvl="1" indent="-342900">
+              <a:t>… nur abmelden, </a:t>
+            </a:r>
+            <a:r>
+              <a:rPr lang="en-US" smtClean="0"/>
+              <a:t>nicht den PC ausschalten</a:t>
+            </a:r>
+            <a:r>
+              <a:rPr lang="en-US" b="1" smtClean="0"/>
+              <a:t>.</a:t>
+            </a:r>
+          </a:p>
+          <a:p>
+            <a:pPr marL="342900" indent="-342900">
               <a:buFontTx/>
               <a:buChar char="-"/>
             </a:pPr>
             <a:r>
               <a:rPr lang="en-US" b="1" smtClean="0"/>
-              <a:t>… nur abmelden, </a:t>
+              <a:t>… </a:t>
+            </a:r>
+            <a:r>
+              <a:rPr lang="en-US" b="1" smtClean="0"/>
+              <a:t>eure Ergebnisse </a:t>
+            </a:r>
+            <a:r>
+              <a:rPr lang="en-US" b="1" smtClean="0"/>
+              <a:t>sichern</a:t>
             </a:r>
             <a:r>
               <a:rPr lang="en-US" smtClean="0"/>
-              <a:t>nicht den PC ausschalten</a:t>
-            </a:r>
-            <a:r>
-              <a:rPr lang="en-US" b="1" smtClean="0"/>
+              <a:t> – wir können leider für nichts außerhalb von %HOME% garantieren</a:t>
+            </a:r>
+            <a:r>
+              <a:rPr lang="en-US" smtClean="0"/>
               <a:t>.</a:t>
             </a:r>
           </a:p>
           <a:p>
-            <a:pPr marL="692150" lvl="1" indent="-342900">
+            <a:pPr marL="342900" indent="-342900">
               <a:buFontTx/>
               <a:buChar char="-"/>
             </a:pPr>
             <a:r>
+              <a:rPr lang="en-US" smtClean="0"/>
+              <a:t>… die </a:t>
+            </a:r>
+            <a:r>
               <a:rPr lang="en-US" b="1" smtClean="0"/>
-              <a:t>… Ergebnisse sichern</a:t>
-            </a:r>
-            <a:r>
-              <a:rPr lang="en-US" smtClean="0"/>
-              <a:t> – wir können leider für nichts außerhalb von %HOME% garantieren.</a:t>
-            </a:r>
+              <a:t>Fenster schließen</a:t>
+            </a:r>
+            <a:endParaRPr lang="en-US" b="1" smtClean="0"/>
           </a:p>
           <a:p>
             <a:pPr marL="692150" lvl="1" indent="-342900">
@@ -9091,30 +9120,26 @@
             <a:endParaRPr lang="de-DE"/>
           </a:p>
           <a:p>
+            <a:r>
+              <a:rPr lang="de-DE" smtClean="0"/>
+              <a:t>Der PC-Pool hat eine </a:t>
+            </a:r>
+            <a:r>
+              <a:rPr lang="de-DE" b="1" smtClean="0"/>
+              <a:t>Klimaanlage</a:t>
+            </a:r>
+            <a:r>
+              <a:rPr lang="de-DE" smtClean="0"/>
+              <a:t>.</a:t>
+            </a:r>
+          </a:p>
+          <a:p>
             <a:pPr marL="342900" indent="-342900">
               <a:buFontTx/>
               <a:buChar char="-"/>
             </a:pPr>
             <a:r>
               <a:rPr lang="de-DE" smtClean="0"/>
-              <a:t>Der PC-Pool hat eine </a:t>
-            </a:r>
-            <a:r>
-              <a:rPr lang="de-DE" b="1" smtClean="0"/>
-              <a:t>Klimaanlage</a:t>
-            </a:r>
-            <a:r>
-              <a:rPr lang="de-DE" smtClean="0"/>
-              <a:t>.</a:t>
-            </a:r>
-          </a:p>
-          <a:p>
-            <a:pPr marL="692150" lvl="1" indent="-342900">
-              <a:buFontTx/>
-              <a:buChar char="-"/>
-            </a:pPr>
-            <a:r>
-              <a:rPr lang="de-DE" smtClean="0"/>
               <a:t>Falls </a:t>
             </a:r>
             <a:r>
@@ -9127,7 +9152,7 @@
             </a:r>
           </a:p>
           <a:p>
-            <a:pPr marL="692150" lvl="1" indent="-342900">
+            <a:pPr marL="342900" indent="-342900">
               <a:buFontTx/>
               <a:buChar char="-"/>
             </a:pPr>
@@ -9150,38 +9175,6 @@
               <a:buChar char="-"/>
             </a:pPr>
             <a:endParaRPr lang="en-US" smtClean="0"/>
-          </a:p>
-          <a:p>
-            <a:pPr marL="342900" indent="-342900">
-              <a:buFontTx/>
-              <a:buChar char="-"/>
-            </a:pPr>
-            <a:r>
-              <a:rPr lang="en-US" b="1" smtClean="0"/>
-              <a:t>Danke fürs Feedback! </a:t>
-            </a:r>
-            <a:br>
-              <a:rPr lang="en-US" b="1" smtClean="0"/>
-            </a:br>
-            <a:r>
-              <a:rPr lang="en-US" smtClean="0"/>
-              <a:t>Es gibt ein paar Bugfixes</a:t>
-            </a:r>
-          </a:p>
-          <a:p>
-            <a:pPr marL="692150" lvl="1" indent="-342900">
-              <a:buFontTx/>
-              <a:buChar char="-"/>
-            </a:pPr>
-            <a:r>
-              <a:rPr lang="de-DE" smtClean="0"/>
-              <a:t>Siehe </a:t>
-            </a:r>
-            <a:r>
-              <a:rPr lang="de-DE" b="1" smtClean="0"/>
-              <a:t>changelog.txt</a:t>
-            </a:r>
-            <a:endParaRPr lang="en-US" b="1" smtClean="0"/>
           </a:p>
         </p:txBody>
       </p:sp>

</xml_diff>

<commit_message>
Minor adjustments in slides
</commit_message>
<xml_diff>
--- a/2018/recap_and_warmup_slides.pptx
+++ b/2018/recap_and_warmup_slides.pptx
@@ -7955,7 +7955,7 @@
           <a:graphicData uri="http://schemas.openxmlformats.org/presentationml/2006/ole">
             <mc:AlternateContent xmlns:mc="http://schemas.openxmlformats.org/markup-compatibility/2006">
               <mc:Choice xmlns:v="urn:schemas-microsoft-com:vml" Requires="v">
-                <p:oleObj spid="_x0000_s2056" r:id="rId16" imgW="1038370" imgH="980952" progId="">
+                <p:oleObj spid="_x0000_s2058" r:id="rId16" imgW="1038370" imgH="980952" progId="">
                   <p:embed/>
                 </p:oleObj>
               </mc:Choice>
@@ -8393,7 +8393,7 @@
                 </a:lnSpc>
                 <a:defRPr/>
               </a:pPr>
-              <a:t>2018-09-07</a:t>
+              <a:t>2018-09-10</a:t>
             </a:fld>
             <a:r>
               <a:rPr lang="en-GB" altLang="de-DE" sz="1000" smtClean="0">
@@ -9078,23 +9078,11 @@
             </a:pPr>
             <a:r>
               <a:rPr lang="en-US" b="1" smtClean="0"/>
-              <a:t>… </a:t>
-            </a:r>
-            <a:r>
-              <a:rPr lang="en-US" b="1" smtClean="0"/>
-              <a:t>eure Ergebnisse </a:t>
-            </a:r>
-            <a:r>
-              <a:rPr lang="en-US" b="1" smtClean="0"/>
-              <a:t>sichern</a:t>
+              <a:t>… eure Ergebnisse sichern</a:t>
             </a:r>
             <a:r>
               <a:rPr lang="en-US" smtClean="0"/>
-              <a:t> – wir können leider für nichts außerhalb von %HOME% garantieren</a:t>
-            </a:r>
-            <a:r>
-              <a:rPr lang="en-US" smtClean="0"/>
-              <a:t>.</a:t>
+              <a:t> – wir können leider für nichts außerhalb von %HOME% garantieren.</a:t>
             </a:r>
           </a:p>
           <a:p>
@@ -9110,7 +9098,6 @@
               <a:rPr lang="en-US" b="1" smtClean="0"/>
               <a:t>Fenster schließen</a:t>
             </a:r>
-            <a:endParaRPr lang="en-US" b="1" smtClean="0"/>
           </a:p>
           <a:p>
             <a:pPr marL="692150" lvl="1" indent="-342900">
@@ -9595,7 +9582,15 @@
           <a:p>
             <a:r>
               <a:rPr lang="en-US" smtClean="0"/>
-              <a:t>Tag 3-Nachmittag: Anmerkungen</a:t>
+              <a:t>Tag </a:t>
+            </a:r>
+            <a:r>
+              <a:rPr lang="en-US" smtClean="0"/>
+              <a:t>3-Vormittag: </a:t>
+            </a:r>
+            <a:r>
+              <a:rPr lang="en-US" smtClean="0"/>
+              <a:t>Anmerkungen</a:t>
             </a:r>
             <a:endParaRPr lang="en-US"/>
           </a:p>

</xml_diff>

<commit_message>
Clarification on volatile keyword
Not sensible for inter-thread communication
</commit_message>
<xml_diff>
--- a/2018/recap_and_warmup_slides.pptx
+++ b/2018/recap_and_warmup_slides.pptx
@@ -5,10 +5,10 @@
     <p:sldMasterId id="2147483650" r:id="rId1"/>
   </p:sldMasterIdLst>
   <p:notesMasterIdLst>
-    <p:notesMasterId r:id="rId16"/>
+    <p:notesMasterId r:id="rId18"/>
   </p:notesMasterIdLst>
   <p:handoutMasterIdLst>
-    <p:handoutMasterId r:id="rId17"/>
+    <p:handoutMasterId r:id="rId19"/>
   </p:handoutMasterIdLst>
   <p:sldIdLst>
     <p:sldId id="454" r:id="rId2"/>
@@ -24,7 +24,9 @@
     <p:sldId id="502" r:id="rId12"/>
     <p:sldId id="503" r:id="rId13"/>
     <p:sldId id="504" r:id="rId14"/>
-    <p:sldId id="505" r:id="rId15"/>
+    <p:sldId id="507" r:id="rId15"/>
+    <p:sldId id="506" r:id="rId16"/>
+    <p:sldId id="505" r:id="rId17"/>
   </p:sldIdLst>
   <p:sldSz cx="9144000" cy="6858000" type="screen4x3"/>
   <p:notesSz cx="7099300" cy="10234613"/>
@@ -211,6 +213,8 @@
             <p14:sldId id="502"/>
             <p14:sldId id="503"/>
             <p14:sldId id="504"/>
+            <p14:sldId id="507"/>
+            <p14:sldId id="506"/>
             <p14:sldId id="505"/>
           </p14:sldIdLst>
         </p14:section>
@@ -3485,7 +3489,7 @@
                 <a:latin typeface="Stafford" pitchFamily="2" charset="0"/>
               </a:rPr>
               <a:pPr eaLnBrk="1" hangingPunct="1"/>
-              <a:t>14</a:t>
+              <a:t>16</a:t>
             </a:fld>
             <a:endParaRPr lang="en-US" altLang="de-DE" smtClean="0">
               <a:solidFill>
@@ -7955,7 +7959,7 @@
           <a:graphicData uri="http://schemas.openxmlformats.org/presentationml/2006/ole">
             <mc:AlternateContent xmlns:mc="http://schemas.openxmlformats.org/markup-compatibility/2006">
               <mc:Choice xmlns:v="urn:schemas-microsoft-com:vml" Requires="v">
-                <p:oleObj spid="_x0000_s2058" r:id="rId16" imgW="1038370" imgH="980952" progId="">
+                <p:oleObj spid="_x0000_s2060" r:id="rId16" imgW="1038370" imgH="980952" progId="">
                   <p:embed/>
                 </p:oleObj>
               </mc:Choice>
@@ -8393,7 +8397,7 @@
                 </a:lnSpc>
                 <a:defRPr/>
               </a:pPr>
-              <a:t>2018-09-10</a:t>
+              <a:t>2018-09-11</a:t>
             </a:fld>
             <a:r>
               <a:rPr lang="en-GB" altLang="de-DE" sz="1000" smtClean="0">
@@ -9582,15 +9586,7 @@
           <a:p>
             <a:r>
               <a:rPr lang="en-US" smtClean="0"/>
-              <a:t>Tag </a:t>
-            </a:r>
-            <a:r>
-              <a:rPr lang="en-US" smtClean="0"/>
-              <a:t>3-Vormittag: </a:t>
-            </a:r>
-            <a:r>
-              <a:rPr lang="en-US" smtClean="0"/>
-              <a:t>Anmerkungen</a:t>
+              <a:t>Tag 3-Vormittag: Anmerkungen</a:t>
             </a:r>
             <a:endParaRPr lang="en-US"/>
           </a:p>
@@ -9739,6 +9735,336 @@
 </file>
 
 <file path=ppt/slides/slide14.xml><?xml version="1.0" encoding="utf-8"?>
+<p:sld xmlns:a="http://schemas.openxmlformats.org/drawingml/2006/main" xmlns:r="http://schemas.openxmlformats.org/officeDocument/2006/relationships" xmlns:p="http://schemas.openxmlformats.org/presentationml/2006/main">
+  <p:cSld>
+    <p:spTree>
+      <p:nvGrpSpPr>
+        <p:cNvPr id="1" name=""/>
+        <p:cNvGrpSpPr/>
+        <p:nvPr/>
+      </p:nvGrpSpPr>
+      <p:grpSpPr>
+        <a:xfrm>
+          <a:off x="0" y="0"/>
+          <a:ext cx="0" cy="0"/>
+          <a:chOff x="0" y="0"/>
+          <a:chExt cx="0" cy="0"/>
+        </a:xfrm>
+      </p:grpSpPr>
+      <p:sp>
+        <p:nvSpPr>
+          <p:cNvPr id="2" name="Titel 1"/>
+          <p:cNvSpPr>
+            <a:spLocks noGrp="1"/>
+          </p:cNvSpPr>
+          <p:nvPr>
+            <p:ph type="title"/>
+          </p:nvPr>
+        </p:nvSpPr>
+        <p:spPr/>
+        <p:txBody>
+          <a:bodyPr/>
+          <a:lstStyle/>
+          <a:p>
+            <a:pPr>
+              <a:tabLst>
+                <a:tab pos="2155825" algn="l"/>
+              </a:tabLst>
+            </a:pPr>
+            <a:r>
+              <a:rPr lang="de-DE" altLang="de-DE"/>
+              <a:t>Tag 4</a:t>
+            </a:r>
+            <a:r>
+              <a:rPr lang="de-DE" altLang="de-DE" smtClean="0"/>
+              <a:t>: </a:t>
+            </a:r>
+            <a:r>
+              <a:rPr lang="en-US" smtClean="0"/>
+              <a:t>Klarstellung zu volatile</a:t>
+            </a:r>
+            <a:endParaRPr lang="en-US"/>
+          </a:p>
+        </p:txBody>
+      </p:sp>
+      <p:sp>
+        <p:nvSpPr>
+          <p:cNvPr id="3" name="Inhaltsplatzhalter 2"/>
+          <p:cNvSpPr>
+            <a:spLocks noGrp="1"/>
+          </p:cNvSpPr>
+          <p:nvPr>
+            <p:ph idx="1"/>
+          </p:nvPr>
+        </p:nvSpPr>
+        <p:spPr/>
+        <p:txBody>
+          <a:bodyPr/>
+          <a:lstStyle/>
+          <a:p>
+            <a:pPr marL="342900" indent="-342900">
+              <a:buFont typeface="Wingdings" panose="05000000000000000000" pitchFamily="2" charset="2"/>
+              <a:buChar char="§"/>
+              <a:tabLst>
+                <a:tab pos="2155825" algn="l"/>
+              </a:tabLst>
+            </a:pPr>
+            <a:r>
+              <a:rPr lang="de-DE" smtClean="0"/>
+              <a:t>Anders als in Java ist </a:t>
+            </a:r>
+            <a:r>
+              <a:rPr lang="de-DE" b="1" smtClean="0">
+                <a:latin typeface="Consolas" panose="020B0609020204030204" pitchFamily="49" charset="0"/>
+                <a:cs typeface="Consolas" panose="020B0609020204030204" pitchFamily="49" charset="0"/>
+              </a:rPr>
+              <a:t>volatile</a:t>
+            </a:r>
+            <a:r>
+              <a:rPr lang="de-DE" b="1" smtClean="0"/>
+              <a:t> </a:t>
+            </a:r>
+            <a:r>
+              <a:rPr lang="de-DE" smtClean="0"/>
+              <a:t>in C++ </a:t>
+            </a:r>
+            <a:r>
+              <a:rPr lang="de-DE" b="1" smtClean="0"/>
+              <a:t>nicht zur Inter-Thread-Kommunikation gedacht</a:t>
+            </a:r>
+            <a:r>
+              <a:rPr lang="de-DE" smtClean="0"/>
+              <a:t>. </a:t>
+            </a:r>
+          </a:p>
+          <a:p>
+            <a:pPr marL="342900" indent="-342900">
+              <a:buFont typeface="Wingdings" panose="05000000000000000000" pitchFamily="2" charset="2"/>
+              <a:buChar char="§"/>
+              <a:tabLst>
+                <a:tab pos="2155825" algn="l"/>
+              </a:tabLst>
+            </a:pPr>
+            <a:r>
+              <a:rPr lang="de-DE" smtClean="0"/>
+              <a:t>Das Beispiel aus den Folien ist daher nur eine Motivation, aber keine Best Practice und nicht zwangsweise funktionsfähig.</a:t>
+            </a:r>
+          </a:p>
+        </p:txBody>
+      </p:sp>
+    </p:spTree>
+    <p:extLst>
+      <p:ext uri="{BB962C8B-B14F-4D97-AF65-F5344CB8AC3E}">
+        <p14:creationId xmlns:p14="http://schemas.microsoft.com/office/powerpoint/2010/main" val="2540126253"/>
+      </p:ext>
+    </p:extLst>
+  </p:cSld>
+  <p:clrMapOvr>
+    <a:masterClrMapping/>
+  </p:clrMapOvr>
+  <p:timing>
+    <p:tnLst>
+      <p:par>
+        <p:cTn id="1" dur="indefinite" restart="never" nodeType="tmRoot"/>
+      </p:par>
+    </p:tnLst>
+  </p:timing>
+</p:sld>
+</file>
+
+<file path=ppt/slides/slide15.xml><?xml version="1.0" encoding="utf-8"?>
+<p:sld xmlns:a="http://schemas.openxmlformats.org/drawingml/2006/main" xmlns:r="http://schemas.openxmlformats.org/officeDocument/2006/relationships" xmlns:p="http://schemas.openxmlformats.org/presentationml/2006/main">
+  <p:cSld>
+    <p:spTree>
+      <p:nvGrpSpPr>
+        <p:cNvPr id="1" name=""/>
+        <p:cNvGrpSpPr/>
+        <p:nvPr/>
+      </p:nvGrpSpPr>
+      <p:grpSpPr>
+        <a:xfrm>
+          <a:off x="0" y="0"/>
+          <a:ext cx="0" cy="0"/>
+          <a:chOff x="0" y="0"/>
+          <a:chExt cx="0" cy="0"/>
+        </a:xfrm>
+      </p:grpSpPr>
+      <p:sp>
+        <p:nvSpPr>
+          <p:cNvPr id="2" name="Titel 1"/>
+          <p:cNvSpPr>
+            <a:spLocks noGrp="1"/>
+          </p:cNvSpPr>
+          <p:nvPr>
+            <p:ph type="title"/>
+          </p:nvPr>
+        </p:nvSpPr>
+        <p:spPr/>
+        <p:txBody>
+          <a:bodyPr/>
+          <a:lstStyle/>
+          <a:p>
+            <a:pPr>
+              <a:tabLst>
+                <a:tab pos="2155825" algn="l"/>
+              </a:tabLst>
+            </a:pPr>
+            <a:r>
+              <a:rPr lang="de-DE" altLang="de-DE"/>
+              <a:t>Tag 4</a:t>
+            </a:r>
+            <a:r>
+              <a:rPr lang="de-DE" altLang="de-DE" smtClean="0"/>
+              <a:t>: </a:t>
+            </a:r>
+            <a:r>
+              <a:rPr lang="en-US"/>
+              <a:t>Hinweise zur Klausur</a:t>
+            </a:r>
+          </a:p>
+        </p:txBody>
+      </p:sp>
+      <p:sp>
+        <p:nvSpPr>
+          <p:cNvPr id="3" name="Inhaltsplatzhalter 2"/>
+          <p:cNvSpPr>
+            <a:spLocks noGrp="1"/>
+          </p:cNvSpPr>
+          <p:nvPr>
+            <p:ph idx="1"/>
+          </p:nvPr>
+        </p:nvSpPr>
+        <p:spPr/>
+        <p:txBody>
+          <a:bodyPr/>
+          <a:lstStyle/>
+          <a:p>
+            <a:pPr>
+              <a:tabLst>
+                <a:tab pos="2155825" algn="l"/>
+              </a:tabLst>
+            </a:pPr>
+            <a:r>
+              <a:rPr lang="en-US" b="1"/>
+              <a:t>Hinweise zur Klausur</a:t>
+            </a:r>
+          </a:p>
+          <a:p>
+            <a:pPr lvl="1">
+              <a:tabLst>
+                <a:tab pos="2155825" algn="l"/>
+              </a:tabLst>
+            </a:pPr>
+            <a:r>
+              <a:rPr lang="en-US"/>
+              <a:t>Wir gehen davon aus, dass </a:t>
+            </a:r>
+            <a:r>
+              <a:rPr lang="en-US" b="1"/>
+              <a:t>alle nicht-optionalen Übungen </a:t>
+            </a:r>
+            <a:r>
+              <a:rPr lang="en-US" smtClean="0"/>
+              <a:t>bearbeitet </a:t>
+            </a:r>
+            <a:r>
+              <a:rPr lang="en-US"/>
+              <a:t>wurden </a:t>
+            </a:r>
+            <a:r>
+              <a:rPr lang="en-US" b="1"/>
+              <a:t>und</a:t>
+            </a:r>
+            <a:r>
+              <a:rPr lang="en-US"/>
+              <a:t> alle Folien soweit verstanden wurden.</a:t>
+            </a:r>
+          </a:p>
+          <a:p>
+            <a:pPr lvl="1">
+              <a:tabLst>
+                <a:tab pos="2155825" algn="l"/>
+              </a:tabLst>
+            </a:pPr>
+            <a:r>
+              <a:rPr lang="en-US"/>
+              <a:t>Es wird ein </a:t>
+            </a:r>
+            <a:r>
+              <a:rPr lang="en-US" b="1"/>
+              <a:t>Codehandout</a:t>
+            </a:r>
+            <a:r>
+              <a:rPr lang="en-US"/>
+              <a:t> geben, in dem für bestimmte Funktionen/Datentypen/Methoden eine Beschreibung vorliegt.</a:t>
+            </a:r>
+          </a:p>
+          <a:p>
+            <a:pPr lvl="2">
+              <a:tabLst>
+                <a:tab pos="2155825" algn="l"/>
+              </a:tabLst>
+            </a:pPr>
+            <a:r>
+              <a:rPr lang="en-US" b="1"/>
+              <a:t>NICHT </a:t>
+            </a:r>
+            <a:r>
+              <a:rPr lang="en-US"/>
+              <a:t>zu erwarten ist bspw. </a:t>
+            </a:r>
+            <a:r>
+              <a:rPr lang="en-US">
+                <a:latin typeface="Consolas" panose="020B0609020204030204" pitchFamily="49" charset="0"/>
+                <a:cs typeface="Consolas" panose="020B0609020204030204" pitchFamily="49" charset="0"/>
+              </a:rPr>
+              <a:t>std::vector&lt;T&gt;::push_back</a:t>
+            </a:r>
+          </a:p>
+          <a:p>
+            <a:pPr lvl="2">
+              <a:tabLst>
+                <a:tab pos="2155825" algn="l"/>
+              </a:tabLst>
+            </a:pPr>
+            <a:r>
+              <a:rPr lang="en-US"/>
+              <a:t>Zu erwarten ist bspw. </a:t>
+            </a:r>
+            <a:r>
+              <a:rPr lang="en-US">
+                <a:latin typeface="Consolas" panose="020B0609020204030204" pitchFamily="49" charset="0"/>
+                <a:cs typeface="Consolas" panose="020B0609020204030204" pitchFamily="49" charset="0"/>
+              </a:rPr>
+              <a:t>std::string::find</a:t>
+            </a:r>
+          </a:p>
+          <a:p>
+            <a:endParaRPr lang="en-US"/>
+          </a:p>
+        </p:txBody>
+      </p:sp>
+    </p:spTree>
+    <p:extLst>
+      <p:ext uri="{BB962C8B-B14F-4D97-AF65-F5344CB8AC3E}">
+        <p14:creationId xmlns:p14="http://schemas.microsoft.com/office/powerpoint/2010/main" val="1553757381"/>
+      </p:ext>
+    </p:extLst>
+  </p:cSld>
+  <p:clrMapOvr>
+    <a:masterClrMapping/>
+  </p:clrMapOvr>
+  <p:timing>
+    <p:tnLst>
+      <p:par>
+        <p:cTn id="1" dur="indefinite" restart="never" nodeType="tmRoot"/>
+      </p:par>
+    </p:tnLst>
+  </p:timing>
+</p:sld>
+</file>
+
+<file path=ppt/slides/slide16.xml><?xml version="1.0" encoding="utf-8"?>
 <p:sld xmlns:a="http://schemas.openxmlformats.org/drawingml/2006/main" xmlns:r="http://schemas.openxmlformats.org/officeDocument/2006/relationships" xmlns:p="http://schemas.openxmlformats.org/presentationml/2006/main">
   <p:cSld>
     <p:spTree>

</xml_diff>